<commit_message>
more organization for viz day
</commit_message>
<xml_diff>
--- a/03-R_viz/slides.pptx
+++ b/03-R_viz/slides.pptx
@@ -6,19 +6,22 @@
     <p:sldMasterId id="2147483649" r:id="rId2"/>
   </p:sldMasterIdLst>
   <p:notesMasterIdLst>
-    <p:notesMasterId r:id="rId13"/>
+    <p:notesMasterId r:id="rId16"/>
   </p:notesMasterIdLst>
   <p:sldIdLst>
     <p:sldId id="258" r:id="rId3"/>
-    <p:sldId id="358" r:id="rId4"/>
-    <p:sldId id="346" r:id="rId5"/>
-    <p:sldId id="348" r:id="rId6"/>
-    <p:sldId id="347" r:id="rId7"/>
-    <p:sldId id="349" r:id="rId8"/>
-    <p:sldId id="350" r:id="rId9"/>
-    <p:sldId id="351" r:id="rId10"/>
-    <p:sldId id="352" r:id="rId11"/>
-    <p:sldId id="368" r:id="rId12"/>
+    <p:sldId id="370" r:id="rId4"/>
+    <p:sldId id="358" r:id="rId5"/>
+    <p:sldId id="371" r:id="rId6"/>
+    <p:sldId id="346" r:id="rId7"/>
+    <p:sldId id="348" r:id="rId8"/>
+    <p:sldId id="347" r:id="rId9"/>
+    <p:sldId id="349" r:id="rId10"/>
+    <p:sldId id="350" r:id="rId11"/>
+    <p:sldId id="351" r:id="rId12"/>
+    <p:sldId id="352" r:id="rId13"/>
+    <p:sldId id="369" r:id="rId14"/>
+    <p:sldId id="372" r:id="rId15"/>
   </p:sldIdLst>
   <p:sldSz cx="9363075" cy="5257800"/>
   <p:notesSz cx="6858000" cy="9144000"/>
@@ -241,7 +244,7 @@
           <a:p>
             <a:fld id="{DB92F479-4B50-F243-9713-1B12EC2B4BDB}" type="datetimeFigureOut">
               <a:rPr lang="en-US" smtClean="0"/>
-              <a:t>2/23/14</a:t>
+              <a:t>3/1/14</a:t>
             </a:fld>
             <a:endParaRPr lang="en-US"/>
           </a:p>
@@ -662,33 +665,29 @@
           <a:bodyPr/>
           <a:lstStyle/>
           <a:p>
-            <a:r>
-              <a:rPr lang="en-US" dirty="0" smtClean="0"/>
-              <a:t>~15 min</a:t>
-            </a:r>
-          </a:p>
-          <a:p>
-            <a:r>
-              <a:rPr lang="en-US" dirty="0" smtClean="0"/>
-              <a:t>Q:</a:t>
-            </a:r>
-            <a:r>
-              <a:rPr lang="en-US" baseline="0" dirty="0" smtClean="0"/>
-              <a:t> </a:t>
-            </a:r>
-            <a:r>
-              <a:rPr lang="en-US" dirty="0" smtClean="0"/>
-              <a:t>What did you find difficult/confusing?</a:t>
-            </a:r>
-          </a:p>
-          <a:p>
-            <a:r>
-              <a:rPr lang="en-US" dirty="0" smtClean="0"/>
-              <a:t>Q: What did you find interesting?</a:t>
-            </a:r>
-          </a:p>
-          <a:p>
-            <a:endParaRPr lang="en-US" dirty="0"/>
+            <a:pPr marL="0" marR="0" indent="0" algn="l" defTabSz="457200" rtl="0" eaLnBrk="1" fontAlgn="auto" latinLnBrk="0" hangingPunct="1">
+              <a:lnSpc>
+                <a:spcPct val="100000"/>
+              </a:lnSpc>
+              <a:spcBef>
+                <a:spcPts val="0"/>
+              </a:spcBef>
+              <a:spcAft>
+                <a:spcPts val="0"/>
+              </a:spcAft>
+              <a:buClrTx/>
+              <a:buSzTx/>
+              <a:buFontTx/>
+              <a:buNone/>
+              <a:tabLst/>
+              <a:defRPr/>
+            </a:pPr>
+            <a:endParaRPr lang="en-US" sz="1200" baseline="0" dirty="0" smtClean="0">
+              <a:solidFill>
+                <a:prstClr val="black"/>
+              </a:solidFill>
+              <a:latin typeface="ArialMT"/>
+            </a:endParaRPr>
           </a:p>
         </p:txBody>
       </p:sp>
@@ -710,6 +709,296 @@
             <a:fld id="{ADD4B5B7-85EF-4E48-AC80-2380FACD9C23}" type="slidenum">
               <a:rPr lang="en-US" smtClean="0"/>
               <a:t>10</a:t>
+            </a:fld>
+            <a:endParaRPr lang="en-US"/>
+          </a:p>
+        </p:txBody>
+      </p:sp>
+    </p:spTree>
+    <p:extLst>
+      <p:ext uri="{BB962C8B-B14F-4D97-AF65-F5344CB8AC3E}">
+        <p14:creationId xmlns:p14="http://schemas.microsoft.com/office/powerpoint/2010/main" val="645762702"/>
+      </p:ext>
+    </p:extLst>
+  </p:cSld>
+  <p:clrMapOvr>
+    <a:masterClrMapping/>
+  </p:clrMapOvr>
+</p:notes>
+</file>
+
+<file path=ppt/notesSlides/notesSlide11.xml><?xml version="1.0" encoding="utf-8"?>
+<p:notes xmlns:a="http://schemas.openxmlformats.org/drawingml/2006/main" xmlns:r="http://schemas.openxmlformats.org/officeDocument/2006/relationships" xmlns:p="http://schemas.openxmlformats.org/presentationml/2006/main">
+  <p:cSld>
+    <p:spTree>
+      <p:nvGrpSpPr>
+        <p:cNvPr id="1" name=""/>
+        <p:cNvGrpSpPr/>
+        <p:nvPr/>
+      </p:nvGrpSpPr>
+      <p:grpSpPr>
+        <a:xfrm>
+          <a:off x="0" y="0"/>
+          <a:ext cx="0" cy="0"/>
+          <a:chOff x="0" y="0"/>
+          <a:chExt cx="0" cy="0"/>
+        </a:xfrm>
+      </p:grpSpPr>
+      <p:sp>
+        <p:nvSpPr>
+          <p:cNvPr id="2" name="Slide Image Placeholder 1"/>
+          <p:cNvSpPr>
+            <a:spLocks noGrp="1" noRot="1" noChangeAspect="1"/>
+          </p:cNvSpPr>
+          <p:nvPr>
+            <p:ph type="sldImg"/>
+          </p:nvPr>
+        </p:nvSpPr>
+        <p:spPr/>
+      </p:sp>
+      <p:sp>
+        <p:nvSpPr>
+          <p:cNvPr id="3" name="Notes Placeholder 2"/>
+          <p:cNvSpPr>
+            <a:spLocks noGrp="1"/>
+          </p:cNvSpPr>
+          <p:nvPr>
+            <p:ph type="body" idx="1"/>
+          </p:nvPr>
+        </p:nvSpPr>
+        <p:spPr/>
+        <p:txBody>
+          <a:bodyPr/>
+          <a:lstStyle/>
+          <a:p>
+            <a:pPr marL="0" marR="0" indent="0" algn="l" defTabSz="457200" rtl="0" eaLnBrk="1" fontAlgn="auto" latinLnBrk="0" hangingPunct="1">
+              <a:lnSpc>
+                <a:spcPct val="100000"/>
+              </a:lnSpc>
+              <a:spcBef>
+                <a:spcPts val="0"/>
+              </a:spcBef>
+              <a:spcAft>
+                <a:spcPts val="0"/>
+              </a:spcAft>
+              <a:buClrTx/>
+              <a:buSzTx/>
+              <a:buFontTx/>
+              <a:buNone/>
+              <a:tabLst/>
+              <a:defRPr/>
+            </a:pPr>
+            <a:endParaRPr lang="en-US" sz="1200" baseline="0" dirty="0" smtClean="0">
+              <a:solidFill>
+                <a:prstClr val="black"/>
+              </a:solidFill>
+              <a:latin typeface="ArialMT"/>
+            </a:endParaRPr>
+          </a:p>
+        </p:txBody>
+      </p:sp>
+      <p:sp>
+        <p:nvSpPr>
+          <p:cNvPr id="4" name="Slide Number Placeholder 3"/>
+          <p:cNvSpPr>
+            <a:spLocks noGrp="1"/>
+          </p:cNvSpPr>
+          <p:nvPr>
+            <p:ph type="sldNum" sz="quarter" idx="10"/>
+          </p:nvPr>
+        </p:nvSpPr>
+        <p:spPr/>
+        <p:txBody>
+          <a:bodyPr/>
+          <a:lstStyle/>
+          <a:p>
+            <a:fld id="{ADD4B5B7-85EF-4E48-AC80-2380FACD9C23}" type="slidenum">
+              <a:rPr lang="en-US" smtClean="0"/>
+              <a:t>11</a:t>
+            </a:fld>
+            <a:endParaRPr lang="en-US"/>
+          </a:p>
+        </p:txBody>
+      </p:sp>
+    </p:spTree>
+    <p:extLst>
+      <p:ext uri="{BB962C8B-B14F-4D97-AF65-F5344CB8AC3E}">
+        <p14:creationId xmlns:p14="http://schemas.microsoft.com/office/powerpoint/2010/main" val="645762702"/>
+      </p:ext>
+    </p:extLst>
+  </p:cSld>
+  <p:clrMapOvr>
+    <a:masterClrMapping/>
+  </p:clrMapOvr>
+</p:notes>
+</file>
+
+<file path=ppt/notesSlides/notesSlide12.xml><?xml version="1.0" encoding="utf-8"?>
+<p:notes xmlns:a="http://schemas.openxmlformats.org/drawingml/2006/main" xmlns:r="http://schemas.openxmlformats.org/officeDocument/2006/relationships" xmlns:p="http://schemas.openxmlformats.org/presentationml/2006/main">
+  <p:cSld>
+    <p:spTree>
+      <p:nvGrpSpPr>
+        <p:cNvPr id="1" name=""/>
+        <p:cNvGrpSpPr/>
+        <p:nvPr/>
+      </p:nvGrpSpPr>
+      <p:grpSpPr>
+        <a:xfrm>
+          <a:off x="0" y="0"/>
+          <a:ext cx="0" cy="0"/>
+          <a:chOff x="0" y="0"/>
+          <a:chExt cx="0" cy="0"/>
+        </a:xfrm>
+      </p:grpSpPr>
+      <p:sp>
+        <p:nvSpPr>
+          <p:cNvPr id="2" name="Slide Image Placeholder 1"/>
+          <p:cNvSpPr>
+            <a:spLocks noGrp="1" noRot="1" noChangeAspect="1"/>
+          </p:cNvSpPr>
+          <p:nvPr>
+            <p:ph type="sldImg"/>
+          </p:nvPr>
+        </p:nvSpPr>
+        <p:spPr/>
+      </p:sp>
+      <p:sp>
+        <p:nvSpPr>
+          <p:cNvPr id="3" name="Notes Placeholder 2"/>
+          <p:cNvSpPr>
+            <a:spLocks noGrp="1"/>
+          </p:cNvSpPr>
+          <p:nvPr>
+            <p:ph type="body" idx="1"/>
+          </p:nvPr>
+        </p:nvSpPr>
+        <p:spPr/>
+        <p:txBody>
+          <a:bodyPr/>
+          <a:lstStyle/>
+          <a:p>
+            <a:r>
+              <a:rPr lang="en-US" dirty="0" smtClean="0"/>
+              <a:t>~45</a:t>
+            </a:r>
+            <a:r>
+              <a:rPr lang="en-US" baseline="0" dirty="0" smtClean="0"/>
+              <a:t> min?</a:t>
+            </a:r>
+            <a:endParaRPr lang="en-US" dirty="0"/>
+          </a:p>
+        </p:txBody>
+      </p:sp>
+      <p:sp>
+        <p:nvSpPr>
+          <p:cNvPr id="4" name="Slide Number Placeholder 3"/>
+          <p:cNvSpPr>
+            <a:spLocks noGrp="1"/>
+          </p:cNvSpPr>
+          <p:nvPr>
+            <p:ph type="sldNum" sz="quarter" idx="10"/>
+          </p:nvPr>
+        </p:nvSpPr>
+        <p:spPr/>
+        <p:txBody>
+          <a:bodyPr/>
+          <a:lstStyle/>
+          <a:p>
+            <a:fld id="{ADD4B5B7-85EF-4E48-AC80-2380FACD9C23}" type="slidenum">
+              <a:rPr lang="en-US" smtClean="0"/>
+              <a:t>12</a:t>
+            </a:fld>
+            <a:endParaRPr lang="en-US"/>
+          </a:p>
+        </p:txBody>
+      </p:sp>
+    </p:spTree>
+    <p:extLst>
+      <p:ext uri="{BB962C8B-B14F-4D97-AF65-F5344CB8AC3E}">
+        <p14:creationId xmlns:p14="http://schemas.microsoft.com/office/powerpoint/2010/main" val="158773868"/>
+      </p:ext>
+    </p:extLst>
+  </p:cSld>
+  <p:clrMapOvr>
+    <a:masterClrMapping/>
+  </p:clrMapOvr>
+</p:notes>
+</file>
+
+<file path=ppt/notesSlides/notesSlide13.xml><?xml version="1.0" encoding="utf-8"?>
+<p:notes xmlns:a="http://schemas.openxmlformats.org/drawingml/2006/main" xmlns:r="http://schemas.openxmlformats.org/officeDocument/2006/relationships" xmlns:p="http://schemas.openxmlformats.org/presentationml/2006/main">
+  <p:cSld>
+    <p:spTree>
+      <p:nvGrpSpPr>
+        <p:cNvPr id="1" name=""/>
+        <p:cNvGrpSpPr/>
+        <p:nvPr/>
+      </p:nvGrpSpPr>
+      <p:grpSpPr>
+        <a:xfrm>
+          <a:off x="0" y="0"/>
+          <a:ext cx="0" cy="0"/>
+          <a:chOff x="0" y="0"/>
+          <a:chExt cx="0" cy="0"/>
+        </a:xfrm>
+      </p:grpSpPr>
+      <p:sp>
+        <p:nvSpPr>
+          <p:cNvPr id="2" name="Slide Image Placeholder 1"/>
+          <p:cNvSpPr>
+            <a:spLocks noGrp="1" noRot="1" noChangeAspect="1"/>
+          </p:cNvSpPr>
+          <p:nvPr>
+            <p:ph type="sldImg"/>
+          </p:nvPr>
+        </p:nvSpPr>
+        <p:spPr/>
+      </p:sp>
+      <p:sp>
+        <p:nvSpPr>
+          <p:cNvPr id="3" name="Notes Placeholder 2"/>
+          <p:cNvSpPr>
+            <a:spLocks noGrp="1"/>
+          </p:cNvSpPr>
+          <p:nvPr>
+            <p:ph type="body" idx="1"/>
+          </p:nvPr>
+        </p:nvSpPr>
+        <p:spPr/>
+        <p:txBody>
+          <a:bodyPr/>
+          <a:lstStyle/>
+          <a:p>
+            <a:r>
+              <a:rPr lang="en-US" dirty="0" smtClean="0"/>
+              <a:t>~45</a:t>
+            </a:r>
+            <a:r>
+              <a:rPr lang="en-US" baseline="0" dirty="0" smtClean="0"/>
+              <a:t> min?</a:t>
+            </a:r>
+            <a:endParaRPr lang="en-US" dirty="0"/>
+          </a:p>
+        </p:txBody>
+      </p:sp>
+      <p:sp>
+        <p:nvSpPr>
+          <p:cNvPr id="4" name="Slide Number Placeholder 3"/>
+          <p:cNvSpPr>
+            <a:spLocks noGrp="1"/>
+          </p:cNvSpPr>
+          <p:nvPr>
+            <p:ph type="sldNum" sz="quarter" idx="10"/>
+          </p:nvPr>
+        </p:nvSpPr>
+        <p:spPr/>
+        <p:txBody>
+          <a:bodyPr/>
+          <a:lstStyle/>
+          <a:p>
+            <a:fld id="{ADD4B5B7-85EF-4E48-AC80-2380FACD9C23}" type="slidenum">
+              <a:rPr lang="en-US" smtClean="0"/>
+              <a:t>13</a:t>
             </a:fld>
             <a:endParaRPr lang="en-US"/>
           </a:p>
@@ -774,11 +1063,11 @@
           <a:p>
             <a:r>
               <a:rPr lang="en-US" dirty="0" smtClean="0"/>
-              <a:t>~45</a:t>
+              <a:t>All of our classes will involve some hands-on work</a:t>
             </a:r>
             <a:r>
               <a:rPr lang="en-US" baseline="0" dirty="0" smtClean="0"/>
-              <a:t> min?</a:t>
+              <a:t> (in the exercises section)</a:t>
             </a:r>
             <a:endParaRPr lang="en-US" dirty="0"/>
           </a:p>
@@ -810,7 +1099,7 @@
     </p:spTree>
     <p:extLst>
       <p:ext uri="{BB962C8B-B14F-4D97-AF65-F5344CB8AC3E}">
-        <p14:creationId xmlns:p14="http://schemas.microsoft.com/office/powerpoint/2010/main" val="158773868"/>
+        <p14:creationId xmlns:p14="http://schemas.microsoft.com/office/powerpoint/2010/main" val="184081147"/>
       </p:ext>
     </p:extLst>
   </p:cSld>
@@ -864,32 +1153,15 @@
           <a:bodyPr/>
           <a:lstStyle/>
           <a:p>
-            <a:pPr marL="0" marR="0" indent="0" algn="l" defTabSz="457200" rtl="0" eaLnBrk="1" fontAlgn="auto" latinLnBrk="0" hangingPunct="1">
-              <a:lnSpc>
-                <a:spcPct val="100000"/>
-              </a:lnSpc>
-              <a:spcBef>
-                <a:spcPts val="0"/>
-              </a:spcBef>
-              <a:spcAft>
-                <a:spcPts val="0"/>
-              </a:spcAft>
-              <a:buClrTx/>
-              <a:buSzTx/>
-              <a:buFontTx/>
-              <a:buNone/>
-              <a:tabLst/>
-              <a:defRPr/>
-            </a:pPr>
-            <a:r>
-              <a:rPr lang="en-US" sz="1200" baseline="0" dirty="0" smtClean="0">
-                <a:solidFill>
-                  <a:prstClr val="black"/>
-                </a:solidFill>
-                <a:latin typeface="ArialMT"/>
-              </a:rPr>
-              <a:t>So far so good</a:t>
-            </a:r>
+            <a:r>
+              <a:rPr lang="en-US" dirty="0" smtClean="0"/>
+              <a:t>~45</a:t>
+            </a:r>
+            <a:r>
+              <a:rPr lang="en-US" baseline="0" dirty="0" smtClean="0"/>
+              <a:t> min?</a:t>
+            </a:r>
+            <a:endParaRPr lang="en-US" dirty="0"/>
           </a:p>
         </p:txBody>
       </p:sp>
@@ -919,7 +1191,7 @@
     </p:spTree>
     <p:extLst>
       <p:ext uri="{BB962C8B-B14F-4D97-AF65-F5344CB8AC3E}">
-        <p14:creationId xmlns:p14="http://schemas.microsoft.com/office/powerpoint/2010/main" val="645762702"/>
+        <p14:creationId xmlns:p14="http://schemas.microsoft.com/office/powerpoint/2010/main" val="158773868"/>
       </p:ext>
     </p:extLst>
   </p:cSld>
@@ -973,32 +1245,11 @@
           <a:bodyPr/>
           <a:lstStyle/>
           <a:p>
-            <a:pPr marL="0" marR="0" indent="0" algn="l" defTabSz="457200" rtl="0" eaLnBrk="1" fontAlgn="auto" latinLnBrk="0" hangingPunct="1">
-              <a:lnSpc>
-                <a:spcPct val="100000"/>
-              </a:lnSpc>
-              <a:spcBef>
-                <a:spcPts val="0"/>
-              </a:spcBef>
-              <a:spcAft>
-                <a:spcPts val="0"/>
-              </a:spcAft>
-              <a:buClrTx/>
-              <a:buSzTx/>
-              <a:buFontTx/>
-              <a:buNone/>
-              <a:tabLst/>
-              <a:defRPr/>
-            </a:pPr>
-            <a:r>
-              <a:rPr lang="en-US" sz="1200" baseline="0" dirty="0" smtClean="0">
-                <a:solidFill>
-                  <a:prstClr val="black"/>
-                </a:solidFill>
-                <a:latin typeface="ArialMT"/>
-              </a:rPr>
-              <a:t>Q: Does everyone know what the mean is?</a:t>
-            </a:r>
+            <a:r>
+              <a:rPr lang="en-US" dirty="0" smtClean="0"/>
+              <a:t>~15-20 min for this section?</a:t>
+            </a:r>
+            <a:endParaRPr lang="en-US" dirty="0"/>
           </a:p>
         </p:txBody>
       </p:sp>
@@ -1028,7 +1279,7 @@
     </p:spTree>
     <p:extLst>
       <p:ext uri="{BB962C8B-B14F-4D97-AF65-F5344CB8AC3E}">
-        <p14:creationId xmlns:p14="http://schemas.microsoft.com/office/powerpoint/2010/main" val="645762702"/>
+        <p14:creationId xmlns:p14="http://schemas.microsoft.com/office/powerpoint/2010/main" val="158773868"/>
       </p:ext>
     </p:extLst>
   </p:cSld>
@@ -1106,35 +1357,7 @@
                 </a:solidFill>
                 <a:latin typeface="ArialMT"/>
               </a:rPr>
-              <a:t>Q: Does anyone know what the variance is?</a:t>
-            </a:r>
-          </a:p>
-          <a:p>
-            <a:pPr marL="0" marR="0" indent="0" algn="l" defTabSz="457200" rtl="0" eaLnBrk="1" fontAlgn="auto" latinLnBrk="0" hangingPunct="1">
-              <a:lnSpc>
-                <a:spcPct val="100000"/>
-              </a:lnSpc>
-              <a:spcBef>
-                <a:spcPts val="0"/>
-              </a:spcBef>
-              <a:spcAft>
-                <a:spcPts val="0"/>
-              </a:spcAft>
-              <a:buClrTx/>
-              <a:buSzTx/>
-              <a:buFontTx/>
-              <a:buNone/>
-              <a:tabLst/>
-              <a:defRPr/>
-            </a:pPr>
-            <a:r>
-              <a:rPr lang="en-US" sz="1200" baseline="0" dirty="0" smtClean="0">
-                <a:solidFill>
-                  <a:prstClr val="black"/>
-                </a:solidFill>
-                <a:latin typeface="ArialMT"/>
-              </a:rPr>
-              <a:t>Q: More importantly, do you know what the variance tells you?</a:t>
+              <a:t>So far so good</a:t>
             </a:r>
           </a:p>
         </p:txBody>
@@ -1243,71 +1466,7 @@
                 </a:solidFill>
                 <a:latin typeface="ArialMT"/>
               </a:rPr>
-              <a:t>Q: Does everyone know what </a:t>
-            </a:r>
-            <a:r>
-              <a:rPr lang="en-US" sz="1200" baseline="0" dirty="0" err="1" smtClean="0">
-                <a:solidFill>
-                  <a:prstClr val="black"/>
-                </a:solidFill>
-                <a:latin typeface="ArialMT"/>
-              </a:rPr>
-              <a:t>correl</a:t>
-            </a:r>
-            <a:r>
-              <a:rPr lang="en-US" sz="1200" baseline="0" dirty="0" smtClean="0">
-                <a:solidFill>
-                  <a:prstClr val="black"/>
-                </a:solidFill>
-                <a:latin typeface="ArialMT"/>
-              </a:rPr>
-              <a:t> is?</a:t>
-            </a:r>
-          </a:p>
-          <a:p>
-            <a:pPr marL="0" marR="0" indent="0" algn="l" defTabSz="457200" rtl="0" eaLnBrk="1" fontAlgn="auto" latinLnBrk="0" hangingPunct="1">
-              <a:lnSpc>
-                <a:spcPct val="100000"/>
-              </a:lnSpc>
-              <a:spcBef>
-                <a:spcPts val="0"/>
-              </a:spcBef>
-              <a:spcAft>
-                <a:spcPts val="0"/>
-              </a:spcAft>
-              <a:buClrTx/>
-              <a:buSzTx/>
-              <a:buFontTx/>
-              <a:buNone/>
-              <a:tabLst/>
-              <a:defRPr/>
-            </a:pPr>
-            <a:r>
-              <a:rPr lang="en-US" sz="1200" baseline="0" dirty="0" smtClean="0">
-                <a:solidFill>
-                  <a:prstClr val="black"/>
-                </a:solidFill>
-                <a:latin typeface="ArialMT"/>
-              </a:rPr>
-              <a:t>Q: More importantly, do you know what </a:t>
-            </a:r>
-            <a:r>
-              <a:rPr lang="en-US" sz="1200" baseline="0" dirty="0" err="1" smtClean="0">
-                <a:solidFill>
-                  <a:prstClr val="black"/>
-                </a:solidFill>
-                <a:latin typeface="ArialMT"/>
-              </a:rPr>
-              <a:t>correl</a:t>
-            </a:r>
-            <a:r>
-              <a:rPr lang="en-US" sz="1200" baseline="0" dirty="0" smtClean="0">
-                <a:solidFill>
-                  <a:prstClr val="black"/>
-                </a:solidFill>
-                <a:latin typeface="ArialMT"/>
-              </a:rPr>
-              <a:t> tells you?</a:t>
+              <a:t>Q: Does everyone know what the mean is?</a:t>
             </a:r>
           </a:p>
         </p:txBody>
@@ -1416,7 +1575,7 @@
                 </a:solidFill>
                 <a:latin typeface="ArialMT"/>
               </a:rPr>
-              <a:t>Q: Does everyone know what a line of best fit is?</a:t>
+              <a:t>Q: Does anyone know what the variance is?</a:t>
             </a:r>
           </a:p>
           <a:p>
@@ -1444,7 +1603,7 @@
                 </a:solidFill>
                 <a:latin typeface="ArialMT"/>
               </a:rPr>
-              <a:t>Q: More importantly, do you know what the line of best fit tells you? (note: we will look at this next time)</a:t>
+              <a:t>Q: More importantly, do you know what the variance tells you?</a:t>
             </a:r>
           </a:p>
         </p:txBody>
@@ -1546,12 +1705,79 @@
               <a:tabLst/>
               <a:defRPr/>
             </a:pPr>
-            <a:endParaRPr lang="en-US" sz="1200" baseline="0" dirty="0" smtClean="0">
-              <a:solidFill>
-                <a:prstClr val="black"/>
-              </a:solidFill>
-              <a:latin typeface="ArialMT"/>
-            </a:endParaRPr>
+            <a:r>
+              <a:rPr lang="en-US" sz="1200" baseline="0" dirty="0" smtClean="0">
+                <a:solidFill>
+                  <a:prstClr val="black"/>
+                </a:solidFill>
+                <a:latin typeface="ArialMT"/>
+              </a:rPr>
+              <a:t>Q: Does everyone know what </a:t>
+            </a:r>
+            <a:r>
+              <a:rPr lang="en-US" sz="1200" baseline="0" dirty="0" err="1" smtClean="0">
+                <a:solidFill>
+                  <a:prstClr val="black"/>
+                </a:solidFill>
+                <a:latin typeface="ArialMT"/>
+              </a:rPr>
+              <a:t>correl</a:t>
+            </a:r>
+            <a:r>
+              <a:rPr lang="en-US" sz="1200" baseline="0" dirty="0" smtClean="0">
+                <a:solidFill>
+                  <a:prstClr val="black"/>
+                </a:solidFill>
+                <a:latin typeface="ArialMT"/>
+              </a:rPr>
+              <a:t> is?</a:t>
+            </a:r>
+          </a:p>
+          <a:p>
+            <a:pPr marL="0" marR="0" indent="0" algn="l" defTabSz="457200" rtl="0" eaLnBrk="1" fontAlgn="auto" latinLnBrk="0" hangingPunct="1">
+              <a:lnSpc>
+                <a:spcPct val="100000"/>
+              </a:lnSpc>
+              <a:spcBef>
+                <a:spcPts val="0"/>
+              </a:spcBef>
+              <a:spcAft>
+                <a:spcPts val="0"/>
+              </a:spcAft>
+              <a:buClrTx/>
+              <a:buSzTx/>
+              <a:buFontTx/>
+              <a:buNone/>
+              <a:tabLst/>
+              <a:defRPr/>
+            </a:pPr>
+            <a:r>
+              <a:rPr lang="en-US" sz="1200" baseline="0" dirty="0" smtClean="0">
+                <a:solidFill>
+                  <a:prstClr val="black"/>
+                </a:solidFill>
+                <a:latin typeface="ArialMT"/>
+              </a:rPr>
+              <a:t>Q: More importantly, do you know what </a:t>
+            </a:r>
+            <a:r>
+              <a:rPr lang="en-US" sz="1200" baseline="0" dirty="0" err="1" smtClean="0">
+                <a:solidFill>
+                  <a:prstClr val="black"/>
+                </a:solidFill>
+                <a:latin typeface="ArialMT"/>
+              </a:rPr>
+              <a:t>correl</a:t>
+            </a:r>
+            <a:r>
+              <a:rPr lang="en-US" sz="1200" baseline="0" dirty="0" smtClean="0">
+                <a:solidFill>
+                  <a:prstClr val="black"/>
+                </a:solidFill>
+                <a:latin typeface="ArialMT"/>
+              </a:rPr>
+              <a:t> tells you?</a:t>
+            </a:r>
           </a:p>
         </p:txBody>
       </p:sp>
@@ -1652,12 +1878,43 @@
               <a:tabLst/>
               <a:defRPr/>
             </a:pPr>
-            <a:endParaRPr lang="en-US" sz="1200" baseline="0" dirty="0" smtClean="0">
-              <a:solidFill>
-                <a:prstClr val="black"/>
-              </a:solidFill>
-              <a:latin typeface="ArialMT"/>
-            </a:endParaRPr>
+            <a:r>
+              <a:rPr lang="en-US" sz="1200" baseline="0" dirty="0" smtClean="0">
+                <a:solidFill>
+                  <a:prstClr val="black"/>
+                </a:solidFill>
+                <a:latin typeface="ArialMT"/>
+              </a:rPr>
+              <a:t>Q: Does everyone know what a line of best fit is?</a:t>
+            </a:r>
+          </a:p>
+          <a:p>
+            <a:pPr marL="0" marR="0" indent="0" algn="l" defTabSz="457200" rtl="0" eaLnBrk="1" fontAlgn="auto" latinLnBrk="0" hangingPunct="1">
+              <a:lnSpc>
+                <a:spcPct val="100000"/>
+              </a:lnSpc>
+              <a:spcBef>
+                <a:spcPts val="0"/>
+              </a:spcBef>
+              <a:spcAft>
+                <a:spcPts val="0"/>
+              </a:spcAft>
+              <a:buClrTx/>
+              <a:buSzTx/>
+              <a:buFontTx/>
+              <a:buNone/>
+              <a:tabLst/>
+              <a:defRPr/>
+            </a:pPr>
+            <a:r>
+              <a:rPr lang="en-US" sz="1200" baseline="0" dirty="0" smtClean="0">
+                <a:solidFill>
+                  <a:prstClr val="black"/>
+                </a:solidFill>
+                <a:latin typeface="ArialMT"/>
+              </a:rPr>
+              <a:t>Q: More importantly, do you know what the line of best fit tells you? (note: we will look at this next time)</a:t>
+            </a:r>
           </a:p>
         </p:txBody>
       </p:sp>
@@ -1893,6 +2150,493 @@
 
 <file path=ppt/slideLayouts/slideLayout10.xml><?xml version="1.0" encoding="utf-8"?>
 <p:sldLayout xmlns:a="http://schemas.openxmlformats.org/drawingml/2006/main" xmlns:r="http://schemas.openxmlformats.org/officeDocument/2006/relationships" xmlns:p="http://schemas.openxmlformats.org/presentationml/2006/main" preserve="1" userDrawn="1">
+  <p:cSld name="Smart Phone Image Slide">
+    <p:spTree>
+      <p:nvGrpSpPr>
+        <p:cNvPr id="1" name=""/>
+        <p:cNvGrpSpPr/>
+        <p:nvPr/>
+      </p:nvGrpSpPr>
+      <p:grpSpPr>
+        <a:xfrm>
+          <a:off x="0" y="0"/>
+          <a:ext cx="0" cy="0"/>
+          <a:chOff x="0" y="0"/>
+          <a:chExt cx="0" cy="0"/>
+        </a:xfrm>
+      </p:grpSpPr>
+      <p:pic>
+        <p:nvPicPr>
+          <p:cNvPr id="6" name="Picture 4"/>
+          <p:cNvPicPr>
+            <a:picLocks noChangeAspect="1"/>
+          </p:cNvPicPr>
+          <p:nvPr userDrawn="1"/>
+        </p:nvPicPr>
+        <p:blipFill>
+          <a:blip r:embed="rId2">
+            <a:extLst>
+              <a:ext uri="{28A0092B-C50C-407E-A947-70E740481C1C}">
+                <a14:useLocalDpi xmlns:a14="http://schemas.microsoft.com/office/drawing/2010/main" val="0"/>
+              </a:ext>
+            </a:extLst>
+          </a:blip>
+          <a:srcRect t="2654" b="9073"/>
+          <a:stretch>
+            <a:fillRect/>
+          </a:stretch>
+        </p:blipFill>
+        <p:spPr bwMode="auto">
+          <a:xfrm>
+            <a:off x="719138" y="1049338"/>
+            <a:ext cx="7586662" cy="3873500"/>
+          </a:xfrm>
+          <a:prstGeom prst="rect">
+            <a:avLst/>
+          </a:prstGeom>
+          <a:noFill/>
+          <a:ln>
+            <a:noFill/>
+          </a:ln>
+          <a:extLst>
+            <a:ext uri="{909E8E84-426E-40dd-AFC4-6F175D3DCCD1}">
+              <a14:hiddenFill xmlns:a14="http://schemas.microsoft.com/office/drawing/2010/main">
+                <a:solidFill>
+                  <a:srgbClr val="FFFFFF"/>
+                </a:solidFill>
+              </a14:hiddenFill>
+            </a:ext>
+            <a:ext uri="{91240B29-F687-4f45-9708-019B960494DF}">
+              <a14:hiddenLine xmlns:a14="http://schemas.microsoft.com/office/drawing/2010/main" w="9525">
+                <a:solidFill>
+                  <a:srgbClr val="000000"/>
+                </a:solidFill>
+                <a:miter lim="800000"/>
+                <a:headEnd/>
+                <a:tailEnd/>
+              </a14:hiddenLine>
+            </a:ext>
+          </a:extLst>
+        </p:spPr>
+      </p:pic>
+      <p:sp>
+        <p:nvSpPr>
+          <p:cNvPr id="8" name="Line 1"/>
+          <p:cNvSpPr>
+            <a:spLocks noChangeShapeType="1"/>
+          </p:cNvSpPr>
+          <p:nvPr userDrawn="1"/>
+        </p:nvSpPr>
+        <p:spPr bwMode="auto">
+          <a:xfrm>
+            <a:off x="457200" y="487363"/>
+            <a:ext cx="8448675" cy="0"/>
+          </a:xfrm>
+          <a:prstGeom prst="line">
+            <a:avLst/>
+          </a:prstGeom>
+          <a:noFill/>
+          <a:ln w="6350">
+            <a:solidFill>
+              <a:schemeClr val="tx1"/>
+            </a:solidFill>
+            <a:miter lim="800000"/>
+            <a:headEnd/>
+            <a:tailEnd/>
+          </a:ln>
+          <a:extLst>
+            <a:ext uri="{909E8E84-426E-40dd-AFC4-6F175D3DCCD1}">
+              <a14:hiddenFill xmlns:a14="http://schemas.microsoft.com/office/drawing/2010/main">
+                <a:noFill/>
+              </a14:hiddenFill>
+            </a:ext>
+          </a:extLst>
+        </p:spPr>
+        <p:txBody>
+          <a:bodyPr lIns="0" tIns="0" rIns="0" bIns="0"/>
+          <a:lstStyle/>
+          <a:p>
+            <a:endParaRPr lang="en-US"/>
+          </a:p>
+        </p:txBody>
+      </p:sp>
+      <p:sp>
+        <p:nvSpPr>
+          <p:cNvPr id="9" name="Line 2"/>
+          <p:cNvSpPr>
+            <a:spLocks noChangeShapeType="1"/>
+          </p:cNvSpPr>
+          <p:nvPr userDrawn="1"/>
+        </p:nvSpPr>
+        <p:spPr bwMode="auto">
+          <a:xfrm>
+            <a:off x="457200" y="908050"/>
+            <a:ext cx="8448675" cy="0"/>
+          </a:xfrm>
+          <a:prstGeom prst="line">
+            <a:avLst/>
+          </a:prstGeom>
+          <a:noFill/>
+          <a:ln w="6350">
+            <a:solidFill>
+              <a:schemeClr val="tx1"/>
+            </a:solidFill>
+            <a:miter lim="800000"/>
+            <a:headEnd/>
+            <a:tailEnd/>
+          </a:ln>
+          <a:extLst>
+            <a:ext uri="{909E8E84-426E-40dd-AFC4-6F175D3DCCD1}">
+              <a14:hiddenFill xmlns:a14="http://schemas.microsoft.com/office/drawing/2010/main">
+                <a:noFill/>
+              </a14:hiddenFill>
+            </a:ext>
+          </a:extLst>
+        </p:spPr>
+        <p:txBody>
+          <a:bodyPr lIns="0" tIns="0" rIns="0" bIns="0"/>
+          <a:lstStyle/>
+          <a:p>
+            <a:endParaRPr lang="en-US"/>
+          </a:p>
+        </p:txBody>
+      </p:sp>
+      <p:sp>
+        <p:nvSpPr>
+          <p:cNvPr id="5" name="Content Placeholder 5"/>
+          <p:cNvSpPr>
+            <a:spLocks noGrp="1"/>
+          </p:cNvSpPr>
+          <p:nvPr>
+            <p:ph sz="quarter" idx="11"/>
+          </p:nvPr>
+        </p:nvSpPr>
+        <p:spPr>
+          <a:xfrm>
+            <a:off x="371265" y="495300"/>
+            <a:ext cx="7129671" cy="304800"/>
+          </a:xfrm>
+          <a:prstGeom prst="rect">
+            <a:avLst/>
+          </a:prstGeom>
+        </p:spPr>
+        <p:txBody>
+          <a:bodyPr vert="horz"/>
+          <a:lstStyle>
+            <a:lvl1pPr marL="0" marR="0" indent="0" algn="l" defTabSz="914400" rtl="0" eaLnBrk="0" fontAlgn="base" latinLnBrk="0" hangingPunct="0">
+              <a:lnSpc>
+                <a:spcPts val="2450"/>
+              </a:lnSpc>
+              <a:spcBef>
+                <a:spcPct val="0"/>
+              </a:spcBef>
+              <a:spcAft>
+                <a:spcPct val="0"/>
+              </a:spcAft>
+              <a:buClrTx/>
+              <a:buSzPct val="69000"/>
+              <a:buFont typeface="Lucida Grande" charset="0"/>
+              <a:buNone/>
+              <a:tabLst/>
+              <a:defRPr sz="2300" b="1" cap="all">
+                <a:latin typeface="+mj-lt"/>
+              </a:defRPr>
+            </a:lvl1pPr>
+            <a:lvl2pPr>
+              <a:defRPr b="1">
+                <a:latin typeface="+mj-lt"/>
+              </a:defRPr>
+            </a:lvl2pPr>
+            <a:lvl3pPr>
+              <a:defRPr b="1">
+                <a:latin typeface="+mj-lt"/>
+              </a:defRPr>
+            </a:lvl3pPr>
+            <a:lvl4pPr>
+              <a:defRPr b="1">
+                <a:latin typeface="+mj-lt"/>
+              </a:defRPr>
+            </a:lvl4pPr>
+            <a:lvl5pPr>
+              <a:defRPr b="1">
+                <a:latin typeface="+mj-lt"/>
+              </a:defRPr>
+            </a:lvl5pPr>
+          </a:lstStyle>
+          <a:p>
+            <a:pPr lvl="0"/>
+            <a:r>
+              <a:rPr lang="en-US" smtClean="0"/>
+              <a:t>Click to edit Master text styles</a:t>
+            </a:r>
+          </a:p>
+        </p:txBody>
+      </p:sp>
+      <p:sp>
+        <p:nvSpPr>
+          <p:cNvPr id="7" name="Content Placeholder 2"/>
+          <p:cNvSpPr>
+            <a:spLocks noGrp="1"/>
+          </p:cNvSpPr>
+          <p:nvPr>
+            <p:ph sz="half" idx="12"/>
+          </p:nvPr>
+        </p:nvSpPr>
+        <p:spPr>
+          <a:xfrm>
+            <a:off x="1313737" y="1419408"/>
+            <a:ext cx="1677751" cy="2870892"/>
+          </a:xfrm>
+          <a:prstGeom prst="rect">
+            <a:avLst/>
+          </a:prstGeom>
+        </p:spPr>
+        <p:txBody>
+          <a:bodyPr vert="horz" lIns="0" tIns="32914" rIns="65828" bIns="32914"/>
+          <a:lstStyle>
+            <a:lvl1pPr marL="0" indent="0">
+              <a:spcBef>
+                <a:spcPts val="720"/>
+              </a:spcBef>
+              <a:buNone/>
+              <a:defRPr sz="2000"/>
+            </a:lvl1pPr>
+            <a:lvl2pPr>
+              <a:spcBef>
+                <a:spcPts val="720"/>
+              </a:spcBef>
+              <a:defRPr sz="2000"/>
+            </a:lvl2pPr>
+            <a:lvl3pPr>
+              <a:spcBef>
+                <a:spcPts val="720"/>
+              </a:spcBef>
+              <a:defRPr sz="2000"/>
+            </a:lvl3pPr>
+            <a:lvl4pPr>
+              <a:spcBef>
+                <a:spcPts val="720"/>
+              </a:spcBef>
+              <a:defRPr sz="2000"/>
+            </a:lvl4pPr>
+            <a:lvl5pPr>
+              <a:spcBef>
+                <a:spcPts val="720"/>
+              </a:spcBef>
+              <a:defRPr sz="2000"/>
+            </a:lvl5pPr>
+            <a:lvl6pPr>
+              <a:defRPr sz="1300"/>
+            </a:lvl6pPr>
+            <a:lvl7pPr>
+              <a:defRPr sz="1300"/>
+            </a:lvl7pPr>
+            <a:lvl8pPr>
+              <a:defRPr sz="1300"/>
+            </a:lvl8pPr>
+            <a:lvl9pPr>
+              <a:defRPr sz="1300"/>
+            </a:lvl9pPr>
+          </a:lstStyle>
+          <a:p>
+            <a:pPr lvl="0"/>
+            <a:endParaRPr lang="en-US" dirty="0"/>
+          </a:p>
+        </p:txBody>
+      </p:sp>
+      <p:sp>
+        <p:nvSpPr>
+          <p:cNvPr id="10" name="Content Placeholder 2"/>
+          <p:cNvSpPr>
+            <a:spLocks noGrp="1"/>
+          </p:cNvSpPr>
+          <p:nvPr>
+            <p:ph sz="half" idx="13"/>
+          </p:nvPr>
+        </p:nvSpPr>
+        <p:spPr>
+          <a:xfrm>
+            <a:off x="3899979" y="1784167"/>
+            <a:ext cx="1629991" cy="2415208"/>
+          </a:xfrm>
+          <a:prstGeom prst="rect">
+            <a:avLst/>
+          </a:prstGeom>
+        </p:spPr>
+        <p:txBody>
+          <a:bodyPr vert="horz" lIns="0" tIns="32914" rIns="65828" bIns="32914"/>
+          <a:lstStyle>
+            <a:lvl1pPr marL="0" indent="0">
+              <a:spcBef>
+                <a:spcPts val="720"/>
+              </a:spcBef>
+              <a:buNone/>
+              <a:defRPr sz="2000"/>
+            </a:lvl1pPr>
+            <a:lvl2pPr>
+              <a:spcBef>
+                <a:spcPts val="720"/>
+              </a:spcBef>
+              <a:defRPr sz="2000"/>
+            </a:lvl2pPr>
+            <a:lvl3pPr>
+              <a:spcBef>
+                <a:spcPts val="720"/>
+              </a:spcBef>
+              <a:defRPr sz="2000"/>
+            </a:lvl3pPr>
+            <a:lvl4pPr>
+              <a:spcBef>
+                <a:spcPts val="720"/>
+              </a:spcBef>
+              <a:defRPr sz="2000"/>
+            </a:lvl4pPr>
+            <a:lvl5pPr>
+              <a:spcBef>
+                <a:spcPts val="720"/>
+              </a:spcBef>
+              <a:defRPr sz="2000"/>
+            </a:lvl5pPr>
+            <a:lvl6pPr>
+              <a:defRPr sz="1300"/>
+            </a:lvl6pPr>
+            <a:lvl7pPr>
+              <a:defRPr sz="1300"/>
+            </a:lvl7pPr>
+            <a:lvl8pPr>
+              <a:defRPr sz="1300"/>
+            </a:lvl8pPr>
+            <a:lvl9pPr>
+              <a:defRPr sz="1300"/>
+            </a:lvl9pPr>
+          </a:lstStyle>
+          <a:p>
+            <a:pPr lvl="0"/>
+            <a:endParaRPr lang="en-US" dirty="0"/>
+          </a:p>
+        </p:txBody>
+      </p:sp>
+      <p:sp>
+        <p:nvSpPr>
+          <p:cNvPr id="11" name="Content Placeholder 2"/>
+          <p:cNvSpPr>
+            <a:spLocks noGrp="1"/>
+          </p:cNvSpPr>
+          <p:nvPr>
+            <p:ph sz="half" idx="14"/>
+          </p:nvPr>
+        </p:nvSpPr>
+        <p:spPr>
+          <a:xfrm>
+            <a:off x="6386666" y="1490085"/>
+            <a:ext cx="1693292" cy="2815215"/>
+          </a:xfrm>
+          <a:prstGeom prst="rect">
+            <a:avLst/>
+          </a:prstGeom>
+        </p:spPr>
+        <p:txBody>
+          <a:bodyPr vert="horz" lIns="0" tIns="32914" rIns="65828" bIns="32914"/>
+          <a:lstStyle>
+            <a:lvl1pPr marL="0" indent="0">
+              <a:spcBef>
+                <a:spcPts val="720"/>
+              </a:spcBef>
+              <a:buNone/>
+              <a:defRPr sz="2000"/>
+            </a:lvl1pPr>
+            <a:lvl2pPr>
+              <a:spcBef>
+                <a:spcPts val="720"/>
+              </a:spcBef>
+              <a:defRPr sz="2000"/>
+            </a:lvl2pPr>
+            <a:lvl3pPr>
+              <a:spcBef>
+                <a:spcPts val="720"/>
+              </a:spcBef>
+              <a:defRPr sz="2000"/>
+            </a:lvl3pPr>
+            <a:lvl4pPr>
+              <a:spcBef>
+                <a:spcPts val="720"/>
+              </a:spcBef>
+              <a:defRPr sz="2000"/>
+            </a:lvl4pPr>
+            <a:lvl5pPr>
+              <a:spcBef>
+                <a:spcPts val="720"/>
+              </a:spcBef>
+              <a:defRPr sz="2000"/>
+            </a:lvl5pPr>
+            <a:lvl6pPr>
+              <a:defRPr sz="1300"/>
+            </a:lvl6pPr>
+            <a:lvl7pPr>
+              <a:defRPr sz="1300"/>
+            </a:lvl7pPr>
+            <a:lvl8pPr>
+              <a:defRPr sz="1300"/>
+            </a:lvl8pPr>
+            <a:lvl9pPr>
+              <a:defRPr sz="1300"/>
+            </a:lvl9pPr>
+          </a:lstStyle>
+          <a:p>
+            <a:pPr lvl="0"/>
+            <a:endParaRPr lang="en-US" dirty="0"/>
+          </a:p>
+        </p:txBody>
+      </p:sp>
+      <p:sp>
+        <p:nvSpPr>
+          <p:cNvPr id="12" name="Slide Number Placeholder 3"/>
+          <p:cNvSpPr>
+            <a:spLocks noGrp="1"/>
+          </p:cNvSpPr>
+          <p:nvPr>
+            <p:ph type="sldNum" sz="quarter" idx="15"/>
+          </p:nvPr>
+        </p:nvSpPr>
+        <p:spPr/>
+        <p:txBody>
+          <a:bodyPr/>
+          <a:lstStyle>
+            <a:lvl1pPr>
+              <a:defRPr/>
+            </a:lvl1pPr>
+          </a:lstStyle>
+          <a:p>
+            <a:pPr>
+              <a:defRPr/>
+            </a:pPr>
+            <a:fld id="{7ACDBDE2-F560-4B40-974D-A0F438C3299B}" type="slidenum">
+              <a:rPr lang="en-US"/>
+              <a:pPr>
+                <a:defRPr/>
+              </a:pPr>
+              <a:t>‹#›</a:t>
+            </a:fld>
+            <a:endParaRPr lang="en-US"/>
+          </a:p>
+        </p:txBody>
+      </p:sp>
+    </p:spTree>
+    <p:extLst>
+      <p:ext uri="{BB962C8B-B14F-4D97-AF65-F5344CB8AC3E}">
+        <p14:creationId xmlns:p14="http://schemas.microsoft.com/office/powerpoint/2010/main" val="2326723457"/>
+      </p:ext>
+    </p:extLst>
+  </p:cSld>
+  <p:clrMapOvr>
+    <a:masterClrMapping/>
+  </p:clrMapOvr>
+  <p:transition xmlns:p14="http://schemas.microsoft.com/office/powerpoint/2010/main"/>
+</p:sldLayout>
+</file>
+
+<file path=ppt/slideLayouts/slideLayout11.xml><?xml version="1.0" encoding="utf-8"?>
+<p:sldLayout xmlns:a="http://schemas.openxmlformats.org/drawingml/2006/main" xmlns:r="http://schemas.openxmlformats.org/officeDocument/2006/relationships" xmlns:p="http://schemas.openxmlformats.org/presentationml/2006/main" preserve="1" userDrawn="1">
   <p:cSld name="Exercise Slide">
     <p:spTree>
       <p:nvGrpSpPr>
@@ -2846,7 +3590,7 @@
 </p:sldLayout>
 </file>
 
-<file path=ppt/slideLayouts/slideLayout11.xml><?xml version="1.0" encoding="utf-8"?>
+<file path=ppt/slideLayouts/slideLayout12.xml><?xml version="1.0" encoding="utf-8"?>
 <p:sldLayout xmlns:a="http://schemas.openxmlformats.org/drawingml/2006/main" xmlns:r="http://schemas.openxmlformats.org/officeDocument/2006/relationships" xmlns:p="http://schemas.openxmlformats.org/presentationml/2006/main" preserve="1" userDrawn="1">
   <p:cSld name="case study">
     <p:spTree>
@@ -3403,7 +4147,7 @@
 </p:sldLayout>
 </file>
 
-<file path=ppt/slideLayouts/slideLayout12.xml><?xml version="1.0" encoding="utf-8"?>
+<file path=ppt/slideLayouts/slideLayout13.xml><?xml version="1.0" encoding="utf-8"?>
 <p:sldLayout xmlns:a="http://schemas.openxmlformats.org/drawingml/2006/main" xmlns:r="http://schemas.openxmlformats.org/officeDocument/2006/relationships" xmlns:p="http://schemas.openxmlformats.org/presentationml/2006/main" preserve="1" userDrawn="1">
   <p:cSld name="Two Content">
     <p:spTree>
@@ -3703,7 +4447,7 @@
 </p:sldLayout>
 </file>
 
-<file path=ppt/slideLayouts/slideLayout13.xml><?xml version="1.0" encoding="utf-8"?>
+<file path=ppt/slideLayouts/slideLayout14.xml><?xml version="1.0" encoding="utf-8"?>
 <p:sldLayout xmlns:a="http://schemas.openxmlformats.org/drawingml/2006/main" xmlns:r="http://schemas.openxmlformats.org/officeDocument/2006/relationships" xmlns:p="http://schemas.openxmlformats.org/presentationml/2006/main" preserve="1" userDrawn="1">
   <p:cSld name="Blank with Sub Head">
     <p:spTree>
@@ -3840,7 +4584,7 @@
 </p:sldLayout>
 </file>
 
-<file path=ppt/slideLayouts/slideLayout14.xml><?xml version="1.0" encoding="utf-8"?>
+<file path=ppt/slideLayouts/slideLayout15.xml><?xml version="1.0" encoding="utf-8"?>
 <p:sldLayout xmlns:a="http://schemas.openxmlformats.org/drawingml/2006/main" xmlns:r="http://schemas.openxmlformats.org/officeDocument/2006/relationships" xmlns:p="http://schemas.openxmlformats.org/presentationml/2006/main" preserve="1" userDrawn="1">
   <p:cSld name="Chart">
     <p:spTree>
@@ -4007,7 +4751,7 @@
 </p:sldLayout>
 </file>
 
-<file path=ppt/slideLayouts/slideLayout15.xml><?xml version="1.0" encoding="utf-8"?>
+<file path=ppt/slideLayouts/slideLayout16.xml><?xml version="1.0" encoding="utf-8"?>
 <p:sldLayout xmlns:a="http://schemas.openxmlformats.org/drawingml/2006/main" xmlns:r="http://schemas.openxmlformats.org/officeDocument/2006/relationships" xmlns:p="http://schemas.openxmlformats.org/presentationml/2006/main" type="blank" preserve="1">
   <p:cSld name="Blank">
     <p:spTree>
@@ -4306,274 +5050,7 @@
 </file>
 
 <file path=ppt/slideLayouts/slideLayout3.xml><?xml version="1.0" encoding="utf-8"?>
-<p:sldLayout xmlns:a="http://schemas.openxmlformats.org/drawingml/2006/main" xmlns:r="http://schemas.openxmlformats.org/officeDocument/2006/relationships" xmlns:p="http://schemas.openxmlformats.org/presentationml/2006/main" preserve="1" userDrawn="1">
-  <p:cSld name="Bio Slide">
-    <p:spTree>
-      <p:nvGrpSpPr>
-        <p:cNvPr id="1" name=""/>
-        <p:cNvGrpSpPr/>
-        <p:nvPr/>
-      </p:nvGrpSpPr>
-      <p:grpSpPr>
-        <a:xfrm>
-          <a:off x="0" y="0"/>
-          <a:ext cx="0" cy="0"/>
-          <a:chOff x="0" y="0"/>
-          <a:chExt cx="0" cy="0"/>
-        </a:xfrm>
-      </p:grpSpPr>
-      <p:sp>
-        <p:nvSpPr>
-          <p:cNvPr id="2" name="Title 1"/>
-          <p:cNvSpPr>
-            <a:spLocks noGrp="1"/>
-          </p:cNvSpPr>
-          <p:nvPr>
-            <p:ph type="ctrTitle"/>
-          </p:nvPr>
-        </p:nvSpPr>
-        <p:spPr>
-          <a:xfrm>
-            <a:off x="442982" y="1066788"/>
-            <a:ext cx="4924355" cy="1126998"/>
-          </a:xfrm>
-          <a:prstGeom prst="rect">
-            <a:avLst/>
-          </a:prstGeom>
-        </p:spPr>
-        <p:txBody>
-          <a:bodyPr vert="horz" lIns="0" tIns="32914" rIns="65828" bIns="32914"/>
-          <a:lstStyle>
-            <a:lvl1pPr>
-              <a:lnSpc>
-                <a:spcPts val="3599"/>
-              </a:lnSpc>
-              <a:defRPr sz="3900" b="1" cap="all" baseline="0">
-                <a:latin typeface="+mj-lt"/>
-              </a:defRPr>
-            </a:lvl1pPr>
-          </a:lstStyle>
-          <a:p>
-            <a:r>
-              <a:rPr lang="en-US" smtClean="0"/>
-              <a:t>Click to edit Master title style</a:t>
-            </a:r>
-            <a:endParaRPr lang="en-US" dirty="0"/>
-          </a:p>
-        </p:txBody>
-      </p:sp>
-      <p:sp>
-        <p:nvSpPr>
-          <p:cNvPr id="3" name="Subtitle 2"/>
-          <p:cNvSpPr>
-            <a:spLocks noGrp="1"/>
-          </p:cNvSpPr>
-          <p:nvPr>
-            <p:ph type="subTitle" idx="1"/>
-          </p:nvPr>
-        </p:nvSpPr>
-        <p:spPr>
-          <a:xfrm>
-            <a:off x="457182" y="2072196"/>
-            <a:ext cx="5748356" cy="1343025"/>
-          </a:xfrm>
-          <a:prstGeom prst="rect">
-            <a:avLst/>
-          </a:prstGeom>
-        </p:spPr>
-        <p:txBody>
-          <a:bodyPr vert="horz" lIns="0" tIns="32914" rIns="65828" bIns="32914"/>
-          <a:lstStyle>
-            <a:lvl1pPr marL="174625" indent="-174625" algn="l">
-              <a:buSzPct val="69000"/>
-              <a:buFont typeface="Lucida Grande"/>
-              <a:buChar char="‣"/>
-              <a:defRPr baseline="0"/>
-            </a:lvl1pPr>
-            <a:lvl2pPr marL="329138" indent="0" algn="ctr">
-              <a:buNone/>
-              <a:defRPr/>
-            </a:lvl2pPr>
-            <a:lvl3pPr marL="658277" indent="0" algn="ctr">
-              <a:buNone/>
-              <a:defRPr/>
-            </a:lvl3pPr>
-            <a:lvl4pPr marL="987415" indent="0" algn="ctr">
-              <a:buNone/>
-              <a:defRPr/>
-            </a:lvl4pPr>
-            <a:lvl5pPr marL="1316553" indent="0" algn="ctr">
-              <a:buNone/>
-              <a:defRPr/>
-            </a:lvl5pPr>
-            <a:lvl6pPr marL="1645691" indent="0" algn="ctr">
-              <a:buNone/>
-              <a:defRPr/>
-            </a:lvl6pPr>
-            <a:lvl7pPr marL="1974830" indent="0" algn="ctr">
-              <a:buNone/>
-              <a:defRPr/>
-            </a:lvl7pPr>
-            <a:lvl8pPr marL="2303968" indent="0" algn="ctr">
-              <a:buNone/>
-              <a:defRPr/>
-            </a:lvl8pPr>
-            <a:lvl9pPr marL="2633106" indent="0" algn="ctr">
-              <a:buNone/>
-              <a:defRPr/>
-            </a:lvl9pPr>
-          </a:lstStyle>
-          <a:p>
-            <a:r>
-              <a:rPr lang="en-US" smtClean="0"/>
-              <a:t>Click to edit Master subtitle style</a:t>
-            </a:r>
-            <a:endParaRPr lang="en-US" dirty="0"/>
-          </a:p>
-        </p:txBody>
-      </p:sp>
-      <p:sp>
-        <p:nvSpPr>
-          <p:cNvPr id="5" name="Content Placeholder 5"/>
-          <p:cNvSpPr>
-            <a:spLocks noGrp="1"/>
-          </p:cNvSpPr>
-          <p:nvPr>
-            <p:ph sz="quarter" idx="11"/>
-          </p:nvPr>
-        </p:nvSpPr>
-        <p:spPr>
-          <a:xfrm>
-            <a:off x="371266" y="495300"/>
-            <a:ext cx="6400800" cy="304800"/>
-          </a:xfrm>
-          <a:prstGeom prst="rect">
-            <a:avLst/>
-          </a:prstGeom>
-        </p:spPr>
-        <p:txBody>
-          <a:bodyPr vert="horz"/>
-          <a:lstStyle>
-            <a:lvl1pPr marL="0" indent="0">
-              <a:buNone/>
-              <a:defRPr sz="2300" b="1" cap="all">
-                <a:latin typeface="+mj-lt"/>
-              </a:defRPr>
-            </a:lvl1pPr>
-            <a:lvl2pPr>
-              <a:defRPr b="1">
-                <a:latin typeface="+mj-lt"/>
-              </a:defRPr>
-            </a:lvl2pPr>
-            <a:lvl3pPr>
-              <a:defRPr b="1">
-                <a:latin typeface="+mj-lt"/>
-              </a:defRPr>
-            </a:lvl3pPr>
-            <a:lvl4pPr>
-              <a:defRPr b="1">
-                <a:latin typeface="+mj-lt"/>
-              </a:defRPr>
-            </a:lvl4pPr>
-            <a:lvl5pPr>
-              <a:defRPr b="1">
-                <a:latin typeface="+mj-lt"/>
-              </a:defRPr>
-            </a:lvl5pPr>
-          </a:lstStyle>
-          <a:p>
-            <a:pPr lvl="0"/>
-            <a:r>
-              <a:rPr lang="en-US" smtClean="0"/>
-              <a:t>Click to edit Master text styles</a:t>
-            </a:r>
-          </a:p>
-        </p:txBody>
-      </p:sp>
-      <p:sp>
-        <p:nvSpPr>
-          <p:cNvPr id="10" name="Content Placeholder 9"/>
-          <p:cNvSpPr>
-            <a:spLocks noGrp="1"/>
-          </p:cNvSpPr>
-          <p:nvPr>
-            <p:ph sz="quarter" idx="12"/>
-          </p:nvPr>
-        </p:nvSpPr>
-        <p:spPr>
-          <a:xfrm>
-            <a:off x="6205537" y="2095500"/>
-            <a:ext cx="2743200" cy="2743200"/>
-          </a:xfrm>
-          <a:prstGeom prst="rect">
-            <a:avLst/>
-          </a:prstGeom>
-        </p:spPr>
-        <p:txBody>
-          <a:bodyPr vert="horz"/>
-          <a:lstStyle>
-            <a:lvl1pPr marL="0" indent="0">
-              <a:buNone/>
-              <a:defRPr/>
-            </a:lvl1pPr>
-          </a:lstStyle>
-          <a:p>
-            <a:pPr lvl="0"/>
-            <a:endParaRPr lang="en-US" dirty="0"/>
-          </a:p>
-        </p:txBody>
-      </p:sp>
-      <p:sp>
-        <p:nvSpPr>
-          <p:cNvPr id="6" name="Text Box 1"/>
-          <p:cNvSpPr txBox="1">
-            <a:spLocks noGrp="1" noChangeArrowheads="1"/>
-          </p:cNvSpPr>
-          <p:nvPr>
-            <p:ph type="sldNum" sz="quarter" idx="13"/>
-          </p:nvPr>
-        </p:nvSpPr>
-        <p:spPr>
-          <a:ln/>
-        </p:spPr>
-        <p:txBody>
-          <a:bodyPr/>
-          <a:lstStyle>
-            <a:lvl1pPr>
-              <a:defRPr/>
-            </a:lvl1pPr>
-          </a:lstStyle>
-          <a:p>
-            <a:pPr>
-              <a:defRPr/>
-            </a:pPr>
-            <a:fld id="{9D11C055-FFE5-AD49-B3A5-A89774143922}" type="slidenum">
-              <a:rPr lang="en-US"/>
-              <a:pPr>
-                <a:defRPr/>
-              </a:pPr>
-              <a:t>‹#›</a:t>
-            </a:fld>
-            <a:endParaRPr lang="en-US" dirty="0"/>
-          </a:p>
-        </p:txBody>
-      </p:sp>
-    </p:spTree>
-    <p:extLst>
-      <p:ext uri="{BB962C8B-B14F-4D97-AF65-F5344CB8AC3E}">
-        <p14:creationId xmlns:p14="http://schemas.microsoft.com/office/powerpoint/2010/main" val="3250009757"/>
-      </p:ext>
-    </p:extLst>
-  </p:cSld>
-  <p:clrMapOvr>
-    <a:masterClrMapping/>
-  </p:clrMapOvr>
-  <p:transition xmlns:p14="http://schemas.microsoft.com/office/powerpoint/2010/main"/>
-</p:sldLayout>
-</file>
-
-<file path=ppt/slideLayouts/slideLayout4.xml><?xml version="1.0" encoding="utf-8"?>
-<p:sldLayout xmlns:a="http://schemas.openxmlformats.org/drawingml/2006/main" xmlns:r="http://schemas.openxmlformats.org/officeDocument/2006/relationships" xmlns:p="http://schemas.openxmlformats.org/presentationml/2006/main" preserve="1" userDrawn="1">
+<p:sldLayout xmlns:a="http://schemas.openxmlformats.org/drawingml/2006/main" xmlns:r="http://schemas.openxmlformats.org/officeDocument/2006/relationships" xmlns:p="http://schemas.openxmlformats.org/presentationml/2006/main" userDrawn="1">
   <p:cSld name="Text Slide">
     <p:spTree>
       <p:nvGrpSpPr>
@@ -4803,6 +5280,549 @@
           </p:nvPr>
         </p:nvSpPr>
         <p:spPr>
+          <a:xfrm>
+            <a:off x="8650288" y="530225"/>
+            <a:ext cx="254000" cy="311150"/>
+          </a:xfrm>
+          <a:prstGeom prst="rect">
+            <a:avLst/>
+          </a:prstGeom>
+          <a:ln/>
+        </p:spPr>
+        <p:txBody>
+          <a:bodyPr/>
+          <a:lstStyle>
+            <a:lvl1pPr>
+              <a:defRPr/>
+            </a:lvl1pPr>
+          </a:lstStyle>
+          <a:p>
+            <a:pPr>
+              <a:defRPr/>
+            </a:pPr>
+            <a:fld id="{BD34588A-CBAF-924B-A77D-DE72B91A9204}" type="slidenum">
+              <a:rPr lang="en-US"/>
+              <a:pPr>
+                <a:defRPr/>
+              </a:pPr>
+              <a:t>‹#›</a:t>
+            </a:fld>
+            <a:endParaRPr lang="en-US" dirty="0"/>
+          </a:p>
+        </p:txBody>
+      </p:sp>
+    </p:spTree>
+    <p:extLst>
+      <p:ext uri="{BB962C8B-B14F-4D97-AF65-F5344CB8AC3E}">
+        <p14:creationId xmlns:p14="http://schemas.microsoft.com/office/powerpoint/2010/main" val="3760609673"/>
+      </p:ext>
+    </p:extLst>
+  </p:cSld>
+  <p:clrMapOvr>
+    <a:masterClrMapping/>
+  </p:clrMapOvr>
+  <p:transition xmlns:p14="http://schemas.microsoft.com/office/powerpoint/2010/main"/>
+</p:sldLayout>
+</file>
+
+<file path=ppt/slideLayouts/slideLayout4.xml><?xml version="1.0" encoding="utf-8"?>
+<p:sldLayout xmlns:a="http://schemas.openxmlformats.org/drawingml/2006/main" xmlns:r="http://schemas.openxmlformats.org/officeDocument/2006/relationships" xmlns:p="http://schemas.openxmlformats.org/presentationml/2006/main" preserve="1" userDrawn="1">
+  <p:cSld name="Bio Slide">
+    <p:spTree>
+      <p:nvGrpSpPr>
+        <p:cNvPr id="1" name=""/>
+        <p:cNvGrpSpPr/>
+        <p:nvPr/>
+      </p:nvGrpSpPr>
+      <p:grpSpPr>
+        <a:xfrm>
+          <a:off x="0" y="0"/>
+          <a:ext cx="0" cy="0"/>
+          <a:chOff x="0" y="0"/>
+          <a:chExt cx="0" cy="0"/>
+        </a:xfrm>
+      </p:grpSpPr>
+      <p:sp>
+        <p:nvSpPr>
+          <p:cNvPr id="2" name="Title 1"/>
+          <p:cNvSpPr>
+            <a:spLocks noGrp="1"/>
+          </p:cNvSpPr>
+          <p:nvPr>
+            <p:ph type="ctrTitle"/>
+          </p:nvPr>
+        </p:nvSpPr>
+        <p:spPr>
+          <a:xfrm>
+            <a:off x="442982" y="1066788"/>
+            <a:ext cx="4924355" cy="1126998"/>
+          </a:xfrm>
+          <a:prstGeom prst="rect">
+            <a:avLst/>
+          </a:prstGeom>
+        </p:spPr>
+        <p:txBody>
+          <a:bodyPr vert="horz" lIns="0" tIns="32914" rIns="65828" bIns="32914"/>
+          <a:lstStyle>
+            <a:lvl1pPr>
+              <a:lnSpc>
+                <a:spcPts val="3599"/>
+              </a:lnSpc>
+              <a:defRPr sz="3900" b="1" cap="all" baseline="0">
+                <a:latin typeface="+mj-lt"/>
+              </a:defRPr>
+            </a:lvl1pPr>
+          </a:lstStyle>
+          <a:p>
+            <a:r>
+              <a:rPr lang="en-US" smtClean="0"/>
+              <a:t>Click to edit Master title style</a:t>
+            </a:r>
+            <a:endParaRPr lang="en-US" dirty="0"/>
+          </a:p>
+        </p:txBody>
+      </p:sp>
+      <p:sp>
+        <p:nvSpPr>
+          <p:cNvPr id="3" name="Subtitle 2"/>
+          <p:cNvSpPr>
+            <a:spLocks noGrp="1"/>
+          </p:cNvSpPr>
+          <p:nvPr>
+            <p:ph type="subTitle" idx="1"/>
+          </p:nvPr>
+        </p:nvSpPr>
+        <p:spPr>
+          <a:xfrm>
+            <a:off x="457182" y="2072196"/>
+            <a:ext cx="5748356" cy="1343025"/>
+          </a:xfrm>
+          <a:prstGeom prst="rect">
+            <a:avLst/>
+          </a:prstGeom>
+        </p:spPr>
+        <p:txBody>
+          <a:bodyPr vert="horz" lIns="0" tIns="32914" rIns="65828" bIns="32914"/>
+          <a:lstStyle>
+            <a:lvl1pPr marL="174625" indent="-174625" algn="l">
+              <a:buSzPct val="69000"/>
+              <a:buFont typeface="Lucida Grande"/>
+              <a:buChar char="‣"/>
+              <a:defRPr baseline="0"/>
+            </a:lvl1pPr>
+            <a:lvl2pPr marL="329138" indent="0" algn="ctr">
+              <a:buNone/>
+              <a:defRPr/>
+            </a:lvl2pPr>
+            <a:lvl3pPr marL="658277" indent="0" algn="ctr">
+              <a:buNone/>
+              <a:defRPr/>
+            </a:lvl3pPr>
+            <a:lvl4pPr marL="987415" indent="0" algn="ctr">
+              <a:buNone/>
+              <a:defRPr/>
+            </a:lvl4pPr>
+            <a:lvl5pPr marL="1316553" indent="0" algn="ctr">
+              <a:buNone/>
+              <a:defRPr/>
+            </a:lvl5pPr>
+            <a:lvl6pPr marL="1645691" indent="0" algn="ctr">
+              <a:buNone/>
+              <a:defRPr/>
+            </a:lvl6pPr>
+            <a:lvl7pPr marL="1974830" indent="0" algn="ctr">
+              <a:buNone/>
+              <a:defRPr/>
+            </a:lvl7pPr>
+            <a:lvl8pPr marL="2303968" indent="0" algn="ctr">
+              <a:buNone/>
+              <a:defRPr/>
+            </a:lvl8pPr>
+            <a:lvl9pPr marL="2633106" indent="0" algn="ctr">
+              <a:buNone/>
+              <a:defRPr/>
+            </a:lvl9pPr>
+          </a:lstStyle>
+          <a:p>
+            <a:r>
+              <a:rPr lang="en-US" smtClean="0"/>
+              <a:t>Click to edit Master subtitle style</a:t>
+            </a:r>
+            <a:endParaRPr lang="en-US" dirty="0"/>
+          </a:p>
+        </p:txBody>
+      </p:sp>
+      <p:sp>
+        <p:nvSpPr>
+          <p:cNvPr id="5" name="Content Placeholder 5"/>
+          <p:cNvSpPr>
+            <a:spLocks noGrp="1"/>
+          </p:cNvSpPr>
+          <p:nvPr>
+            <p:ph sz="quarter" idx="11"/>
+          </p:nvPr>
+        </p:nvSpPr>
+        <p:spPr>
+          <a:xfrm>
+            <a:off x="371266" y="495300"/>
+            <a:ext cx="6400800" cy="304800"/>
+          </a:xfrm>
+          <a:prstGeom prst="rect">
+            <a:avLst/>
+          </a:prstGeom>
+        </p:spPr>
+        <p:txBody>
+          <a:bodyPr vert="horz"/>
+          <a:lstStyle>
+            <a:lvl1pPr marL="0" indent="0">
+              <a:buNone/>
+              <a:defRPr sz="2300" b="1" cap="all">
+                <a:latin typeface="+mj-lt"/>
+              </a:defRPr>
+            </a:lvl1pPr>
+            <a:lvl2pPr>
+              <a:defRPr b="1">
+                <a:latin typeface="+mj-lt"/>
+              </a:defRPr>
+            </a:lvl2pPr>
+            <a:lvl3pPr>
+              <a:defRPr b="1">
+                <a:latin typeface="+mj-lt"/>
+              </a:defRPr>
+            </a:lvl3pPr>
+            <a:lvl4pPr>
+              <a:defRPr b="1">
+                <a:latin typeface="+mj-lt"/>
+              </a:defRPr>
+            </a:lvl4pPr>
+            <a:lvl5pPr>
+              <a:defRPr b="1">
+                <a:latin typeface="+mj-lt"/>
+              </a:defRPr>
+            </a:lvl5pPr>
+          </a:lstStyle>
+          <a:p>
+            <a:pPr lvl="0"/>
+            <a:r>
+              <a:rPr lang="en-US" smtClean="0"/>
+              <a:t>Click to edit Master text styles</a:t>
+            </a:r>
+          </a:p>
+        </p:txBody>
+      </p:sp>
+      <p:sp>
+        <p:nvSpPr>
+          <p:cNvPr id="10" name="Content Placeholder 9"/>
+          <p:cNvSpPr>
+            <a:spLocks noGrp="1"/>
+          </p:cNvSpPr>
+          <p:nvPr>
+            <p:ph sz="quarter" idx="12"/>
+          </p:nvPr>
+        </p:nvSpPr>
+        <p:spPr>
+          <a:xfrm>
+            <a:off x="6205537" y="2095500"/>
+            <a:ext cx="2743200" cy="2743200"/>
+          </a:xfrm>
+          <a:prstGeom prst="rect">
+            <a:avLst/>
+          </a:prstGeom>
+        </p:spPr>
+        <p:txBody>
+          <a:bodyPr vert="horz"/>
+          <a:lstStyle>
+            <a:lvl1pPr marL="0" indent="0">
+              <a:buNone/>
+              <a:defRPr/>
+            </a:lvl1pPr>
+          </a:lstStyle>
+          <a:p>
+            <a:pPr lvl="0"/>
+            <a:endParaRPr lang="en-US" dirty="0"/>
+          </a:p>
+        </p:txBody>
+      </p:sp>
+      <p:sp>
+        <p:nvSpPr>
+          <p:cNvPr id="6" name="Text Box 1"/>
+          <p:cNvSpPr txBox="1">
+            <a:spLocks noGrp="1" noChangeArrowheads="1"/>
+          </p:cNvSpPr>
+          <p:nvPr>
+            <p:ph type="sldNum" sz="quarter" idx="13"/>
+          </p:nvPr>
+        </p:nvSpPr>
+        <p:spPr>
+          <a:ln/>
+        </p:spPr>
+        <p:txBody>
+          <a:bodyPr/>
+          <a:lstStyle>
+            <a:lvl1pPr>
+              <a:defRPr/>
+            </a:lvl1pPr>
+          </a:lstStyle>
+          <a:p>
+            <a:pPr>
+              <a:defRPr/>
+            </a:pPr>
+            <a:fld id="{9D11C055-FFE5-AD49-B3A5-A89774143922}" type="slidenum">
+              <a:rPr lang="en-US"/>
+              <a:pPr>
+                <a:defRPr/>
+              </a:pPr>
+              <a:t>‹#›</a:t>
+            </a:fld>
+            <a:endParaRPr lang="en-US" dirty="0"/>
+          </a:p>
+        </p:txBody>
+      </p:sp>
+    </p:spTree>
+    <p:extLst>
+      <p:ext uri="{BB962C8B-B14F-4D97-AF65-F5344CB8AC3E}">
+        <p14:creationId xmlns:p14="http://schemas.microsoft.com/office/powerpoint/2010/main" val="3250009757"/>
+      </p:ext>
+    </p:extLst>
+  </p:cSld>
+  <p:clrMapOvr>
+    <a:masterClrMapping/>
+  </p:clrMapOvr>
+  <p:transition xmlns:p14="http://schemas.microsoft.com/office/powerpoint/2010/main"/>
+</p:sldLayout>
+</file>
+
+<file path=ppt/slideLayouts/slideLayout5.xml><?xml version="1.0" encoding="utf-8"?>
+<p:sldLayout xmlns:a="http://schemas.openxmlformats.org/drawingml/2006/main" xmlns:r="http://schemas.openxmlformats.org/officeDocument/2006/relationships" xmlns:p="http://schemas.openxmlformats.org/presentationml/2006/main" preserve="1" userDrawn="1">
+  <p:cSld name="Text Slide">
+    <p:spTree>
+      <p:nvGrpSpPr>
+        <p:cNvPr id="1" name=""/>
+        <p:cNvGrpSpPr/>
+        <p:nvPr/>
+      </p:nvGrpSpPr>
+      <p:grpSpPr>
+        <a:xfrm>
+          <a:off x="0" y="0"/>
+          <a:ext cx="0" cy="0"/>
+          <a:chOff x="0" y="0"/>
+          <a:chExt cx="0" cy="0"/>
+        </a:xfrm>
+      </p:grpSpPr>
+      <p:sp>
+        <p:nvSpPr>
+          <p:cNvPr id="2" name="Title 1"/>
+          <p:cNvSpPr>
+            <a:spLocks noGrp="1"/>
+          </p:cNvSpPr>
+          <p:nvPr>
+            <p:ph type="ctrTitle"/>
+          </p:nvPr>
+        </p:nvSpPr>
+        <p:spPr>
+          <a:xfrm>
+            <a:off x="442981" y="1066788"/>
+            <a:ext cx="8429555" cy="1126998"/>
+          </a:xfrm>
+          <a:prstGeom prst="rect">
+            <a:avLst/>
+          </a:prstGeom>
+        </p:spPr>
+        <p:txBody>
+          <a:bodyPr vert="horz" lIns="0" tIns="32914" rIns="65828" bIns="32914"/>
+          <a:lstStyle>
+            <a:lvl1pPr>
+              <a:lnSpc>
+                <a:spcPts val="3599"/>
+              </a:lnSpc>
+              <a:defRPr sz="3900" b="1" cap="all">
+                <a:latin typeface="+mj-lt"/>
+              </a:defRPr>
+            </a:lvl1pPr>
+          </a:lstStyle>
+          <a:p>
+            <a:r>
+              <a:rPr lang="en-US" smtClean="0"/>
+              <a:t>Click to edit Master title style</a:t>
+            </a:r>
+            <a:endParaRPr lang="en-US" dirty="0"/>
+          </a:p>
+        </p:txBody>
+      </p:sp>
+      <p:sp>
+        <p:nvSpPr>
+          <p:cNvPr id="5" name="Content Placeholder 5"/>
+          <p:cNvSpPr>
+            <a:spLocks noGrp="1"/>
+          </p:cNvSpPr>
+          <p:nvPr>
+            <p:ph sz="quarter" idx="11"/>
+          </p:nvPr>
+        </p:nvSpPr>
+        <p:spPr>
+          <a:xfrm>
+            <a:off x="371265" y="495300"/>
+            <a:ext cx="7129671" cy="304800"/>
+          </a:xfrm>
+          <a:prstGeom prst="rect">
+            <a:avLst/>
+          </a:prstGeom>
+        </p:spPr>
+        <p:txBody>
+          <a:bodyPr vert="horz"/>
+          <a:lstStyle>
+            <a:lvl1pPr marL="0" indent="0">
+              <a:buNone/>
+              <a:defRPr sz="2300" b="1" cap="all">
+                <a:latin typeface="+mj-lt"/>
+              </a:defRPr>
+            </a:lvl1pPr>
+            <a:lvl2pPr>
+              <a:defRPr b="1">
+                <a:latin typeface="+mj-lt"/>
+              </a:defRPr>
+            </a:lvl2pPr>
+            <a:lvl3pPr>
+              <a:defRPr b="1">
+                <a:latin typeface="+mj-lt"/>
+              </a:defRPr>
+            </a:lvl3pPr>
+            <a:lvl4pPr>
+              <a:defRPr b="1">
+                <a:latin typeface="+mj-lt"/>
+              </a:defRPr>
+            </a:lvl4pPr>
+            <a:lvl5pPr>
+              <a:defRPr b="1">
+                <a:latin typeface="+mj-lt"/>
+              </a:defRPr>
+            </a:lvl5pPr>
+          </a:lstStyle>
+          <a:p>
+            <a:pPr lvl="0"/>
+            <a:r>
+              <a:rPr lang="en-US" smtClean="0"/>
+              <a:t>Click to edit Master text styles</a:t>
+            </a:r>
+          </a:p>
+        </p:txBody>
+      </p:sp>
+      <p:sp>
+        <p:nvSpPr>
+          <p:cNvPr id="7" name="Content Placeholder 2"/>
+          <p:cNvSpPr>
+            <a:spLocks noGrp="1"/>
+          </p:cNvSpPr>
+          <p:nvPr>
+            <p:ph sz="half" idx="12"/>
+          </p:nvPr>
+        </p:nvSpPr>
+        <p:spPr>
+          <a:xfrm>
+            <a:off x="454025" y="2066446"/>
+            <a:ext cx="8418512" cy="3000854"/>
+          </a:xfrm>
+          <a:prstGeom prst="rect">
+            <a:avLst/>
+          </a:prstGeom>
+        </p:spPr>
+        <p:txBody>
+          <a:bodyPr vert="horz" lIns="0" tIns="32914" rIns="65828" bIns="32914"/>
+          <a:lstStyle>
+            <a:lvl1pPr marL="0" indent="0">
+              <a:spcBef>
+                <a:spcPts val="720"/>
+              </a:spcBef>
+              <a:buFont typeface="Arial"/>
+              <a:buNone/>
+              <a:defRPr sz="2000"/>
+            </a:lvl1pPr>
+            <a:lvl2pPr>
+              <a:spcBef>
+                <a:spcPts val="720"/>
+              </a:spcBef>
+              <a:defRPr sz="2000"/>
+            </a:lvl2pPr>
+            <a:lvl3pPr>
+              <a:spcBef>
+                <a:spcPts val="720"/>
+              </a:spcBef>
+              <a:defRPr sz="2000"/>
+            </a:lvl3pPr>
+            <a:lvl4pPr>
+              <a:spcBef>
+                <a:spcPts val="720"/>
+              </a:spcBef>
+              <a:defRPr sz="2000"/>
+            </a:lvl4pPr>
+            <a:lvl5pPr>
+              <a:spcBef>
+                <a:spcPts val="720"/>
+              </a:spcBef>
+              <a:defRPr sz="2000"/>
+            </a:lvl5pPr>
+            <a:lvl6pPr>
+              <a:defRPr sz="1300"/>
+            </a:lvl6pPr>
+            <a:lvl7pPr>
+              <a:defRPr sz="1300"/>
+            </a:lvl7pPr>
+            <a:lvl8pPr>
+              <a:defRPr sz="1300"/>
+            </a:lvl8pPr>
+            <a:lvl9pPr>
+              <a:defRPr sz="1300"/>
+            </a:lvl9pPr>
+          </a:lstStyle>
+          <a:p>
+            <a:pPr lvl="0"/>
+            <a:r>
+              <a:rPr lang="en-US" smtClean="0"/>
+              <a:t>Click to edit Master text styles</a:t>
+            </a:r>
+          </a:p>
+          <a:p>
+            <a:pPr lvl="1"/>
+            <a:r>
+              <a:rPr lang="en-US" smtClean="0"/>
+              <a:t>Second level</a:t>
+            </a:r>
+          </a:p>
+          <a:p>
+            <a:pPr lvl="2"/>
+            <a:r>
+              <a:rPr lang="en-US" smtClean="0"/>
+              <a:t>Third level</a:t>
+            </a:r>
+          </a:p>
+          <a:p>
+            <a:pPr lvl="3"/>
+            <a:r>
+              <a:rPr lang="en-US" smtClean="0"/>
+              <a:t>Fourth level</a:t>
+            </a:r>
+          </a:p>
+          <a:p>
+            <a:pPr lvl="4"/>
+            <a:r>
+              <a:rPr lang="en-US" smtClean="0"/>
+              <a:t>Fifth level</a:t>
+            </a:r>
+            <a:endParaRPr lang="en-US" dirty="0"/>
+          </a:p>
+        </p:txBody>
+      </p:sp>
+      <p:sp>
+        <p:nvSpPr>
+          <p:cNvPr id="6" name="Text Box 1"/>
+          <p:cNvSpPr txBox="1">
+            <a:spLocks noGrp="1" noChangeArrowheads="1"/>
+          </p:cNvSpPr>
+          <p:nvPr>
+            <p:ph type="sldNum" sz="quarter" idx="13"/>
+          </p:nvPr>
+        </p:nvSpPr>
+        <p:spPr>
           <a:ln/>
         </p:spPr>
         <p:txBody>
@@ -4841,7 +5861,7 @@
 </p:sldLayout>
 </file>
 
-<file path=ppt/slideLayouts/slideLayout5.xml><?xml version="1.0" encoding="utf-8"?>
+<file path=ppt/slideLayouts/slideLayout6.xml><?xml version="1.0" encoding="utf-8"?>
 <p:sldLayout xmlns:a="http://schemas.openxmlformats.org/drawingml/2006/main" xmlns:r="http://schemas.openxmlformats.org/officeDocument/2006/relationships" xmlns:p="http://schemas.openxmlformats.org/presentationml/2006/main" preserve="1" userDrawn="1">
   <p:cSld name="Full Image Slide">
     <p:spTree>
@@ -5157,7 +6177,7 @@
 </p:sldLayout>
 </file>
 
-<file path=ppt/slideLayouts/slideLayout6.xml><?xml version="1.0" encoding="utf-8"?>
+<file path=ppt/slideLayouts/slideLayout7.xml><?xml version="1.0" encoding="utf-8"?>
 <p:sldLayout xmlns:a="http://schemas.openxmlformats.org/drawingml/2006/main" xmlns:r="http://schemas.openxmlformats.org/officeDocument/2006/relationships" xmlns:p="http://schemas.openxmlformats.org/presentationml/2006/main" preserve="1" userDrawn="1">
   <p:cSld name="desktop">
     <p:spTree>
@@ -5500,7 +6520,7 @@
 </p:sldLayout>
 </file>
 
-<file path=ppt/slideLayouts/slideLayout7.xml><?xml version="1.0" encoding="utf-8"?>
+<file path=ppt/slideLayouts/slideLayout8.xml><?xml version="1.0" encoding="utf-8"?>
 <p:sldLayout xmlns:a="http://schemas.openxmlformats.org/drawingml/2006/main" xmlns:r="http://schemas.openxmlformats.org/officeDocument/2006/relationships" xmlns:p="http://schemas.openxmlformats.org/presentationml/2006/main" preserve="1" userDrawn="1">
   <p:cSld name="Laptop">
     <p:spTree>
@@ -5843,7 +6863,7 @@
 </p:sldLayout>
 </file>
 
-<file path=ppt/slideLayouts/slideLayout8.xml><?xml version="1.0" encoding="utf-8"?>
+<file path=ppt/slideLayouts/slideLayout9.xml><?xml version="1.0" encoding="utf-8"?>
 <p:sldLayout xmlns:a="http://schemas.openxmlformats.org/drawingml/2006/main" xmlns:r="http://schemas.openxmlformats.org/officeDocument/2006/relationships" xmlns:p="http://schemas.openxmlformats.org/presentationml/2006/main" preserve="1" userDrawn="1">
   <p:cSld name="Laptop 2">
     <p:spTree>
@@ -6186,493 +7206,6 @@
 </p:sldLayout>
 </file>
 
-<file path=ppt/slideLayouts/slideLayout9.xml><?xml version="1.0" encoding="utf-8"?>
-<p:sldLayout xmlns:a="http://schemas.openxmlformats.org/drawingml/2006/main" xmlns:r="http://schemas.openxmlformats.org/officeDocument/2006/relationships" xmlns:p="http://schemas.openxmlformats.org/presentationml/2006/main" preserve="1" userDrawn="1">
-  <p:cSld name="Smart Phone Image Slide">
-    <p:spTree>
-      <p:nvGrpSpPr>
-        <p:cNvPr id="1" name=""/>
-        <p:cNvGrpSpPr/>
-        <p:nvPr/>
-      </p:nvGrpSpPr>
-      <p:grpSpPr>
-        <a:xfrm>
-          <a:off x="0" y="0"/>
-          <a:ext cx="0" cy="0"/>
-          <a:chOff x="0" y="0"/>
-          <a:chExt cx="0" cy="0"/>
-        </a:xfrm>
-      </p:grpSpPr>
-      <p:pic>
-        <p:nvPicPr>
-          <p:cNvPr id="6" name="Picture 4"/>
-          <p:cNvPicPr>
-            <a:picLocks noChangeAspect="1"/>
-          </p:cNvPicPr>
-          <p:nvPr userDrawn="1"/>
-        </p:nvPicPr>
-        <p:blipFill>
-          <a:blip r:embed="rId2">
-            <a:extLst>
-              <a:ext uri="{28A0092B-C50C-407E-A947-70E740481C1C}">
-                <a14:useLocalDpi xmlns:a14="http://schemas.microsoft.com/office/drawing/2010/main" val="0"/>
-              </a:ext>
-            </a:extLst>
-          </a:blip>
-          <a:srcRect t="2654" b="9073"/>
-          <a:stretch>
-            <a:fillRect/>
-          </a:stretch>
-        </p:blipFill>
-        <p:spPr bwMode="auto">
-          <a:xfrm>
-            <a:off x="719138" y="1049338"/>
-            <a:ext cx="7586662" cy="3873500"/>
-          </a:xfrm>
-          <a:prstGeom prst="rect">
-            <a:avLst/>
-          </a:prstGeom>
-          <a:noFill/>
-          <a:ln>
-            <a:noFill/>
-          </a:ln>
-          <a:extLst>
-            <a:ext uri="{909E8E84-426E-40dd-AFC4-6F175D3DCCD1}">
-              <a14:hiddenFill xmlns:a14="http://schemas.microsoft.com/office/drawing/2010/main">
-                <a:solidFill>
-                  <a:srgbClr val="FFFFFF"/>
-                </a:solidFill>
-              </a14:hiddenFill>
-            </a:ext>
-            <a:ext uri="{91240B29-F687-4f45-9708-019B960494DF}">
-              <a14:hiddenLine xmlns:a14="http://schemas.microsoft.com/office/drawing/2010/main" w="9525">
-                <a:solidFill>
-                  <a:srgbClr val="000000"/>
-                </a:solidFill>
-                <a:miter lim="800000"/>
-                <a:headEnd/>
-                <a:tailEnd/>
-              </a14:hiddenLine>
-            </a:ext>
-          </a:extLst>
-        </p:spPr>
-      </p:pic>
-      <p:sp>
-        <p:nvSpPr>
-          <p:cNvPr id="8" name="Line 1"/>
-          <p:cNvSpPr>
-            <a:spLocks noChangeShapeType="1"/>
-          </p:cNvSpPr>
-          <p:nvPr userDrawn="1"/>
-        </p:nvSpPr>
-        <p:spPr bwMode="auto">
-          <a:xfrm>
-            <a:off x="457200" y="487363"/>
-            <a:ext cx="8448675" cy="0"/>
-          </a:xfrm>
-          <a:prstGeom prst="line">
-            <a:avLst/>
-          </a:prstGeom>
-          <a:noFill/>
-          <a:ln w="6350">
-            <a:solidFill>
-              <a:schemeClr val="tx1"/>
-            </a:solidFill>
-            <a:miter lim="800000"/>
-            <a:headEnd/>
-            <a:tailEnd/>
-          </a:ln>
-          <a:extLst>
-            <a:ext uri="{909E8E84-426E-40dd-AFC4-6F175D3DCCD1}">
-              <a14:hiddenFill xmlns:a14="http://schemas.microsoft.com/office/drawing/2010/main">
-                <a:noFill/>
-              </a14:hiddenFill>
-            </a:ext>
-          </a:extLst>
-        </p:spPr>
-        <p:txBody>
-          <a:bodyPr lIns="0" tIns="0" rIns="0" bIns="0"/>
-          <a:lstStyle/>
-          <a:p>
-            <a:endParaRPr lang="en-US"/>
-          </a:p>
-        </p:txBody>
-      </p:sp>
-      <p:sp>
-        <p:nvSpPr>
-          <p:cNvPr id="9" name="Line 2"/>
-          <p:cNvSpPr>
-            <a:spLocks noChangeShapeType="1"/>
-          </p:cNvSpPr>
-          <p:nvPr userDrawn="1"/>
-        </p:nvSpPr>
-        <p:spPr bwMode="auto">
-          <a:xfrm>
-            <a:off x="457200" y="908050"/>
-            <a:ext cx="8448675" cy="0"/>
-          </a:xfrm>
-          <a:prstGeom prst="line">
-            <a:avLst/>
-          </a:prstGeom>
-          <a:noFill/>
-          <a:ln w="6350">
-            <a:solidFill>
-              <a:schemeClr val="tx1"/>
-            </a:solidFill>
-            <a:miter lim="800000"/>
-            <a:headEnd/>
-            <a:tailEnd/>
-          </a:ln>
-          <a:extLst>
-            <a:ext uri="{909E8E84-426E-40dd-AFC4-6F175D3DCCD1}">
-              <a14:hiddenFill xmlns:a14="http://schemas.microsoft.com/office/drawing/2010/main">
-                <a:noFill/>
-              </a14:hiddenFill>
-            </a:ext>
-          </a:extLst>
-        </p:spPr>
-        <p:txBody>
-          <a:bodyPr lIns="0" tIns="0" rIns="0" bIns="0"/>
-          <a:lstStyle/>
-          <a:p>
-            <a:endParaRPr lang="en-US"/>
-          </a:p>
-        </p:txBody>
-      </p:sp>
-      <p:sp>
-        <p:nvSpPr>
-          <p:cNvPr id="5" name="Content Placeholder 5"/>
-          <p:cNvSpPr>
-            <a:spLocks noGrp="1"/>
-          </p:cNvSpPr>
-          <p:nvPr>
-            <p:ph sz="quarter" idx="11"/>
-          </p:nvPr>
-        </p:nvSpPr>
-        <p:spPr>
-          <a:xfrm>
-            <a:off x="371265" y="495300"/>
-            <a:ext cx="7129671" cy="304800"/>
-          </a:xfrm>
-          <a:prstGeom prst="rect">
-            <a:avLst/>
-          </a:prstGeom>
-        </p:spPr>
-        <p:txBody>
-          <a:bodyPr vert="horz"/>
-          <a:lstStyle>
-            <a:lvl1pPr marL="0" marR="0" indent="0" algn="l" defTabSz="914400" rtl="0" eaLnBrk="0" fontAlgn="base" latinLnBrk="0" hangingPunct="0">
-              <a:lnSpc>
-                <a:spcPts val="2450"/>
-              </a:lnSpc>
-              <a:spcBef>
-                <a:spcPct val="0"/>
-              </a:spcBef>
-              <a:spcAft>
-                <a:spcPct val="0"/>
-              </a:spcAft>
-              <a:buClrTx/>
-              <a:buSzPct val="69000"/>
-              <a:buFont typeface="Lucida Grande" charset="0"/>
-              <a:buNone/>
-              <a:tabLst/>
-              <a:defRPr sz="2300" b="1" cap="all">
-                <a:latin typeface="+mj-lt"/>
-              </a:defRPr>
-            </a:lvl1pPr>
-            <a:lvl2pPr>
-              <a:defRPr b="1">
-                <a:latin typeface="+mj-lt"/>
-              </a:defRPr>
-            </a:lvl2pPr>
-            <a:lvl3pPr>
-              <a:defRPr b="1">
-                <a:latin typeface="+mj-lt"/>
-              </a:defRPr>
-            </a:lvl3pPr>
-            <a:lvl4pPr>
-              <a:defRPr b="1">
-                <a:latin typeface="+mj-lt"/>
-              </a:defRPr>
-            </a:lvl4pPr>
-            <a:lvl5pPr>
-              <a:defRPr b="1">
-                <a:latin typeface="+mj-lt"/>
-              </a:defRPr>
-            </a:lvl5pPr>
-          </a:lstStyle>
-          <a:p>
-            <a:pPr lvl="0"/>
-            <a:r>
-              <a:rPr lang="en-US" smtClean="0"/>
-              <a:t>Click to edit Master text styles</a:t>
-            </a:r>
-          </a:p>
-        </p:txBody>
-      </p:sp>
-      <p:sp>
-        <p:nvSpPr>
-          <p:cNvPr id="7" name="Content Placeholder 2"/>
-          <p:cNvSpPr>
-            <a:spLocks noGrp="1"/>
-          </p:cNvSpPr>
-          <p:nvPr>
-            <p:ph sz="half" idx="12"/>
-          </p:nvPr>
-        </p:nvSpPr>
-        <p:spPr>
-          <a:xfrm>
-            <a:off x="1313737" y="1419408"/>
-            <a:ext cx="1677751" cy="2870892"/>
-          </a:xfrm>
-          <a:prstGeom prst="rect">
-            <a:avLst/>
-          </a:prstGeom>
-        </p:spPr>
-        <p:txBody>
-          <a:bodyPr vert="horz" lIns="0" tIns="32914" rIns="65828" bIns="32914"/>
-          <a:lstStyle>
-            <a:lvl1pPr marL="0" indent="0">
-              <a:spcBef>
-                <a:spcPts val="720"/>
-              </a:spcBef>
-              <a:buNone/>
-              <a:defRPr sz="2000"/>
-            </a:lvl1pPr>
-            <a:lvl2pPr>
-              <a:spcBef>
-                <a:spcPts val="720"/>
-              </a:spcBef>
-              <a:defRPr sz="2000"/>
-            </a:lvl2pPr>
-            <a:lvl3pPr>
-              <a:spcBef>
-                <a:spcPts val="720"/>
-              </a:spcBef>
-              <a:defRPr sz="2000"/>
-            </a:lvl3pPr>
-            <a:lvl4pPr>
-              <a:spcBef>
-                <a:spcPts val="720"/>
-              </a:spcBef>
-              <a:defRPr sz="2000"/>
-            </a:lvl4pPr>
-            <a:lvl5pPr>
-              <a:spcBef>
-                <a:spcPts val="720"/>
-              </a:spcBef>
-              <a:defRPr sz="2000"/>
-            </a:lvl5pPr>
-            <a:lvl6pPr>
-              <a:defRPr sz="1300"/>
-            </a:lvl6pPr>
-            <a:lvl7pPr>
-              <a:defRPr sz="1300"/>
-            </a:lvl7pPr>
-            <a:lvl8pPr>
-              <a:defRPr sz="1300"/>
-            </a:lvl8pPr>
-            <a:lvl9pPr>
-              <a:defRPr sz="1300"/>
-            </a:lvl9pPr>
-          </a:lstStyle>
-          <a:p>
-            <a:pPr lvl="0"/>
-            <a:endParaRPr lang="en-US" dirty="0"/>
-          </a:p>
-        </p:txBody>
-      </p:sp>
-      <p:sp>
-        <p:nvSpPr>
-          <p:cNvPr id="10" name="Content Placeholder 2"/>
-          <p:cNvSpPr>
-            <a:spLocks noGrp="1"/>
-          </p:cNvSpPr>
-          <p:nvPr>
-            <p:ph sz="half" idx="13"/>
-          </p:nvPr>
-        </p:nvSpPr>
-        <p:spPr>
-          <a:xfrm>
-            <a:off x="3899979" y="1784167"/>
-            <a:ext cx="1629991" cy="2415208"/>
-          </a:xfrm>
-          <a:prstGeom prst="rect">
-            <a:avLst/>
-          </a:prstGeom>
-        </p:spPr>
-        <p:txBody>
-          <a:bodyPr vert="horz" lIns="0" tIns="32914" rIns="65828" bIns="32914"/>
-          <a:lstStyle>
-            <a:lvl1pPr marL="0" indent="0">
-              <a:spcBef>
-                <a:spcPts val="720"/>
-              </a:spcBef>
-              <a:buNone/>
-              <a:defRPr sz="2000"/>
-            </a:lvl1pPr>
-            <a:lvl2pPr>
-              <a:spcBef>
-                <a:spcPts val="720"/>
-              </a:spcBef>
-              <a:defRPr sz="2000"/>
-            </a:lvl2pPr>
-            <a:lvl3pPr>
-              <a:spcBef>
-                <a:spcPts val="720"/>
-              </a:spcBef>
-              <a:defRPr sz="2000"/>
-            </a:lvl3pPr>
-            <a:lvl4pPr>
-              <a:spcBef>
-                <a:spcPts val="720"/>
-              </a:spcBef>
-              <a:defRPr sz="2000"/>
-            </a:lvl4pPr>
-            <a:lvl5pPr>
-              <a:spcBef>
-                <a:spcPts val="720"/>
-              </a:spcBef>
-              <a:defRPr sz="2000"/>
-            </a:lvl5pPr>
-            <a:lvl6pPr>
-              <a:defRPr sz="1300"/>
-            </a:lvl6pPr>
-            <a:lvl7pPr>
-              <a:defRPr sz="1300"/>
-            </a:lvl7pPr>
-            <a:lvl8pPr>
-              <a:defRPr sz="1300"/>
-            </a:lvl8pPr>
-            <a:lvl9pPr>
-              <a:defRPr sz="1300"/>
-            </a:lvl9pPr>
-          </a:lstStyle>
-          <a:p>
-            <a:pPr lvl="0"/>
-            <a:endParaRPr lang="en-US" dirty="0"/>
-          </a:p>
-        </p:txBody>
-      </p:sp>
-      <p:sp>
-        <p:nvSpPr>
-          <p:cNvPr id="11" name="Content Placeholder 2"/>
-          <p:cNvSpPr>
-            <a:spLocks noGrp="1"/>
-          </p:cNvSpPr>
-          <p:nvPr>
-            <p:ph sz="half" idx="14"/>
-          </p:nvPr>
-        </p:nvSpPr>
-        <p:spPr>
-          <a:xfrm>
-            <a:off x="6386666" y="1490085"/>
-            <a:ext cx="1693292" cy="2815215"/>
-          </a:xfrm>
-          <a:prstGeom prst="rect">
-            <a:avLst/>
-          </a:prstGeom>
-        </p:spPr>
-        <p:txBody>
-          <a:bodyPr vert="horz" lIns="0" tIns="32914" rIns="65828" bIns="32914"/>
-          <a:lstStyle>
-            <a:lvl1pPr marL="0" indent="0">
-              <a:spcBef>
-                <a:spcPts val="720"/>
-              </a:spcBef>
-              <a:buNone/>
-              <a:defRPr sz="2000"/>
-            </a:lvl1pPr>
-            <a:lvl2pPr>
-              <a:spcBef>
-                <a:spcPts val="720"/>
-              </a:spcBef>
-              <a:defRPr sz="2000"/>
-            </a:lvl2pPr>
-            <a:lvl3pPr>
-              <a:spcBef>
-                <a:spcPts val="720"/>
-              </a:spcBef>
-              <a:defRPr sz="2000"/>
-            </a:lvl3pPr>
-            <a:lvl4pPr>
-              <a:spcBef>
-                <a:spcPts val="720"/>
-              </a:spcBef>
-              <a:defRPr sz="2000"/>
-            </a:lvl4pPr>
-            <a:lvl5pPr>
-              <a:spcBef>
-                <a:spcPts val="720"/>
-              </a:spcBef>
-              <a:defRPr sz="2000"/>
-            </a:lvl5pPr>
-            <a:lvl6pPr>
-              <a:defRPr sz="1300"/>
-            </a:lvl6pPr>
-            <a:lvl7pPr>
-              <a:defRPr sz="1300"/>
-            </a:lvl7pPr>
-            <a:lvl8pPr>
-              <a:defRPr sz="1300"/>
-            </a:lvl8pPr>
-            <a:lvl9pPr>
-              <a:defRPr sz="1300"/>
-            </a:lvl9pPr>
-          </a:lstStyle>
-          <a:p>
-            <a:pPr lvl="0"/>
-            <a:endParaRPr lang="en-US" dirty="0"/>
-          </a:p>
-        </p:txBody>
-      </p:sp>
-      <p:sp>
-        <p:nvSpPr>
-          <p:cNvPr id="12" name="Slide Number Placeholder 3"/>
-          <p:cNvSpPr>
-            <a:spLocks noGrp="1"/>
-          </p:cNvSpPr>
-          <p:nvPr>
-            <p:ph type="sldNum" sz="quarter" idx="15"/>
-          </p:nvPr>
-        </p:nvSpPr>
-        <p:spPr/>
-        <p:txBody>
-          <a:bodyPr/>
-          <a:lstStyle>
-            <a:lvl1pPr>
-              <a:defRPr/>
-            </a:lvl1pPr>
-          </a:lstStyle>
-          <a:p>
-            <a:pPr>
-              <a:defRPr/>
-            </a:pPr>
-            <a:fld id="{7ACDBDE2-F560-4B40-974D-A0F438C3299B}" type="slidenum">
-              <a:rPr lang="en-US"/>
-              <a:pPr>
-                <a:defRPr/>
-              </a:pPr>
-              <a:t>‹#›</a:t>
-            </a:fld>
-            <a:endParaRPr lang="en-US"/>
-          </a:p>
-        </p:txBody>
-      </p:sp>
-    </p:spTree>
-    <p:extLst>
-      <p:ext uri="{BB962C8B-B14F-4D97-AF65-F5344CB8AC3E}">
-        <p14:creationId xmlns:p14="http://schemas.microsoft.com/office/powerpoint/2010/main" val="2326723457"/>
-      </p:ext>
-    </p:extLst>
-  </p:cSld>
-  <p:clrMapOvr>
-    <a:masterClrMapping/>
-  </p:clrMapOvr>
-  <p:transition xmlns:p14="http://schemas.microsoft.com/office/powerpoint/2010/main"/>
-</p:sldLayout>
-</file>
-
 <file path=ppt/slideMasters/slideMaster1.xml><?xml version="1.0" encoding="utf-8"?>
 <p:sldMaster xmlns:a="http://schemas.openxmlformats.org/drawingml/2006/main" xmlns:r="http://schemas.openxmlformats.org/officeDocument/2006/relationships" xmlns:p="http://schemas.openxmlformats.org/presentationml/2006/main">
   <p:cSld>
@@ -6786,6 +7319,7 @@
   <p:sldLayoutIdLst>
     <p:sldLayoutId id="2147484107" r:id="rId1"/>
     <p:sldLayoutId id="2147484108" r:id="rId2"/>
+    <p:sldLayoutId id="2147484116" r:id="rId3"/>
   </p:sldLayoutIdLst>
   <p:transition xmlns:p14="http://schemas.microsoft.com/office/powerpoint/2010/main"/>
   <p:txStyles>
@@ -8137,15 +8671,7 @@
             </a:br>
             <a:r>
               <a:rPr lang="en-US" sz="6000" dirty="0" smtClean="0"/>
-              <a:t>Class </a:t>
-            </a:r>
-            <a:r>
-              <a:rPr lang="en-US" sz="6000" dirty="0" smtClean="0"/>
-              <a:t>3: </a:t>
-            </a:r>
-            <a:r>
-              <a:rPr lang="en-US" sz="6000" dirty="0" smtClean="0"/>
-              <a:t>Data Visualization</a:t>
+              <a:t>Class 3: Data Visualization</a:t>
             </a:r>
             <a:endParaRPr lang="en-US" sz="6000" dirty="0"/>
           </a:p>
@@ -8186,6 +8712,480 @@
       </p:grpSpPr>
       <p:sp>
         <p:nvSpPr>
+          <p:cNvPr id="4" name="Content Placeholder 3"/>
+          <p:cNvSpPr>
+            <a:spLocks noGrp="1"/>
+          </p:cNvSpPr>
+          <p:nvPr>
+            <p:ph sz="quarter" idx="11"/>
+          </p:nvPr>
+        </p:nvSpPr>
+        <p:spPr>
+          <a:xfrm>
+            <a:off x="414337" y="495300"/>
+            <a:ext cx="7162800" cy="304800"/>
+          </a:xfrm>
+        </p:spPr>
+        <p:txBody>
+          <a:bodyPr/>
+          <a:lstStyle/>
+          <a:p>
+            <a:pPr eaLnBrk="1" hangingPunct="1">
+              <a:lnSpc>
+                <a:spcPts val="2448"/>
+              </a:lnSpc>
+              <a:defRPr/>
+            </a:pPr>
+            <a:r>
+              <a:rPr lang="en-US" dirty="0" smtClean="0"/>
+              <a:t>Exercise – why visualize data?</a:t>
+            </a:r>
+          </a:p>
+        </p:txBody>
+      </p:sp>
+      <p:sp>
+        <p:nvSpPr>
+          <p:cNvPr id="8" name="Slide Number Placeholder 3"/>
+          <p:cNvSpPr>
+            <a:spLocks noGrp="1"/>
+          </p:cNvSpPr>
+          <p:nvPr>
+            <p:ph type="sldNum" sz="quarter" idx="13"/>
+          </p:nvPr>
+        </p:nvSpPr>
+        <p:spPr/>
+        <p:txBody>
+          <a:bodyPr/>
+          <a:lstStyle/>
+          <a:p>
+            <a:pPr>
+              <a:defRPr/>
+            </a:pPr>
+            <a:fld id="{BD5AD749-DAD1-6A4A-A2AA-CB20EAD0AEB7}" type="slidenum">
+              <a:rPr lang="en-US"/>
+              <a:pPr>
+                <a:defRPr/>
+              </a:pPr>
+              <a:t>10</a:t>
+            </a:fld>
+            <a:endParaRPr lang="en-US"/>
+          </a:p>
+        </p:txBody>
+      </p:sp>
+      <p:sp>
+        <p:nvSpPr>
+          <p:cNvPr id="7" name="TextBox 6"/>
+          <p:cNvSpPr txBox="1"/>
+          <p:nvPr/>
+        </p:nvSpPr>
+        <p:spPr>
+          <a:xfrm>
+            <a:off x="566737" y="1028700"/>
+            <a:ext cx="3200400" cy="2785378"/>
+          </a:xfrm>
+          <a:prstGeom prst="rect">
+            <a:avLst/>
+          </a:prstGeom>
+          <a:noFill/>
+        </p:spPr>
+        <p:txBody>
+          <a:bodyPr wrap="square" rtlCol="0">
+            <a:spAutoFit/>
+          </a:bodyPr>
+          <a:lstStyle/>
+          <a:p>
+            <a:pPr algn="l"/>
+            <a:r>
+              <a:rPr lang="en-US" sz="2500" dirty="0" smtClean="0">
+                <a:latin typeface="PFDinTextCompPro-Italic"/>
+                <a:cs typeface="PFDinTextCompPro-Italic"/>
+              </a:rPr>
+              <a:t>Now, suppose I give you</a:t>
+            </a:r>
+          </a:p>
+          <a:p>
+            <a:pPr algn="l"/>
+            <a:r>
+              <a:rPr lang="en-US" sz="2500" dirty="0" smtClean="0">
+                <a:latin typeface="PFDinTextCompPro-Italic"/>
+                <a:cs typeface="PFDinTextCompPro-Italic"/>
+              </a:rPr>
+              <a:t>three more datasets</a:t>
+            </a:r>
+          </a:p>
+          <a:p>
+            <a:pPr algn="l"/>
+            <a:r>
+              <a:rPr lang="en-US" sz="2500" dirty="0" smtClean="0">
+                <a:latin typeface="PFDinTextCompPro-Italic"/>
+                <a:cs typeface="PFDinTextCompPro-Italic"/>
+              </a:rPr>
+              <a:t>with exactly the same</a:t>
+            </a:r>
+          </a:p>
+          <a:p>
+            <a:pPr algn="l"/>
+            <a:r>
+              <a:rPr lang="en-US" sz="2500" dirty="0" smtClean="0">
+                <a:latin typeface="PFDinTextCompPro-Italic"/>
+                <a:cs typeface="PFDinTextCompPro-Italic"/>
+              </a:rPr>
+              <a:t>characteristics…</a:t>
+            </a:r>
+          </a:p>
+          <a:p>
+            <a:pPr algn="l"/>
+            <a:endParaRPr lang="en-US" sz="2500" dirty="0">
+              <a:latin typeface="PFDinTextCompPro-Italic"/>
+              <a:cs typeface="PFDinTextCompPro-Italic"/>
+            </a:endParaRPr>
+          </a:p>
+          <a:p>
+            <a:pPr algn="l"/>
+            <a:r>
+              <a:rPr lang="en-US" sz="2500" dirty="0" smtClean="0">
+                <a:latin typeface="PFDinTextCompPro-Italic"/>
+                <a:cs typeface="PFDinTextCompPro-Italic"/>
+              </a:rPr>
+              <a:t>Q: how similar are these datasets?</a:t>
+            </a:r>
+          </a:p>
+        </p:txBody>
+      </p:sp>
+      <p:pic>
+        <p:nvPicPr>
+          <p:cNvPr id="5" name="Picture 4"/>
+          <p:cNvPicPr>
+            <a:picLocks noChangeAspect="1"/>
+          </p:cNvPicPr>
+          <p:nvPr/>
+        </p:nvPicPr>
+        <p:blipFill>
+          <a:blip r:embed="rId3"/>
+          <a:stretch>
+            <a:fillRect/>
+          </a:stretch>
+        </p:blipFill>
+        <p:spPr>
+          <a:xfrm>
+            <a:off x="3843337" y="1197326"/>
+            <a:ext cx="4953000" cy="3565174"/>
+          </a:xfrm>
+          <a:prstGeom prst="rect">
+            <a:avLst/>
+          </a:prstGeom>
+        </p:spPr>
+      </p:pic>
+    </p:spTree>
+    <p:extLst>
+      <p:ext uri="{BB962C8B-B14F-4D97-AF65-F5344CB8AC3E}">
+        <p14:creationId xmlns:p14="http://schemas.microsoft.com/office/powerpoint/2010/main" val="4190355488"/>
+      </p:ext>
+    </p:extLst>
+  </p:cSld>
+  <p:clrMapOvr>
+    <a:masterClrMapping/>
+  </p:clrMapOvr>
+  <p:transition xmlns:p14="http://schemas.microsoft.com/office/powerpoint/2010/main"/>
+  <p:timing>
+    <p:tnLst>
+      <p:par>
+        <p:cTn xmlns:p14="http://schemas.microsoft.com/office/powerpoint/2010/main" id="1" dur="indefinite" restart="never" nodeType="tmRoot"/>
+      </p:par>
+    </p:tnLst>
+  </p:timing>
+</p:sld>
+</file>
+
+<file path=ppt/slides/slide11.xml><?xml version="1.0" encoding="utf-8"?>
+<p:sld xmlns:a="http://schemas.openxmlformats.org/drawingml/2006/main" xmlns:r="http://schemas.openxmlformats.org/officeDocument/2006/relationships" xmlns:p="http://schemas.openxmlformats.org/presentationml/2006/main">
+  <p:cSld>
+    <p:spTree>
+      <p:nvGrpSpPr>
+        <p:cNvPr id="1" name=""/>
+        <p:cNvGrpSpPr/>
+        <p:nvPr/>
+      </p:nvGrpSpPr>
+      <p:grpSpPr>
+        <a:xfrm>
+          <a:off x="0" y="0"/>
+          <a:ext cx="0" cy="0"/>
+          <a:chOff x="0" y="0"/>
+          <a:chExt cx="0" cy="0"/>
+        </a:xfrm>
+      </p:grpSpPr>
+      <p:sp>
+        <p:nvSpPr>
+          <p:cNvPr id="4" name="Content Placeholder 3"/>
+          <p:cNvSpPr>
+            <a:spLocks noGrp="1"/>
+          </p:cNvSpPr>
+          <p:nvPr>
+            <p:ph sz="quarter" idx="11"/>
+          </p:nvPr>
+        </p:nvSpPr>
+        <p:spPr>
+          <a:xfrm>
+            <a:off x="414337" y="495300"/>
+            <a:ext cx="7162800" cy="304800"/>
+          </a:xfrm>
+        </p:spPr>
+        <p:txBody>
+          <a:bodyPr/>
+          <a:lstStyle/>
+          <a:p>
+            <a:pPr eaLnBrk="1" hangingPunct="1">
+              <a:lnSpc>
+                <a:spcPts val="2448"/>
+              </a:lnSpc>
+              <a:defRPr/>
+            </a:pPr>
+            <a:r>
+              <a:rPr lang="en-US" dirty="0" smtClean="0"/>
+              <a:t>Exercise – why visualize data?</a:t>
+            </a:r>
+          </a:p>
+        </p:txBody>
+      </p:sp>
+      <p:sp>
+        <p:nvSpPr>
+          <p:cNvPr id="8" name="Slide Number Placeholder 3"/>
+          <p:cNvSpPr>
+            <a:spLocks noGrp="1"/>
+          </p:cNvSpPr>
+          <p:nvPr>
+            <p:ph type="sldNum" sz="quarter" idx="13"/>
+          </p:nvPr>
+        </p:nvSpPr>
+        <p:spPr/>
+        <p:txBody>
+          <a:bodyPr/>
+          <a:lstStyle/>
+          <a:p>
+            <a:pPr>
+              <a:defRPr/>
+            </a:pPr>
+            <a:fld id="{BD5AD749-DAD1-6A4A-A2AA-CB20EAD0AEB7}" type="slidenum">
+              <a:rPr lang="en-US"/>
+              <a:pPr>
+                <a:defRPr/>
+              </a:pPr>
+              <a:t>11</a:t>
+            </a:fld>
+            <a:endParaRPr lang="en-US"/>
+          </a:p>
+        </p:txBody>
+      </p:sp>
+      <p:sp>
+        <p:nvSpPr>
+          <p:cNvPr id="7" name="TextBox 6"/>
+          <p:cNvSpPr txBox="1"/>
+          <p:nvPr/>
+        </p:nvSpPr>
+        <p:spPr>
+          <a:xfrm>
+            <a:off x="566737" y="1028700"/>
+            <a:ext cx="3200400" cy="3862596"/>
+          </a:xfrm>
+          <a:prstGeom prst="rect">
+            <a:avLst/>
+          </a:prstGeom>
+          <a:noFill/>
+        </p:spPr>
+        <p:txBody>
+          <a:bodyPr wrap="square" rtlCol="0">
+            <a:spAutoFit/>
+          </a:bodyPr>
+          <a:lstStyle/>
+          <a:p>
+            <a:pPr algn="l"/>
+            <a:r>
+              <a:rPr lang="en-US" sz="2500" dirty="0" smtClean="0">
+                <a:latin typeface="PFDinTextCompPro-Italic"/>
+                <a:cs typeface="PFDinTextCompPro-Italic"/>
+              </a:rPr>
+              <a:t>Now, suppose I give you</a:t>
+            </a:r>
+          </a:p>
+          <a:p>
+            <a:pPr algn="l"/>
+            <a:r>
+              <a:rPr lang="en-US" sz="2500" dirty="0" smtClean="0">
+                <a:latin typeface="PFDinTextCompPro-Italic"/>
+                <a:cs typeface="PFDinTextCompPro-Italic"/>
+              </a:rPr>
+              <a:t>three more datasets</a:t>
+            </a:r>
+          </a:p>
+          <a:p>
+            <a:pPr algn="l"/>
+            <a:r>
+              <a:rPr lang="en-US" sz="2500" dirty="0" smtClean="0">
+                <a:latin typeface="PFDinTextCompPro-Italic"/>
+                <a:cs typeface="PFDinTextCompPro-Italic"/>
+              </a:rPr>
+              <a:t>with exactly the same</a:t>
+            </a:r>
+          </a:p>
+          <a:p>
+            <a:pPr algn="l"/>
+            <a:r>
+              <a:rPr lang="en-US" sz="2500" dirty="0" smtClean="0">
+                <a:latin typeface="PFDinTextCompPro-Italic"/>
+                <a:cs typeface="PFDinTextCompPro-Italic"/>
+              </a:rPr>
+              <a:t>characteristics.</a:t>
+            </a:r>
+          </a:p>
+          <a:p>
+            <a:pPr algn="l"/>
+            <a:endParaRPr lang="en-US" sz="2500" dirty="0">
+              <a:latin typeface="PFDinTextCompPro-Italic"/>
+              <a:cs typeface="PFDinTextCompPro-Italic"/>
+            </a:endParaRPr>
+          </a:p>
+          <a:p>
+            <a:pPr algn="l"/>
+            <a:r>
+              <a:rPr lang="en-US" sz="2500" dirty="0" smtClean="0">
+                <a:latin typeface="PFDinTextCompPro-Italic"/>
+                <a:cs typeface="PFDinTextCompPro-Italic"/>
+              </a:rPr>
+              <a:t>Q: how similar are these datasets?</a:t>
+            </a:r>
+          </a:p>
+          <a:p>
+            <a:pPr algn="l"/>
+            <a:endParaRPr lang="en-US" sz="2500" dirty="0">
+              <a:latin typeface="PFDinTextCompPro-Italic"/>
+              <a:cs typeface="PFDinTextCompPro-Italic"/>
+            </a:endParaRPr>
+          </a:p>
+          <a:p>
+            <a:pPr algn="l"/>
+            <a:r>
+              <a:rPr lang="en-US" sz="2500" dirty="0" smtClean="0">
+                <a:latin typeface="PFDinTextCompPro-Italic"/>
+                <a:cs typeface="PFDinTextCompPro-Italic"/>
+              </a:rPr>
+              <a:t>A: not very!</a:t>
+            </a:r>
+          </a:p>
+          <a:p>
+            <a:pPr algn="l"/>
+            <a:endParaRPr lang="en-US" sz="1200" dirty="0" smtClean="0">
+              <a:latin typeface="PFDinTextCompPro-Italic"/>
+              <a:cs typeface="PFDinTextCompPro-Italic"/>
+            </a:endParaRPr>
+          </a:p>
+          <a:p>
+            <a:pPr algn="l"/>
+            <a:r>
+              <a:rPr lang="en-US" sz="800" dirty="0" smtClean="0">
+                <a:latin typeface="+mn-lt"/>
+                <a:cs typeface="PFDinTextCompPro-Italic"/>
+              </a:rPr>
+              <a:t>http</a:t>
+            </a:r>
+            <a:r>
+              <a:rPr lang="en-US" sz="800" dirty="0">
+                <a:latin typeface="+mn-lt"/>
+                <a:cs typeface="PFDinTextCompPro-Italic"/>
+              </a:rPr>
+              <a:t>://</a:t>
+            </a:r>
+            <a:r>
+              <a:rPr lang="en-US" sz="800" dirty="0" err="1">
+                <a:latin typeface="+mn-lt"/>
+                <a:cs typeface="PFDinTextCompPro-Italic"/>
+              </a:rPr>
+              <a:t>en.wikipedia.org</a:t>
+            </a:r>
+            <a:r>
+              <a:rPr lang="en-US" sz="800" dirty="0">
+                <a:latin typeface="+mn-lt"/>
+                <a:cs typeface="PFDinTextCompPro-Italic"/>
+              </a:rPr>
+              <a:t>/wiki/</a:t>
+            </a:r>
+            <a:r>
+              <a:rPr lang="en-US" sz="800" dirty="0" err="1">
+                <a:latin typeface="+mn-lt"/>
+                <a:cs typeface="PFDinTextCompPro-Italic"/>
+              </a:rPr>
+              <a:t>Anscombe's_quartet</a:t>
+            </a:r>
+            <a:endParaRPr lang="en-US" sz="800" dirty="0" smtClean="0">
+              <a:latin typeface="+mn-lt"/>
+              <a:cs typeface="PFDinTextCompPro-Italic"/>
+            </a:endParaRPr>
+          </a:p>
+        </p:txBody>
+      </p:sp>
+      <p:pic>
+        <p:nvPicPr>
+          <p:cNvPr id="2" name="Picture 1"/>
+          <p:cNvPicPr>
+            <a:picLocks/>
+          </p:cNvPicPr>
+          <p:nvPr/>
+        </p:nvPicPr>
+        <p:blipFill>
+          <a:blip r:embed="rId3"/>
+          <a:stretch>
+            <a:fillRect/>
+          </a:stretch>
+        </p:blipFill>
+        <p:spPr>
+          <a:xfrm>
+            <a:off x="3840289" y="1196340"/>
+            <a:ext cx="4937760" cy="3584448"/>
+          </a:xfrm>
+          <a:prstGeom prst="rect">
+            <a:avLst/>
+          </a:prstGeom>
+        </p:spPr>
+      </p:pic>
+    </p:spTree>
+    <p:extLst>
+      <p:ext uri="{BB962C8B-B14F-4D97-AF65-F5344CB8AC3E}">
+        <p14:creationId xmlns:p14="http://schemas.microsoft.com/office/powerpoint/2010/main" val="1591543434"/>
+      </p:ext>
+    </p:extLst>
+  </p:cSld>
+  <p:clrMapOvr>
+    <a:masterClrMapping/>
+  </p:clrMapOvr>
+  <p:transition xmlns:p14="http://schemas.microsoft.com/office/powerpoint/2010/main"/>
+  <p:timing>
+    <p:tnLst>
+      <p:par>
+        <p:cTn xmlns:p14="http://schemas.microsoft.com/office/powerpoint/2010/main" id="1" dur="indefinite" restart="never" nodeType="tmRoot"/>
+      </p:par>
+    </p:tnLst>
+  </p:timing>
+</p:sld>
+</file>
+
+<file path=ppt/slides/slide12.xml><?xml version="1.0" encoding="utf-8"?>
+<p:sld xmlns:a="http://schemas.openxmlformats.org/drawingml/2006/main" xmlns:r="http://schemas.openxmlformats.org/officeDocument/2006/relationships" xmlns:p="http://schemas.openxmlformats.org/presentationml/2006/main">
+  <p:cSld>
+    <p:spTree>
+      <p:nvGrpSpPr>
+        <p:cNvPr id="1" name=""/>
+        <p:cNvGrpSpPr/>
+        <p:nvPr/>
+      </p:nvGrpSpPr>
+      <p:grpSpPr>
+        <a:xfrm>
+          <a:off x="0" y="0"/>
+          <a:ext cx="0" cy="0"/>
+          <a:chOff x="0" y="0"/>
+          <a:chExt cx="0" cy="0"/>
+        </a:xfrm>
+      </p:grpSpPr>
+      <p:sp>
+        <p:nvSpPr>
           <p:cNvPr id="2" name="Title 1"/>
           <p:cNvSpPr>
             <a:spLocks noGrp="1"/>
@@ -8209,14 +9209,15 @@
             </a:pPr>
             <a:r>
               <a:rPr lang="en-US" sz="7500" dirty="0" smtClean="0"/>
-              <a:t/>
-            </a:r>
-            <a:br>
+              <a:t>II. Visualization </a:t>
+            </a:r>
+            <a:r>
               <a:rPr lang="en-US" sz="7500" dirty="0" smtClean="0"/>
-            </a:br>
+              <a:t>as a </a:t>
+            </a:r>
             <a:r>
               <a:rPr lang="en-US" sz="7500" dirty="0" smtClean="0"/>
-              <a:t>DISCUSSION</a:t>
+              <a:t> medium</a:t>
             </a:r>
             <a:endParaRPr lang="en-US" sz="7500" dirty="0"/>
           </a:p>
@@ -8266,7 +9267,117 @@
     </p:spTree>
     <p:extLst>
       <p:ext uri="{BB962C8B-B14F-4D97-AF65-F5344CB8AC3E}">
-        <p14:creationId xmlns:p14="http://schemas.microsoft.com/office/powerpoint/2010/main" val="495630841"/>
+        <p14:creationId xmlns:p14="http://schemas.microsoft.com/office/powerpoint/2010/main" val="4293879031"/>
+      </p:ext>
+    </p:extLst>
+  </p:cSld>
+  <p:clrMapOvr>
+    <a:masterClrMapping/>
+  </p:clrMapOvr>
+  <p:transition xmlns:p14="http://schemas.microsoft.com/office/powerpoint/2010/main"/>
+  <p:timing>
+    <p:tnLst>
+      <p:par>
+        <p:cTn xmlns:p14="http://schemas.microsoft.com/office/powerpoint/2010/main" id="1" dur="indefinite" restart="never" nodeType="tmRoot"/>
+      </p:par>
+    </p:tnLst>
+  </p:timing>
+</p:sld>
+</file>
+
+<file path=ppt/slides/slide13.xml><?xml version="1.0" encoding="utf-8"?>
+<p:sld xmlns:a="http://schemas.openxmlformats.org/drawingml/2006/main" xmlns:r="http://schemas.openxmlformats.org/officeDocument/2006/relationships" xmlns:p="http://schemas.openxmlformats.org/presentationml/2006/main">
+  <p:cSld>
+    <p:spTree>
+      <p:nvGrpSpPr>
+        <p:cNvPr id="1" name=""/>
+        <p:cNvGrpSpPr/>
+        <p:nvPr/>
+      </p:nvGrpSpPr>
+      <p:grpSpPr>
+        <a:xfrm>
+          <a:off x="0" y="0"/>
+          <a:ext cx="0" cy="0"/>
+          <a:chOff x="0" y="0"/>
+          <a:chExt cx="0" cy="0"/>
+        </a:xfrm>
+      </p:grpSpPr>
+      <p:sp>
+        <p:nvSpPr>
+          <p:cNvPr id="2" name="Title 1"/>
+          <p:cNvSpPr>
+            <a:spLocks noGrp="1"/>
+          </p:cNvSpPr>
+          <p:nvPr>
+            <p:ph type="title"/>
+          </p:nvPr>
+        </p:nvSpPr>
+        <p:spPr>
+          <a:xfrm>
+            <a:off x="347663" y="3238500"/>
+            <a:ext cx="8426450" cy="1828800"/>
+          </a:xfrm>
+        </p:spPr>
+        <p:txBody>
+          <a:bodyPr/>
+          <a:lstStyle/>
+          <a:p>
+            <a:pPr>
+              <a:defRPr/>
+            </a:pPr>
+            <a:r>
+              <a:rPr lang="en-US" sz="7500" dirty="0" smtClean="0"/>
+              <a:t>III. Visualization in R</a:t>
+            </a:r>
+            <a:endParaRPr lang="en-US" sz="7500" dirty="0"/>
+          </a:p>
+        </p:txBody>
+      </p:sp>
+      <p:sp>
+        <p:nvSpPr>
+          <p:cNvPr id="4" name="Content Placeholder 3"/>
+          <p:cNvSpPr>
+            <a:spLocks noGrp="1"/>
+          </p:cNvSpPr>
+          <p:nvPr>
+            <p:ph sz="quarter" idx="11"/>
+          </p:nvPr>
+        </p:nvSpPr>
+        <p:spPr>
+          <a:xfrm>
+            <a:off x="371475" y="495300"/>
+            <a:ext cx="6400800" cy="304800"/>
+          </a:xfrm>
+        </p:spPr>
+        <p:txBody>
+          <a:bodyPr wrap="square" lIns="91440" tIns="45720" rIns="91440" bIns="45720" numCol="1" anchor="t" anchorCtr="0" compatLnSpc="1">
+            <a:prstTxWarp prst="textNoShape">
+              <a:avLst/>
+            </a:prstTxWarp>
+          </a:bodyPr>
+          <a:lstStyle/>
+          <a:p>
+            <a:pPr marL="0" indent="0"/>
+            <a:r>
+              <a:rPr lang="en-US" cap="none" dirty="0" smtClean="0">
+                <a:latin typeface="PFDinTextCompPro-Bold" charset="0"/>
+                <a:ea typeface="ヒラギノ角ゴ ProN W3" charset="0"/>
+                <a:cs typeface="ヒラギノ角ゴ ProN W3" charset="0"/>
+              </a:rPr>
+              <a:t>INTRO TO DATA SCIENCE</a:t>
+            </a:r>
+            <a:endParaRPr lang="en-US" cap="none" dirty="0">
+              <a:latin typeface="PFDinTextCompPro-Bold" charset="0"/>
+              <a:ea typeface="ヒラギノ角ゴ ProN W3" charset="0"/>
+              <a:cs typeface="ヒラギノ角ゴ ProN W3" charset="0"/>
+            </a:endParaRPr>
+          </a:p>
+        </p:txBody>
+      </p:sp>
+    </p:spTree>
+    <p:extLst>
+      <p:ext uri="{BB962C8B-B14F-4D97-AF65-F5344CB8AC3E}">
+        <p14:creationId xmlns:p14="http://schemas.microsoft.com/office/powerpoint/2010/main" val="755849202"/>
       </p:ext>
     </p:extLst>
   </p:cSld>
@@ -8303,84 +9414,275 @@
       </p:grpSpPr>
       <p:sp>
         <p:nvSpPr>
-          <p:cNvPr id="2" name="Title 1"/>
+          <p:cNvPr id="19457" name="Title 1"/>
           <p:cNvSpPr>
             <a:spLocks noGrp="1"/>
           </p:cNvSpPr>
           <p:nvPr>
-            <p:ph type="title"/>
-          </p:nvPr>
-        </p:nvSpPr>
-        <p:spPr>
+            <p:ph type="ctrTitle"/>
+          </p:nvPr>
+        </p:nvSpPr>
+        <p:spPr bwMode="auto">
           <a:xfrm>
-            <a:off x="347663" y="3238500"/>
-            <a:ext cx="8426450" cy="1828800"/>
+            <a:off x="442913" y="1066800"/>
+            <a:ext cx="8429625" cy="3695700"/>
           </a:xfrm>
-        </p:spPr>
-        <p:txBody>
-          <a:bodyPr/>
-          <a:lstStyle/>
-          <a:p>
-            <a:pPr>
-              <a:defRPr/>
-            </a:pPr>
-            <a:r>
-              <a:rPr lang="en-US" sz="7500" dirty="0" smtClean="0"/>
-              <a:t>I. </a:t>
-            </a:r>
-            <a:r>
-              <a:rPr lang="en-US" sz="7500" dirty="0" smtClean="0"/>
-              <a:t>Visualizations as a medium</a:t>
-            </a:r>
-            <a:endParaRPr lang="en-US" sz="7500" dirty="0"/>
-          </a:p>
-        </p:txBody>
-      </p:sp>
-      <p:sp>
-        <p:nvSpPr>
-          <p:cNvPr id="4" name="Content Placeholder 3"/>
-          <p:cNvSpPr>
-            <a:spLocks noGrp="1"/>
-          </p:cNvSpPr>
-          <p:nvPr>
-            <p:ph sz="quarter" idx="11"/>
-          </p:nvPr>
-        </p:nvSpPr>
-        <p:spPr>
-          <a:xfrm>
-            <a:off x="371475" y="495300"/>
-            <a:ext cx="6400800" cy="304800"/>
-          </a:xfrm>
-        </p:spPr>
-        <p:txBody>
-          <a:bodyPr wrap="square" lIns="91440" tIns="45720" rIns="91440" bIns="45720" numCol="1" anchor="t" anchorCtr="0" compatLnSpc="1">
+          <a:extLst>
+            <a:ext uri="{909E8E84-426E-40dd-AFC4-6F175D3DCCD1}">
+              <a14:hiddenFill xmlns:a14="http://schemas.microsoft.com/office/drawing/2010/main">
+                <a:solidFill>
+                  <a:srgbClr val="FFFFFF"/>
+                </a:solidFill>
+              </a14:hiddenFill>
+            </a:ext>
+            <a:ext uri="{91240B29-F687-4f45-9708-019B960494DF}">
+              <a14:hiddenLine xmlns:a14="http://schemas.microsoft.com/office/drawing/2010/main" w="9525">
+                <a:solidFill>
+                  <a:srgbClr val="000000"/>
+                </a:solidFill>
+                <a:miter lim="800000"/>
+                <a:headEnd/>
+                <a:tailEnd/>
+              </a14:hiddenLine>
+            </a:ext>
+            <a:ext uri="{FAA26D3D-D897-4be2-8F04-BA451C77F1D7}">
+              <ma14:placeholderFlag xmlns:ma14="http://schemas.microsoft.com/office/mac/drawingml/2011/main" val="1"/>
+            </a:ext>
+          </a:extLst>
+        </p:spPr>
+        <p:txBody>
+          <a:bodyPr wrap="square" numCol="1" anchor="t" anchorCtr="0" compatLnSpc="1">
             <a:prstTxWarp prst="textNoShape">
               <a:avLst/>
             </a:prstTxWarp>
           </a:bodyPr>
           <a:lstStyle/>
           <a:p>
-            <a:pPr marL="0" indent="0"/>
-            <a:r>
-              <a:rPr lang="en-US" cap="none" dirty="0" smtClean="0">
+            <a:pPr>
+              <a:lnSpc>
+                <a:spcPts val="3600"/>
+              </a:lnSpc>
+              <a:defRPr/>
+            </a:pPr>
+            <a:r>
+              <a:rPr lang="en-US" sz="3000" dirty="0" smtClean="0">
                 <a:latin typeface="PFDinTextCompPro-Bold" charset="0"/>
-                <a:ea typeface="ヒラギノ角ゴ ProN W3" charset="0"/>
-                <a:cs typeface="ヒラギノ角ゴ ProN W3" charset="0"/>
+                <a:ea typeface="ヒラギノ角ゴ ProN W6" charset="0"/>
+                <a:cs typeface="ヒラギノ角ゴ ProN W6" charset="0"/>
               </a:rPr>
-              <a:t>INTRO TO DATA SCIENCE</a:t>
-            </a:r>
-            <a:endParaRPr lang="en-US" cap="none" dirty="0">
+              <a:t/>
+            </a:r>
+            <a:br>
+              <a:rPr lang="en-US" sz="3000" dirty="0" smtClean="0">
+                <a:latin typeface="PFDinTextCompPro-Bold" charset="0"/>
+                <a:ea typeface="ヒラギノ角ゴ ProN W6" charset="0"/>
+                <a:cs typeface="ヒラギノ角ゴ ProN W6" charset="0"/>
+              </a:rPr>
+            </a:br>
+            <a:r>
+              <a:rPr lang="en-US" sz="3000" dirty="0" smtClean="0">
+                <a:latin typeface="PFDinTextCompPro-Bold" charset="0"/>
+                <a:ea typeface="ヒラギノ角ゴ ProN W6" charset="0"/>
+                <a:cs typeface="ヒラギノ角ゴ ProN W6" charset="0"/>
+              </a:rPr>
+              <a:t>I</a:t>
+            </a:r>
+            <a:r>
+              <a:rPr lang="en-US" sz="3000" dirty="0" smtClean="0">
+                <a:latin typeface="PFDinTextCompPro-Bold" charset="0"/>
+                <a:ea typeface="ヒラギノ角ゴ ProN W6" charset="0"/>
+                <a:cs typeface="ヒラギノ角ゴ ProN W6" charset="0"/>
+              </a:rPr>
+              <a:t>. </a:t>
+            </a:r>
+            <a:r>
+              <a:rPr lang="en-US" sz="3000" dirty="0" smtClean="0">
+                <a:latin typeface="PFDinTextCompPro-Bold" charset="0"/>
+                <a:ea typeface="ヒラギノ角ゴ ProN W6" charset="0"/>
+                <a:cs typeface="ヒラギノ角ゴ ProN W6" charset="0"/>
+              </a:rPr>
+              <a:t>The importance of visualization</a:t>
+            </a:r>
+            <a:r>
+              <a:rPr lang="en-US" sz="3000" dirty="0" smtClean="0">
+                <a:latin typeface="PFDinTextCompPro-Bold" charset="0"/>
+                <a:ea typeface="ヒラギノ角ゴ ProN W6" charset="0"/>
+                <a:cs typeface="ヒラギノ角ゴ ProN W6" charset="0"/>
+              </a:rPr>
+              <a:t/>
+            </a:r>
+            <a:br>
+              <a:rPr lang="en-US" sz="3000" dirty="0" smtClean="0">
+                <a:latin typeface="PFDinTextCompPro-Bold" charset="0"/>
+                <a:ea typeface="ヒラギノ角ゴ ProN W6" charset="0"/>
+                <a:cs typeface="ヒラギノ角ゴ ProN W6" charset="0"/>
+              </a:rPr>
+            </a:br>
+            <a:r>
+              <a:rPr lang="en-US" sz="3000" dirty="0" smtClean="0">
+                <a:latin typeface="PFDinTextCompPro-Bold" charset="0"/>
+                <a:ea typeface="ヒラギノ角ゴ ProN W6" charset="0"/>
+                <a:cs typeface="ヒラギノ角ゴ ProN W6" charset="0"/>
+              </a:rPr>
+              <a:t>II. </a:t>
+            </a:r>
+            <a:r>
+              <a:rPr lang="en-US" sz="3000" dirty="0" smtClean="0">
+                <a:latin typeface="PFDinTextCompPro-Bold" charset="0"/>
+                <a:ea typeface="ヒラギノ角ゴ ProN W6" charset="0"/>
+                <a:cs typeface="ヒラギノ角ゴ ProN W6" charset="0"/>
+              </a:rPr>
+              <a:t>Visualization as a medium</a:t>
+            </a:r>
+            <a:r>
+              <a:rPr lang="en-US" sz="3000" dirty="0" smtClean="0">
+                <a:latin typeface="PFDinTextCompPro-Bold" charset="0"/>
+                <a:ea typeface="ヒラギノ角ゴ ProN W6" charset="0"/>
+                <a:cs typeface="ヒラギノ角ゴ ProN W6" charset="0"/>
+              </a:rPr>
+              <a:t/>
+            </a:r>
+            <a:br>
+              <a:rPr lang="en-US" sz="3000" dirty="0" smtClean="0">
+                <a:latin typeface="PFDinTextCompPro-Bold" charset="0"/>
+                <a:ea typeface="ヒラギノ角ゴ ProN W6" charset="0"/>
+                <a:cs typeface="ヒラギノ角ゴ ProN W6" charset="0"/>
+              </a:rPr>
+            </a:br>
+            <a:r>
+              <a:rPr lang="en-US" sz="3000" dirty="0" smtClean="0">
+                <a:latin typeface="PFDinTextCompPro-Bold" charset="0"/>
+                <a:ea typeface="ヒラギノ角ゴ ProN W6" charset="0"/>
+                <a:cs typeface="ヒラギノ角ゴ ProN W6" charset="0"/>
+              </a:rPr>
+              <a:t/>
+            </a:r>
+            <a:br>
+              <a:rPr lang="en-US" sz="3000" dirty="0" smtClean="0">
+                <a:latin typeface="PFDinTextCompPro-Bold" charset="0"/>
+                <a:ea typeface="ヒラギノ角ゴ ProN W6" charset="0"/>
+                <a:cs typeface="ヒラギノ角ゴ ProN W6" charset="0"/>
+              </a:rPr>
+            </a:br>
+            <a:r>
+              <a:rPr lang="en-US" sz="3000" dirty="0" smtClean="0">
+                <a:latin typeface="PFDinTextCompPro-Bold" charset="0"/>
+                <a:ea typeface="ヒラギノ角ゴ ProN W6" charset="0"/>
+                <a:cs typeface="ヒラギノ角ゴ ProN W6" charset="0"/>
+              </a:rPr>
+              <a:t>Lab:</a:t>
+            </a:r>
+            <a:br>
+              <a:rPr lang="en-US" sz="3000" dirty="0" smtClean="0">
+                <a:latin typeface="PFDinTextCompPro-Bold" charset="0"/>
+                <a:ea typeface="ヒラギノ角ゴ ProN W6" charset="0"/>
+                <a:cs typeface="ヒラギノ角ゴ ProN W6" charset="0"/>
+              </a:rPr>
+            </a:br>
+            <a:r>
+              <a:rPr lang="en-US" sz="3000" dirty="0" smtClean="0">
+                <a:latin typeface="PFDinTextCompPro-Bold" charset="0"/>
+                <a:ea typeface="ヒラギノ角ゴ ProN W6" charset="0"/>
+                <a:cs typeface="ヒラギノ角ゴ ProN W6" charset="0"/>
+              </a:rPr>
+              <a:t>III. </a:t>
+            </a:r>
+            <a:r>
+              <a:rPr lang="en-US" sz="3000" dirty="0" smtClean="0">
+                <a:latin typeface="PFDinTextCompPro-Bold" charset="0"/>
+                <a:ea typeface="ヒラギノ角ゴ ProN W6" charset="0"/>
+                <a:cs typeface="ヒラギノ角ゴ ProN W6" charset="0"/>
+              </a:rPr>
+              <a:t>Visualization in R</a:t>
+            </a:r>
+            <a:endParaRPr lang="en-US" sz="3000" cap="none" dirty="0">
               <a:latin typeface="PFDinTextCompPro-Bold" charset="0"/>
-              <a:ea typeface="ヒラギノ角ゴ ProN W3" charset="0"/>
-              <a:cs typeface="ヒラギノ角ゴ ProN W3" charset="0"/>
+              <a:ea typeface="ヒラギノ角ゴ ProN W6" charset="0"/>
+              <a:cs typeface="ヒラギノ角ゴ ProN W6" charset="0"/>
             </a:endParaRPr>
+          </a:p>
+        </p:txBody>
+      </p:sp>
+      <p:sp>
+        <p:nvSpPr>
+          <p:cNvPr id="11" name="Content Placeholder 10"/>
+          <p:cNvSpPr>
+            <a:spLocks noGrp="1"/>
+          </p:cNvSpPr>
+          <p:nvPr>
+            <p:ph sz="quarter" idx="11"/>
+          </p:nvPr>
+        </p:nvSpPr>
+        <p:spPr>
+          <a:xfrm>
+            <a:off x="371475" y="495300"/>
+            <a:ext cx="7129463" cy="304800"/>
+          </a:xfrm>
+        </p:spPr>
+        <p:txBody>
+          <a:bodyPr/>
+          <a:lstStyle/>
+          <a:p>
+            <a:pPr eaLnBrk="1" hangingPunct="1">
+              <a:lnSpc>
+                <a:spcPts val="2448"/>
+              </a:lnSpc>
+              <a:defRPr/>
+            </a:pPr>
+            <a:r>
+              <a:rPr lang="en-US" dirty="0" smtClean="0">
+                <a:latin typeface="PFDinTextCompPro-Bold" charset="0"/>
+                <a:ea typeface="ＭＳ Ｐゴシック" charset="0"/>
+                <a:cs typeface="PFDinTextCompPro-Bold" charset="0"/>
+                <a:sym typeface="PFDinTextCompPro-Bold" charset="0"/>
+              </a:rPr>
+              <a:t>agenda</a:t>
+            </a:r>
+          </a:p>
+          <a:p>
+            <a:pPr eaLnBrk="1" hangingPunct="1">
+              <a:lnSpc>
+                <a:spcPts val="2448"/>
+              </a:lnSpc>
+              <a:defRPr/>
+            </a:pPr>
+            <a:endParaRPr lang="en-US" dirty="0" smtClean="0"/>
+          </a:p>
+        </p:txBody>
+      </p:sp>
+      <p:sp>
+        <p:nvSpPr>
+          <p:cNvPr id="6" name="Slide Number Placeholder 3"/>
+          <p:cNvSpPr>
+            <a:spLocks noGrp="1"/>
+          </p:cNvSpPr>
+          <p:nvPr>
+            <p:ph type="sldNum" sz="quarter" idx="13"/>
+          </p:nvPr>
+        </p:nvSpPr>
+        <p:spPr/>
+        <p:txBody>
+          <a:bodyPr/>
+          <a:lstStyle/>
+          <a:p>
+            <a:pPr>
+              <a:defRPr/>
+            </a:pPr>
+            <a:fld id="{6F4A1B40-4074-4A43-A415-862C3E2C2127}" type="slidenum">
+              <a:rPr lang="en-US"/>
+              <a:pPr>
+                <a:defRPr/>
+              </a:pPr>
+              <a:t>2</a:t>
+            </a:fld>
+            <a:endParaRPr lang="en-US"/>
           </a:p>
         </p:txBody>
       </p:sp>
     </p:spTree>
     <p:extLst>
       <p:ext uri="{BB962C8B-B14F-4D97-AF65-F5344CB8AC3E}">
-        <p14:creationId xmlns:p14="http://schemas.microsoft.com/office/powerpoint/2010/main" val="3404788133"/>
+        <p14:creationId xmlns:p14="http://schemas.microsoft.com/office/powerpoint/2010/main" val="2716250118"/>
       </p:ext>
     </p:extLst>
   </p:cSld>
@@ -8417,48 +9719,20 @@
       </p:grpSpPr>
       <p:sp>
         <p:nvSpPr>
-          <p:cNvPr id="4" name="Content Placeholder 3"/>
+          <p:cNvPr id="2" name="Title 1"/>
           <p:cNvSpPr>
             <a:spLocks noGrp="1"/>
           </p:cNvSpPr>
           <p:nvPr>
-            <p:ph sz="quarter" idx="11"/>
+            <p:ph type="title"/>
           </p:nvPr>
         </p:nvSpPr>
         <p:spPr>
           <a:xfrm>
-            <a:off x="414337" y="495300"/>
-            <a:ext cx="7162800" cy="304800"/>
+            <a:off x="347663" y="3238500"/>
+            <a:ext cx="8426450" cy="1828800"/>
           </a:xfrm>
         </p:spPr>
-        <p:txBody>
-          <a:bodyPr/>
-          <a:lstStyle/>
-          <a:p>
-            <a:pPr eaLnBrk="1" hangingPunct="1">
-              <a:lnSpc>
-                <a:spcPts val="2448"/>
-              </a:lnSpc>
-              <a:defRPr/>
-            </a:pPr>
-            <a:r>
-              <a:rPr lang="en-US" dirty="0" smtClean="0"/>
-              <a:t>Exercise – why visualize data?</a:t>
-            </a:r>
-          </a:p>
-        </p:txBody>
-      </p:sp>
-      <p:sp>
-        <p:nvSpPr>
-          <p:cNvPr id="8" name="Slide Number Placeholder 3"/>
-          <p:cNvSpPr>
-            <a:spLocks noGrp="1"/>
-          </p:cNvSpPr>
-          <p:nvPr>
-            <p:ph type="sldNum" sz="quarter" idx="13"/>
-          </p:nvPr>
-        </p:nvSpPr>
-        <p:spPr/>
         <p:txBody>
           <a:bodyPr/>
           <a:lstStyle/>
@@ -8466,92 +9740,63 @@
             <a:pPr>
               <a:defRPr/>
             </a:pPr>
-            <a:fld id="{BD5AD749-DAD1-6A4A-A2AA-CB20EAD0AEB7}" type="slidenum">
-              <a:rPr lang="en-US"/>
-              <a:pPr>
-                <a:defRPr/>
-              </a:pPr>
-              <a:t>3</a:t>
-            </a:fld>
-            <a:endParaRPr lang="en-US"/>
-          </a:p>
-        </p:txBody>
-      </p:sp>
-      <p:sp>
-        <p:nvSpPr>
-          <p:cNvPr id="7" name="TextBox 6"/>
-          <p:cNvSpPr txBox="1"/>
-          <p:nvPr/>
+            <a:r>
+              <a:rPr lang="en-US" sz="7500" dirty="0" smtClean="0"/>
+              <a:t>I. </a:t>
+            </a:r>
+            <a:r>
+              <a:rPr lang="en-US" sz="7500" dirty="0" smtClean="0"/>
+              <a:t>The importance of visualization</a:t>
+            </a:r>
+            <a:endParaRPr lang="en-US" sz="7500" dirty="0"/>
+          </a:p>
+        </p:txBody>
+      </p:sp>
+      <p:sp>
+        <p:nvSpPr>
+          <p:cNvPr id="4" name="Content Placeholder 3"/>
+          <p:cNvSpPr>
+            <a:spLocks noGrp="1"/>
+          </p:cNvSpPr>
+          <p:nvPr>
+            <p:ph sz="quarter" idx="11"/>
+          </p:nvPr>
         </p:nvSpPr>
         <p:spPr>
           <a:xfrm>
-            <a:off x="563131" y="1257300"/>
-            <a:ext cx="3870197" cy="1015663"/>
+            <a:off x="371475" y="495300"/>
+            <a:ext cx="6400800" cy="304800"/>
           </a:xfrm>
-          <a:prstGeom prst="rect">
-            <a:avLst/>
-          </a:prstGeom>
-          <a:noFill/>
-        </p:spPr>
-        <p:txBody>
-          <a:bodyPr wrap="none" rtlCol="0">
-            <a:spAutoFit/>
+        </p:spPr>
+        <p:txBody>
+          <a:bodyPr wrap="square" lIns="91440" tIns="45720" rIns="91440" bIns="45720" numCol="1" anchor="t" anchorCtr="0" compatLnSpc="1">
+            <a:prstTxWarp prst="textNoShape">
+              <a:avLst/>
+            </a:prstTxWarp>
           </a:bodyPr>
           <a:lstStyle/>
           <a:p>
-            <a:pPr algn="l"/>
-            <a:r>
-              <a:rPr lang="en-US" sz="3000" dirty="0" smtClean="0">
-                <a:latin typeface="PFDinTextCompPro-Italic"/>
-                <a:cs typeface="PFDinTextCompPro-Italic"/>
+            <a:pPr marL="0" indent="0"/>
+            <a:r>
+              <a:rPr lang="en-US" cap="none" dirty="0" smtClean="0">
+                <a:latin typeface="PFDinTextCompPro-Bold" charset="0"/>
+                <a:ea typeface="ヒラギノ角ゴ ProN W3" charset="0"/>
+                <a:cs typeface="ヒラギノ角ゴ ProN W3" charset="0"/>
               </a:rPr>
-              <a:t>Consider the following dataset:</a:t>
-            </a:r>
-            <a:endParaRPr lang="en-US" sz="3000" dirty="0"/>
-          </a:p>
-          <a:p>
-            <a:pPr marL="457200" indent="-457200" algn="l">
-              <a:buFontTx/>
-              <a:buChar char="-"/>
-            </a:pPr>
-            <a:r>
-              <a:rPr lang="en-US" sz="3000" dirty="0" smtClean="0">
-                <a:latin typeface="PFDinTextCompPro-Italic"/>
-                <a:cs typeface="PFDinTextCompPro-Italic"/>
-              </a:rPr>
-              <a:t>eleven (x, y) points</a:t>
-            </a:r>
-          </a:p>
-        </p:txBody>
-      </p:sp>
-      <p:pic>
-        <p:nvPicPr>
-          <p:cNvPr id="2" name="Picture 1"/>
-          <p:cNvPicPr>
-            <a:picLocks noChangeAspect="1"/>
-          </p:cNvPicPr>
-          <p:nvPr/>
-        </p:nvPicPr>
-        <p:blipFill>
-          <a:blip r:embed="rId3"/>
-          <a:stretch>
-            <a:fillRect/>
-          </a:stretch>
-        </p:blipFill>
-        <p:spPr>
-          <a:xfrm>
-            <a:off x="5672137" y="2692400"/>
-            <a:ext cx="3335148" cy="2374900"/>
-          </a:xfrm>
-          <a:prstGeom prst="rect">
-            <a:avLst/>
-          </a:prstGeom>
-        </p:spPr>
-      </p:pic>
+              <a:t>INTRO TO DATA SCIENCE</a:t>
+            </a:r>
+            <a:endParaRPr lang="en-US" cap="none" dirty="0">
+              <a:latin typeface="PFDinTextCompPro-Bold" charset="0"/>
+              <a:ea typeface="ヒラギノ角ゴ ProN W3" charset="0"/>
+              <a:cs typeface="ヒラギノ角ゴ ProN W3" charset="0"/>
+            </a:endParaRPr>
+          </a:p>
+        </p:txBody>
+      </p:sp>
     </p:spTree>
     <p:extLst>
       <p:ext uri="{BB962C8B-B14F-4D97-AF65-F5344CB8AC3E}">
-        <p14:creationId xmlns:p14="http://schemas.microsoft.com/office/powerpoint/2010/main" val="3805023845"/>
+        <p14:creationId xmlns:p14="http://schemas.microsoft.com/office/powerpoint/2010/main" val="3404788133"/>
       </p:ext>
     </p:extLst>
   </p:cSld>
@@ -8588,48 +9833,20 @@
       </p:grpSpPr>
       <p:sp>
         <p:nvSpPr>
-          <p:cNvPr id="4" name="Content Placeholder 3"/>
+          <p:cNvPr id="2" name="Title 1"/>
           <p:cNvSpPr>
             <a:spLocks noGrp="1"/>
           </p:cNvSpPr>
           <p:nvPr>
-            <p:ph sz="quarter" idx="11"/>
+            <p:ph type="title"/>
           </p:nvPr>
         </p:nvSpPr>
         <p:spPr>
           <a:xfrm>
-            <a:off x="414337" y="495300"/>
-            <a:ext cx="7162800" cy="304800"/>
+            <a:off x="347663" y="1485900"/>
+            <a:ext cx="8426450" cy="3581400"/>
           </a:xfrm>
         </p:spPr>
-        <p:txBody>
-          <a:bodyPr/>
-          <a:lstStyle/>
-          <a:p>
-            <a:pPr eaLnBrk="1" hangingPunct="1">
-              <a:lnSpc>
-                <a:spcPts val="2448"/>
-              </a:lnSpc>
-              <a:defRPr/>
-            </a:pPr>
-            <a:r>
-              <a:rPr lang="en-US" dirty="0" smtClean="0"/>
-              <a:t>Exercise – why visualize data?</a:t>
-            </a:r>
-          </a:p>
-        </p:txBody>
-      </p:sp>
-      <p:sp>
-        <p:nvSpPr>
-          <p:cNvPr id="8" name="Slide Number Placeholder 3"/>
-          <p:cNvSpPr>
-            <a:spLocks noGrp="1"/>
-          </p:cNvSpPr>
-          <p:nvPr>
-            <p:ph type="sldNum" sz="quarter" idx="13"/>
-          </p:nvPr>
-        </p:nvSpPr>
-        <p:spPr/>
         <p:txBody>
           <a:bodyPr/>
           <a:lstStyle/>
@@ -8637,105 +9854,81 @@
             <a:pPr>
               <a:defRPr/>
             </a:pPr>
-            <a:fld id="{BD5AD749-DAD1-6A4A-A2AA-CB20EAD0AEB7}" type="slidenum">
-              <a:rPr lang="en-US"/>
-              <a:pPr>
-                <a:defRPr/>
-              </a:pPr>
-              <a:t>4</a:t>
-            </a:fld>
-            <a:endParaRPr lang="en-US"/>
-          </a:p>
-        </p:txBody>
-      </p:sp>
-      <p:sp>
-        <p:nvSpPr>
-          <p:cNvPr id="7" name="TextBox 6"/>
-          <p:cNvSpPr txBox="1"/>
-          <p:nvPr/>
+            <a:r>
+              <a:rPr lang="en-US" sz="7500" dirty="0" smtClean="0"/>
+              <a:t>Visualization</a:t>
+            </a:r>
+            <a:br>
+              <a:rPr lang="en-US" sz="7500" dirty="0" smtClean="0"/>
+            </a:br>
+            <a:r>
+              <a:rPr lang="en-US" sz="7500" dirty="0" smtClean="0"/>
+              <a:t>vs.</a:t>
+            </a:r>
+            <a:br>
+              <a:rPr lang="en-US" sz="7500" dirty="0" smtClean="0"/>
+            </a:br>
+            <a:r>
+              <a:rPr lang="en-US" sz="7500" dirty="0" smtClean="0"/>
+              <a:t>summary statistics</a:t>
+            </a:r>
+            <a:endParaRPr lang="en-US" sz="7500" dirty="0"/>
+          </a:p>
+        </p:txBody>
+      </p:sp>
+      <p:sp>
+        <p:nvSpPr>
+          <p:cNvPr id="4" name="Content Placeholder 3"/>
+          <p:cNvSpPr>
+            <a:spLocks noGrp="1"/>
+          </p:cNvSpPr>
+          <p:nvPr>
+            <p:ph sz="quarter" idx="11"/>
+          </p:nvPr>
         </p:nvSpPr>
         <p:spPr>
           <a:xfrm>
-            <a:off x="563131" y="1257300"/>
-            <a:ext cx="4198585" cy="1477328"/>
+            <a:off x="371475" y="495300"/>
+            <a:ext cx="6400800" cy="304800"/>
           </a:xfrm>
-          <a:prstGeom prst="rect">
-            <a:avLst/>
-          </a:prstGeom>
-          <a:noFill/>
-        </p:spPr>
-        <p:txBody>
-          <a:bodyPr wrap="none" rtlCol="0">
-            <a:spAutoFit/>
+        </p:spPr>
+        <p:txBody>
+          <a:bodyPr wrap="square" lIns="91440" tIns="45720" rIns="91440" bIns="45720" numCol="1" anchor="t" anchorCtr="0" compatLnSpc="1">
+            <a:prstTxWarp prst="textNoShape">
+              <a:avLst/>
+            </a:prstTxWarp>
           </a:bodyPr>
           <a:lstStyle/>
           <a:p>
-            <a:pPr algn="l"/>
-            <a:r>
-              <a:rPr lang="en-US" sz="3000" dirty="0" smtClean="0">
-                <a:latin typeface="PFDinTextCompPro-Italic"/>
-                <a:cs typeface="PFDinTextCompPro-Italic"/>
+            <a:pPr marL="0" indent="0"/>
+            <a:r>
+              <a:rPr lang="en-US" cap="none" dirty="0">
+                <a:latin typeface="PFDinTextCompPro-Bold" charset="0"/>
+                <a:ea typeface="ヒラギノ角ゴ ProN W3" charset="0"/>
+                <a:cs typeface="ヒラギノ角ゴ ProN W3" charset="0"/>
               </a:rPr>
-              <a:t>Consider the following dataset:</a:t>
-            </a:r>
-            <a:endParaRPr lang="en-US" sz="3000" dirty="0"/>
-          </a:p>
-          <a:p>
-            <a:pPr marL="457200" indent="-457200" algn="l">
-              <a:buFontTx/>
-              <a:buChar char="-"/>
-            </a:pPr>
-            <a:r>
-              <a:rPr lang="en-US" sz="3000" dirty="0">
-                <a:latin typeface="PFDinTextCompPro-Italic"/>
-                <a:cs typeface="PFDinTextCompPro-Italic"/>
+              <a:t> </a:t>
+            </a:r>
+            <a:r>
+              <a:rPr lang="en-US" cap="none" dirty="0" smtClean="0">
+                <a:latin typeface="PFDinTextCompPro-Bold" charset="0"/>
+                <a:ea typeface="ヒラギノ角ゴ ProN W3" charset="0"/>
+                <a:cs typeface="ヒラギノ角ゴ ProN W3" charset="0"/>
               </a:rPr>
-              <a:t>eleven (x, y) points</a:t>
-            </a:r>
-          </a:p>
-          <a:p>
-            <a:pPr marL="457200" indent="-457200" algn="l">
-              <a:buFontTx/>
-              <a:buChar char="-"/>
-            </a:pPr>
-            <a:r>
-              <a:rPr lang="en-US" sz="3000" dirty="0" smtClean="0">
-                <a:latin typeface="PFDinTextCompPro-Italic"/>
-                <a:cs typeface="PFDinTextCompPro-Italic"/>
-              </a:rPr>
-              <a:t>mean of x = 9, mean of y = 7.5</a:t>
-            </a:r>
-          </a:p>
-        </p:txBody>
-      </p:sp>
-      <p:pic>
-        <p:nvPicPr>
-          <p:cNvPr id="2" name="Picture 1"/>
-          <p:cNvPicPr>
-            <a:picLocks noChangeAspect="1"/>
-          </p:cNvPicPr>
-          <p:nvPr/>
-        </p:nvPicPr>
-        <p:blipFill>
-          <a:blip r:embed="rId3"/>
-          <a:stretch>
-            <a:fillRect/>
-          </a:stretch>
-        </p:blipFill>
-        <p:spPr>
-          <a:xfrm>
-            <a:off x="5672137" y="2692400"/>
-            <a:ext cx="3335148" cy="2374900"/>
-          </a:xfrm>
-          <a:prstGeom prst="rect">
-            <a:avLst/>
-          </a:prstGeom>
-        </p:spPr>
-      </p:pic>
+              <a:t>META-INTRO</a:t>
+            </a:r>
+            <a:endParaRPr lang="en-US" cap="none" dirty="0">
+              <a:latin typeface="PFDinTextCompPro-Bold" charset="0"/>
+              <a:ea typeface="ヒラギノ角ゴ ProN W3" charset="0"/>
+              <a:cs typeface="ヒラギノ角ゴ ProN W3" charset="0"/>
+            </a:endParaRPr>
+          </a:p>
+        </p:txBody>
+      </p:sp>
     </p:spTree>
     <p:extLst>
       <p:ext uri="{BB962C8B-B14F-4D97-AF65-F5344CB8AC3E}">
-        <p14:creationId xmlns:p14="http://schemas.microsoft.com/office/powerpoint/2010/main" val="1832736681"/>
+        <p14:creationId xmlns:p14="http://schemas.microsoft.com/office/powerpoint/2010/main" val="712287234"/>
       </p:ext>
     </p:extLst>
   </p:cSld>
@@ -8841,7 +10034,7 @@
         <p:spPr>
           <a:xfrm>
             <a:off x="563131" y="1257300"/>
-            <a:ext cx="4968027" cy="1938992"/>
+            <a:ext cx="3870197" cy="1015663"/>
           </a:xfrm>
           <a:prstGeom prst="rect">
             <a:avLst/>
@@ -8856,7 +10049,7 @@
           <a:p>
             <a:pPr algn="l"/>
             <a:r>
-              <a:rPr lang="en-US" sz="3000" dirty="0">
+              <a:rPr lang="en-US" sz="3000" dirty="0" smtClean="0">
                 <a:latin typeface="PFDinTextCompPro-Italic"/>
                 <a:cs typeface="PFDinTextCompPro-Italic"/>
               </a:rPr>
@@ -8875,32 +10068,6 @@
                 <a:cs typeface="PFDinTextCompPro-Italic"/>
               </a:rPr>
               <a:t>eleven (x, y) points</a:t>
-            </a:r>
-          </a:p>
-          <a:p>
-            <a:pPr marL="457200" indent="-457200" algn="l">
-              <a:buFontTx/>
-              <a:buChar char="-"/>
-            </a:pPr>
-            <a:r>
-              <a:rPr lang="en-US" sz="3000" dirty="0" smtClean="0">
-                <a:latin typeface="PFDinTextCompPro-Italic"/>
-                <a:cs typeface="PFDinTextCompPro-Italic"/>
-              </a:rPr>
-              <a:t>mean of x = 9, mean of y = 7.5</a:t>
-            </a:r>
-          </a:p>
-          <a:p>
-            <a:pPr marL="457200" indent="-457200" algn="l">
-              <a:buFontTx/>
-              <a:buChar char="-"/>
-            </a:pPr>
-            <a:r>
-              <a:rPr lang="en-US" sz="3000" dirty="0" smtClean="0">
-                <a:latin typeface="PFDinTextCompPro-Italic"/>
-                <a:cs typeface="PFDinTextCompPro-Italic"/>
-              </a:rPr>
-              <a:t>variance of x = 11, variance of y = 4.1</a:t>
             </a:r>
           </a:p>
         </p:txBody>
@@ -8932,7 +10099,7 @@
     </p:spTree>
     <p:extLst>
       <p:ext uri="{BB962C8B-B14F-4D97-AF65-F5344CB8AC3E}">
-        <p14:creationId xmlns:p14="http://schemas.microsoft.com/office/powerpoint/2010/main" val="1832736681"/>
+        <p14:creationId xmlns:p14="http://schemas.microsoft.com/office/powerpoint/2010/main" val="3805023845"/>
       </p:ext>
     </p:extLst>
   </p:cSld>
@@ -9038,7 +10205,7 @@
         <p:spPr>
           <a:xfrm>
             <a:off x="563131" y="1257300"/>
-            <a:ext cx="4968027" cy="2400657"/>
+            <a:ext cx="4198585" cy="1477328"/>
           </a:xfrm>
           <a:prstGeom prst="rect">
             <a:avLst/>
@@ -9053,32 +10220,25 @@
           <a:p>
             <a:pPr algn="l"/>
             <a:r>
+              <a:rPr lang="en-US" sz="3000" dirty="0" smtClean="0">
+                <a:latin typeface="PFDinTextCompPro-Italic"/>
+                <a:cs typeface="PFDinTextCompPro-Italic"/>
+              </a:rPr>
+              <a:t>Consider the following dataset:</a:t>
+            </a:r>
+            <a:endParaRPr lang="en-US" sz="3000" dirty="0"/>
+          </a:p>
+          <a:p>
+            <a:pPr marL="457200" indent="-457200" algn="l">
+              <a:buFontTx/>
+              <a:buChar char="-"/>
+            </a:pPr>
+            <a:r>
               <a:rPr lang="en-US" sz="3000" dirty="0">
                 <a:latin typeface="PFDinTextCompPro-Italic"/>
                 <a:cs typeface="PFDinTextCompPro-Italic"/>
               </a:rPr>
-              <a:t>Consider the following dataset:</a:t>
-            </a:r>
-            <a:endParaRPr lang="en-US" sz="3000" dirty="0"/>
-          </a:p>
-          <a:p>
-            <a:pPr marL="457200" indent="-457200" algn="l">
-              <a:buFontTx/>
-              <a:buChar char="-"/>
-            </a:pPr>
-            <a:r>
-              <a:rPr lang="en-US" sz="3000" dirty="0" smtClean="0">
-                <a:latin typeface="PFDinTextCompPro-Italic"/>
-                <a:cs typeface="PFDinTextCompPro-Italic"/>
-              </a:rPr>
-              <a:t>eleven </a:t>
-            </a:r>
-            <a:r>
-              <a:rPr lang="en-US" sz="3000" dirty="0">
-                <a:latin typeface="PFDinTextCompPro-Italic"/>
-                <a:cs typeface="PFDinTextCompPro-Italic"/>
-              </a:rPr>
-              <a:t>(x, y) points</a:t>
+              <a:t>eleven (x, y) points</a:t>
             </a:r>
           </a:p>
           <a:p>
@@ -9092,32 +10252,6 @@
                 <a:cs typeface="PFDinTextCompPro-Italic"/>
               </a:rPr>
               <a:t>mean of x = 9, mean of y = 7.5</a:t>
-            </a:r>
-          </a:p>
-          <a:p>
-            <a:pPr marL="457200" indent="-457200" algn="l">
-              <a:buFontTx/>
-              <a:buChar char="-"/>
-            </a:pPr>
-            <a:r>
-              <a:rPr lang="en-US" sz="3000" dirty="0" smtClean="0">
-                <a:latin typeface="PFDinTextCompPro-Italic"/>
-                <a:cs typeface="PFDinTextCompPro-Italic"/>
-              </a:rPr>
-              <a:t>variance of x = 11, variance of y = 4.1</a:t>
-            </a:r>
-          </a:p>
-          <a:p>
-            <a:pPr marL="457200" indent="-457200" algn="l">
-              <a:buFontTx/>
-              <a:buChar char="-"/>
-            </a:pPr>
-            <a:r>
-              <a:rPr lang="en-US" sz="3000" dirty="0" smtClean="0">
-                <a:latin typeface="PFDinTextCompPro-Italic"/>
-                <a:cs typeface="PFDinTextCompPro-Italic"/>
-              </a:rPr>
-              <a:t>correlation of x and y = 0.8</a:t>
             </a:r>
           </a:p>
         </p:txBody>
@@ -9149,7 +10283,7 @@
     </p:spTree>
     <p:extLst>
       <p:ext uri="{BB962C8B-B14F-4D97-AF65-F5344CB8AC3E}">
-        <p14:creationId xmlns:p14="http://schemas.microsoft.com/office/powerpoint/2010/main" val="2034220138"/>
+        <p14:creationId xmlns:p14="http://schemas.microsoft.com/office/powerpoint/2010/main" val="1832736681"/>
       </p:ext>
     </p:extLst>
   </p:cSld>
@@ -9255,7 +10389,7 @@
         <p:spPr>
           <a:xfrm>
             <a:off x="563131" y="1257300"/>
-            <a:ext cx="4968027" cy="2862322"/>
+            <a:ext cx="4968027" cy="1938992"/>
           </a:xfrm>
           <a:prstGeom prst="rect">
             <a:avLst/>
@@ -9288,14 +10422,7 @@
                 <a:latin typeface="PFDinTextCompPro-Italic"/>
                 <a:cs typeface="PFDinTextCompPro-Italic"/>
               </a:rPr>
-              <a:t>eleven </a:t>
-            </a:r>
-            <a:r>
-              <a:rPr lang="en-US" sz="3000" dirty="0">
-                <a:latin typeface="PFDinTextCompPro-Italic"/>
-                <a:cs typeface="PFDinTextCompPro-Italic"/>
-              </a:rPr>
-              <a:t>(x, y) points</a:t>
+              <a:t>eleven (x, y) points</a:t>
             </a:r>
           </a:p>
           <a:p>
@@ -9322,32 +10449,6 @@
                 <a:cs typeface="PFDinTextCompPro-Italic"/>
               </a:rPr>
               <a:t>variance of x = 11, variance of y = 4.1</a:t>
-            </a:r>
-          </a:p>
-          <a:p>
-            <a:pPr marL="457200" indent="-457200" algn="l">
-              <a:buFontTx/>
-              <a:buChar char="-"/>
-            </a:pPr>
-            <a:r>
-              <a:rPr lang="en-US" sz="3000" dirty="0" smtClean="0">
-                <a:latin typeface="PFDinTextCompPro-Italic"/>
-                <a:cs typeface="PFDinTextCompPro-Italic"/>
-              </a:rPr>
-              <a:t>correlation of x, y = 0.8</a:t>
-            </a:r>
-          </a:p>
-          <a:p>
-            <a:pPr marL="457200" indent="-457200" algn="l">
-              <a:buFontTx/>
-              <a:buChar char="-"/>
-            </a:pPr>
-            <a:r>
-              <a:rPr lang="en-US" sz="3000" dirty="0" smtClean="0">
-                <a:latin typeface="PFDinTextCompPro-Italic"/>
-                <a:cs typeface="PFDinTextCompPro-Italic"/>
-              </a:rPr>
-              <a:t>line of best fit: y = 3.00 + 0.500x</a:t>
             </a:r>
           </a:p>
         </p:txBody>
@@ -9379,7 +10480,7 @@
     </p:spTree>
     <p:extLst>
       <p:ext uri="{BB962C8B-B14F-4D97-AF65-F5344CB8AC3E}">
-        <p14:creationId xmlns:p14="http://schemas.microsoft.com/office/powerpoint/2010/main" val="3153851189"/>
+        <p14:creationId xmlns:p14="http://schemas.microsoft.com/office/powerpoint/2010/main" val="1832736681"/>
       </p:ext>
     </p:extLst>
   </p:cSld>
@@ -9484,8 +10585,8 @@
         </p:nvSpPr>
         <p:spPr>
           <a:xfrm>
-            <a:off x="566737" y="1028700"/>
-            <a:ext cx="3200400" cy="2785378"/>
+            <a:off x="563131" y="1257300"/>
+            <a:ext cx="4968027" cy="2400657"/>
           </a:xfrm>
           <a:prstGeom prst="rect">
             <a:avLst/>
@@ -9493,72 +10594,85 @@
           <a:noFill/>
         </p:spPr>
         <p:txBody>
-          <a:bodyPr wrap="square" rtlCol="0">
+          <a:bodyPr wrap="none" rtlCol="0">
             <a:spAutoFit/>
           </a:bodyPr>
           <a:lstStyle/>
           <a:p>
             <a:pPr algn="l"/>
             <a:r>
-              <a:rPr lang="en-US" sz="2500" dirty="0" smtClean="0">
+              <a:rPr lang="en-US" sz="3000" dirty="0">
                 <a:latin typeface="PFDinTextCompPro-Italic"/>
                 <a:cs typeface="PFDinTextCompPro-Italic"/>
               </a:rPr>
-              <a:t>Now, suppose I give you</a:t>
-            </a:r>
-          </a:p>
-          <a:p>
-            <a:pPr algn="l"/>
-            <a:r>
-              <a:rPr lang="en-US" sz="2500" dirty="0" smtClean="0">
+              <a:t>Consider the following dataset:</a:t>
+            </a:r>
+            <a:endParaRPr lang="en-US" sz="3000" dirty="0"/>
+          </a:p>
+          <a:p>
+            <a:pPr marL="457200" indent="-457200" algn="l">
+              <a:buFontTx/>
+              <a:buChar char="-"/>
+            </a:pPr>
+            <a:r>
+              <a:rPr lang="en-US" sz="3000" dirty="0" smtClean="0">
                 <a:latin typeface="PFDinTextCompPro-Italic"/>
                 <a:cs typeface="PFDinTextCompPro-Italic"/>
               </a:rPr>
-              <a:t>three more datasets</a:t>
-            </a:r>
-          </a:p>
-          <a:p>
-            <a:pPr algn="l"/>
-            <a:r>
-              <a:rPr lang="en-US" sz="2500" dirty="0" smtClean="0">
+              <a:t>eleven </a:t>
+            </a:r>
+            <a:r>
+              <a:rPr lang="en-US" sz="3000" dirty="0">
                 <a:latin typeface="PFDinTextCompPro-Italic"/>
                 <a:cs typeface="PFDinTextCompPro-Italic"/>
               </a:rPr>
-              <a:t>with exactly the same</a:t>
-            </a:r>
-          </a:p>
-          <a:p>
-            <a:pPr algn="l"/>
-            <a:r>
-              <a:rPr lang="en-US" sz="2500" dirty="0" smtClean="0">
+              <a:t>(x, y) points</a:t>
+            </a:r>
+          </a:p>
+          <a:p>
+            <a:pPr marL="457200" indent="-457200" algn="l">
+              <a:buFontTx/>
+              <a:buChar char="-"/>
+            </a:pPr>
+            <a:r>
+              <a:rPr lang="en-US" sz="3000" dirty="0" smtClean="0">
                 <a:latin typeface="PFDinTextCompPro-Italic"/>
                 <a:cs typeface="PFDinTextCompPro-Italic"/>
               </a:rPr>
-              <a:t>characteristics…</a:t>
-            </a:r>
-          </a:p>
-          <a:p>
-            <a:pPr algn="l"/>
-            <a:endParaRPr lang="en-US" sz="2500" dirty="0">
-              <a:latin typeface="PFDinTextCompPro-Italic"/>
-              <a:cs typeface="PFDinTextCompPro-Italic"/>
-            </a:endParaRPr>
-          </a:p>
-          <a:p>
-            <a:pPr algn="l"/>
-            <a:r>
-              <a:rPr lang="en-US" sz="2500" dirty="0" smtClean="0">
+              <a:t>mean of x = 9, mean of y = 7.5</a:t>
+            </a:r>
+          </a:p>
+          <a:p>
+            <a:pPr marL="457200" indent="-457200" algn="l">
+              <a:buFontTx/>
+              <a:buChar char="-"/>
+            </a:pPr>
+            <a:r>
+              <a:rPr lang="en-US" sz="3000" dirty="0" smtClean="0">
                 <a:latin typeface="PFDinTextCompPro-Italic"/>
                 <a:cs typeface="PFDinTextCompPro-Italic"/>
               </a:rPr>
-              <a:t>Q: how similar are these datasets?</a:t>
+              <a:t>variance of x = 11, variance of y = 4.1</a:t>
+            </a:r>
+          </a:p>
+          <a:p>
+            <a:pPr marL="457200" indent="-457200" algn="l">
+              <a:buFontTx/>
+              <a:buChar char="-"/>
+            </a:pPr>
+            <a:r>
+              <a:rPr lang="en-US" sz="3000" dirty="0" smtClean="0">
+                <a:latin typeface="PFDinTextCompPro-Italic"/>
+                <a:cs typeface="PFDinTextCompPro-Italic"/>
+              </a:rPr>
+              <a:t>correlation of x and y = 0.8</a:t>
             </a:r>
           </a:p>
         </p:txBody>
       </p:sp>
       <p:pic>
         <p:nvPicPr>
-          <p:cNvPr id="5" name="Picture 4"/>
+          <p:cNvPr id="2" name="Picture 1"/>
           <p:cNvPicPr>
             <a:picLocks noChangeAspect="1"/>
           </p:cNvPicPr>
@@ -9572,8 +10686,8 @@
         </p:blipFill>
         <p:spPr>
           <a:xfrm>
-            <a:off x="3843337" y="1197326"/>
-            <a:ext cx="4953000" cy="3565174"/>
+            <a:off x="5672137" y="2692400"/>
+            <a:ext cx="3335148" cy="2374900"/>
           </a:xfrm>
           <a:prstGeom prst="rect">
             <a:avLst/>
@@ -9583,7 +10697,7 @@
     </p:spTree>
     <p:extLst>
       <p:ext uri="{BB962C8B-B14F-4D97-AF65-F5344CB8AC3E}">
-        <p14:creationId xmlns:p14="http://schemas.microsoft.com/office/powerpoint/2010/main" val="4190355488"/>
+        <p14:creationId xmlns:p14="http://schemas.microsoft.com/office/powerpoint/2010/main" val="2034220138"/>
       </p:ext>
     </p:extLst>
   </p:cSld>
@@ -9688,8 +10802,8 @@
         </p:nvSpPr>
         <p:spPr>
           <a:xfrm>
-            <a:off x="566737" y="1028700"/>
-            <a:ext cx="3200400" cy="3862596"/>
+            <a:off x="563131" y="1257300"/>
+            <a:ext cx="4968027" cy="2862322"/>
           </a:xfrm>
           <a:prstGeom prst="rect">
             <a:avLst/>
@@ -9697,132 +10811,92 @@
           <a:noFill/>
         </p:spPr>
         <p:txBody>
-          <a:bodyPr wrap="square" rtlCol="0">
+          <a:bodyPr wrap="none" rtlCol="0">
             <a:spAutoFit/>
           </a:bodyPr>
           <a:lstStyle/>
           <a:p>
             <a:pPr algn="l"/>
             <a:r>
-              <a:rPr lang="en-US" sz="2500" dirty="0" smtClean="0">
+              <a:rPr lang="en-US" sz="3000" dirty="0">
                 <a:latin typeface="PFDinTextCompPro-Italic"/>
                 <a:cs typeface="PFDinTextCompPro-Italic"/>
               </a:rPr>
-              <a:t>Now, suppose I give you</a:t>
-            </a:r>
-          </a:p>
-          <a:p>
-            <a:pPr algn="l"/>
-            <a:r>
-              <a:rPr lang="en-US" sz="2500" dirty="0" smtClean="0">
+              <a:t>Consider the following dataset:</a:t>
+            </a:r>
+            <a:endParaRPr lang="en-US" sz="3000" dirty="0"/>
+          </a:p>
+          <a:p>
+            <a:pPr marL="457200" indent="-457200" algn="l">
+              <a:buFontTx/>
+              <a:buChar char="-"/>
+            </a:pPr>
+            <a:r>
+              <a:rPr lang="en-US" sz="3000" dirty="0" smtClean="0">
                 <a:latin typeface="PFDinTextCompPro-Italic"/>
                 <a:cs typeface="PFDinTextCompPro-Italic"/>
               </a:rPr>
-              <a:t>three more datasets</a:t>
-            </a:r>
-          </a:p>
-          <a:p>
-            <a:pPr algn="l"/>
-            <a:r>
-              <a:rPr lang="en-US" sz="2500" dirty="0" smtClean="0">
+              <a:t>eleven </a:t>
+            </a:r>
+            <a:r>
+              <a:rPr lang="en-US" sz="3000" dirty="0">
                 <a:latin typeface="PFDinTextCompPro-Italic"/>
                 <a:cs typeface="PFDinTextCompPro-Italic"/>
               </a:rPr>
-              <a:t>with exactly the same</a:t>
-            </a:r>
-          </a:p>
-          <a:p>
-            <a:pPr algn="l"/>
-            <a:r>
-              <a:rPr lang="en-US" sz="2500" dirty="0" smtClean="0">
+              <a:t>(x, y) points</a:t>
+            </a:r>
+          </a:p>
+          <a:p>
+            <a:pPr marL="457200" indent="-457200" algn="l">
+              <a:buFontTx/>
+              <a:buChar char="-"/>
+            </a:pPr>
+            <a:r>
+              <a:rPr lang="en-US" sz="3000" dirty="0" smtClean="0">
                 <a:latin typeface="PFDinTextCompPro-Italic"/>
                 <a:cs typeface="PFDinTextCompPro-Italic"/>
               </a:rPr>
-              <a:t>characteristics.</a:t>
-            </a:r>
-          </a:p>
-          <a:p>
-            <a:pPr algn="l"/>
-            <a:endParaRPr lang="en-US" sz="2500" dirty="0">
-              <a:latin typeface="PFDinTextCompPro-Italic"/>
-              <a:cs typeface="PFDinTextCompPro-Italic"/>
-            </a:endParaRPr>
-          </a:p>
-          <a:p>
-            <a:pPr algn="l"/>
-            <a:r>
-              <a:rPr lang="en-US" sz="2500" dirty="0" smtClean="0">
+              <a:t>mean of x = 9, mean of y = 7.5</a:t>
+            </a:r>
+          </a:p>
+          <a:p>
+            <a:pPr marL="457200" indent="-457200" algn="l">
+              <a:buFontTx/>
+              <a:buChar char="-"/>
+            </a:pPr>
+            <a:r>
+              <a:rPr lang="en-US" sz="3000" dirty="0" smtClean="0">
                 <a:latin typeface="PFDinTextCompPro-Italic"/>
                 <a:cs typeface="PFDinTextCompPro-Italic"/>
               </a:rPr>
-              <a:t>Q: how similar are these datasets?</a:t>
-            </a:r>
-          </a:p>
-          <a:p>
-            <a:pPr algn="l"/>
-            <a:endParaRPr lang="en-US" sz="2500" dirty="0">
-              <a:latin typeface="PFDinTextCompPro-Italic"/>
-              <a:cs typeface="PFDinTextCompPro-Italic"/>
-            </a:endParaRPr>
-          </a:p>
-          <a:p>
-            <a:pPr algn="l"/>
-            <a:r>
-              <a:rPr lang="en-US" sz="2500" dirty="0" smtClean="0">
+              <a:t>variance of x = 11, variance of y = 4.1</a:t>
+            </a:r>
+          </a:p>
+          <a:p>
+            <a:pPr marL="457200" indent="-457200" algn="l">
+              <a:buFontTx/>
+              <a:buChar char="-"/>
+            </a:pPr>
+            <a:r>
+              <a:rPr lang="en-US" sz="3000" dirty="0" smtClean="0">
                 <a:latin typeface="PFDinTextCompPro-Italic"/>
                 <a:cs typeface="PFDinTextCompPro-Italic"/>
               </a:rPr>
-              <a:t>A: not very!</a:t>
-            </a:r>
-          </a:p>
-          <a:p>
-            <a:pPr algn="l"/>
-            <a:endParaRPr lang="en-US" sz="1200" dirty="0" smtClean="0">
-              <a:latin typeface="PFDinTextCompPro-Italic"/>
-              <a:cs typeface="PFDinTextCompPro-Italic"/>
-            </a:endParaRPr>
-          </a:p>
-          <a:p>
-            <a:pPr algn="l"/>
-            <a:r>
-              <a:rPr lang="en-US" sz="800" dirty="0" smtClean="0">
-                <a:latin typeface="+mn-lt"/>
+              <a:t>correlation of x, y = 0.8</a:t>
+            </a:r>
+          </a:p>
+          <a:p>
+            <a:pPr marL="457200" indent="-457200" algn="l">
+              <a:buFontTx/>
+              <a:buChar char="-"/>
+            </a:pPr>
+            <a:r>
+              <a:rPr lang="en-US" sz="3000" dirty="0" smtClean="0">
+                <a:latin typeface="PFDinTextCompPro-Italic"/>
                 <a:cs typeface="PFDinTextCompPro-Italic"/>
               </a:rPr>
-              <a:t>http</a:t>
-            </a:r>
-            <a:r>
-              <a:rPr lang="en-US" sz="800" dirty="0">
-                <a:latin typeface="+mn-lt"/>
-                <a:cs typeface="PFDinTextCompPro-Italic"/>
-              </a:rPr>
-              <a:t>://</a:t>
-            </a:r>
-            <a:r>
-              <a:rPr lang="en-US" sz="800" dirty="0" err="1">
-                <a:latin typeface="+mn-lt"/>
-                <a:cs typeface="PFDinTextCompPro-Italic"/>
-              </a:rPr>
-              <a:t>en.wikipedia.org</a:t>
-            </a:r>
-            <a:r>
-              <a:rPr lang="en-US" sz="800" dirty="0">
-                <a:latin typeface="+mn-lt"/>
-                <a:cs typeface="PFDinTextCompPro-Italic"/>
-              </a:rPr>
-              <a:t>/wiki/</a:t>
-            </a:r>
-            <a:r>
-              <a:rPr lang="en-US" sz="800" dirty="0" err="1">
-                <a:latin typeface="+mn-lt"/>
-                <a:cs typeface="PFDinTextCompPro-Italic"/>
-              </a:rPr>
-              <a:t>Anscombe's_quartet</a:t>
-            </a:r>
-            <a:endParaRPr lang="en-US" sz="800" dirty="0" smtClean="0">
-              <a:latin typeface="+mn-lt"/>
-              <a:cs typeface="PFDinTextCompPro-Italic"/>
-            </a:endParaRPr>
+              <a:t>line of best fit: y = 3.00 + 0.500x</a:t>
+            </a:r>
           </a:p>
         </p:txBody>
       </p:sp>
@@ -9830,7 +10904,7 @@
         <p:nvPicPr>
           <p:cNvPr id="2" name="Picture 1"/>
           <p:cNvPicPr>
-            <a:picLocks/>
+            <a:picLocks noChangeAspect="1"/>
           </p:cNvPicPr>
           <p:nvPr/>
         </p:nvPicPr>
@@ -9842,8 +10916,8 @@
         </p:blipFill>
         <p:spPr>
           <a:xfrm>
-            <a:off x="3840289" y="1196340"/>
-            <a:ext cx="4937760" cy="3584448"/>
+            <a:off x="5672137" y="2692400"/>
+            <a:ext cx="3335148" cy="2374900"/>
           </a:xfrm>
           <a:prstGeom prst="rect">
             <a:avLst/>
@@ -9853,7 +10927,7 @@
     </p:spTree>
     <p:extLst>
       <p:ext uri="{BB962C8B-B14F-4D97-AF65-F5344CB8AC3E}">
-        <p14:creationId xmlns:p14="http://schemas.microsoft.com/office/powerpoint/2010/main" val="1591543434"/>
+        <p14:creationId xmlns:p14="http://schemas.microsoft.com/office/powerpoint/2010/main" val="3153851189"/>
       </p:ext>
     </p:extLst>
   </p:cSld>

</xml_diff>

<commit_message>
clean up; add a little
</commit_message>
<xml_diff>
--- a/03-R_viz/slides.pptx
+++ b/03-R_viz/slides.pptx
@@ -244,7 +244,7 @@
           <a:p>
             <a:fld id="{DB92F479-4B50-F243-9713-1B12EC2B4BDB}" type="datetimeFigureOut">
               <a:rPr lang="en-US" smtClean="0"/>
-              <a:t>3/1/14</a:t>
+              <a:t>3/16/14</a:t>
             </a:fld>
             <a:endParaRPr lang="en-US"/>
           </a:p>
@@ -879,11 +879,19 @@
           <a:p>
             <a:r>
               <a:rPr lang="en-US" dirty="0" smtClean="0"/>
-              <a:t>~45</a:t>
-            </a:r>
-            <a:r>
-              <a:rPr lang="en-US" baseline="0" dirty="0" smtClean="0"/>
-              <a:t> min?</a:t>
+              <a:t>Show some </a:t>
+            </a:r>
+            <a:r>
+              <a:rPr lang="en-US" dirty="0" err="1" smtClean="0"/>
+              <a:t>viz</a:t>
+            </a:r>
+            <a:r>
+              <a:rPr lang="en-US" dirty="0" smtClean="0"/>
+              <a:t>, talk about </a:t>
+            </a:r>
+            <a:r>
+              <a:rPr lang="en-US" dirty="0" err="1" smtClean="0"/>
+              <a:t>viz</a:t>
             </a:r>
             <a:endParaRPr lang="en-US" dirty="0"/>
           </a:p>
@@ -969,14 +977,6 @@
           <a:bodyPr/>
           <a:lstStyle/>
           <a:p>
-            <a:r>
-              <a:rPr lang="en-US" dirty="0" smtClean="0"/>
-              <a:t>~45</a:t>
-            </a:r>
-            <a:r>
-              <a:rPr lang="en-US" baseline="0" dirty="0" smtClean="0"/>
-              <a:t> min?</a:t>
-            </a:r>
             <a:endParaRPr lang="en-US" dirty="0"/>
           </a:p>
         </p:txBody>
@@ -1776,7 +1776,69 @@
                 </a:solidFill>
                 <a:latin typeface="ArialMT"/>
               </a:rPr>
-              <a:t> tells you?</a:t>
+              <a:t> tells you</a:t>
+            </a:r>
+            <a:r>
+              <a:rPr lang="en-US" sz="1200" baseline="0" dirty="0" smtClean="0">
+                <a:solidFill>
+                  <a:prstClr val="black"/>
+                </a:solidFill>
+                <a:latin typeface="ArialMT"/>
+              </a:rPr>
+              <a:t>?</a:t>
+            </a:r>
+          </a:p>
+          <a:p>
+            <a:pPr marL="0" marR="0" indent="0" algn="l" defTabSz="457200" rtl="0" eaLnBrk="1" fontAlgn="auto" latinLnBrk="0" hangingPunct="1">
+              <a:lnSpc>
+                <a:spcPct val="100000"/>
+              </a:lnSpc>
+              <a:spcBef>
+                <a:spcPts val="0"/>
+              </a:spcBef>
+              <a:spcAft>
+                <a:spcPts val="0"/>
+              </a:spcAft>
+              <a:buClrTx/>
+              <a:buSzTx/>
+              <a:buFontTx/>
+              <a:buNone/>
+              <a:tabLst/>
+              <a:defRPr/>
+            </a:pPr>
+            <a:endParaRPr lang="en-US" sz="1200" baseline="0" dirty="0" smtClean="0">
+              <a:solidFill>
+                <a:prstClr val="black"/>
+              </a:solidFill>
+              <a:latin typeface="ArialMT"/>
+            </a:endParaRPr>
+          </a:p>
+          <a:p>
+            <a:pPr marL="0" marR="0" indent="0" algn="l" defTabSz="457200" rtl="0" eaLnBrk="1" fontAlgn="auto" latinLnBrk="0" hangingPunct="1">
+              <a:lnSpc>
+                <a:spcPct val="100000"/>
+              </a:lnSpc>
+              <a:spcBef>
+                <a:spcPts val="0"/>
+              </a:spcBef>
+              <a:spcAft>
+                <a:spcPts val="0"/>
+              </a:spcAft>
+              <a:buClrTx/>
+              <a:buSzTx/>
+              <a:buFontTx/>
+              <a:buNone/>
+              <a:tabLst/>
+              <a:defRPr/>
+            </a:pPr>
+            <a:r>
+              <a:rPr lang="en-US" sz="1200" baseline="0" dirty="0" smtClean="0">
+                <a:solidFill>
+                  <a:prstClr val="black"/>
+                </a:solidFill>
+                <a:latin typeface="ArialMT"/>
+              </a:rPr>
+              <a:t>(Pearson’s correlation, of course)</a:t>
             </a:r>
           </a:p>
         </p:txBody>
@@ -1913,7 +1975,16 @@
                 </a:solidFill>
                 <a:latin typeface="ArialMT"/>
               </a:rPr>
-              <a:t>Q: More importantly, do you know what the line of best fit tells you? (note: we will look at this next time)</a:t>
+              <a:t>Q: More importantly, do you know what the line of best fit tells </a:t>
+            </a:r>
+            <a:r>
+              <a:rPr lang="en-US" sz="1200" baseline="0" dirty="0" smtClean="0">
+                <a:solidFill>
+                  <a:prstClr val="black"/>
+                </a:solidFill>
+                <a:latin typeface="ArialMT"/>
+              </a:rPr>
+              <a:t>you?</a:t>
             </a:r>
           </a:p>
         </p:txBody>
@@ -8730,15 +8801,13 @@
           <a:bodyPr/>
           <a:lstStyle/>
           <a:p>
-            <a:pPr eaLnBrk="1" hangingPunct="1">
-              <a:lnSpc>
-                <a:spcPts val="2448"/>
-              </a:lnSpc>
-              <a:defRPr/>
-            </a:pPr>
-            <a:r>
-              <a:rPr lang="en-US" dirty="0" smtClean="0"/>
-              <a:t>Exercise – why visualize data?</a:t>
+            <a:r>
+              <a:rPr lang="en-US" cap="none" dirty="0">
+                <a:latin typeface="PFDinTextCompPro-Bold" charset="0"/>
+                <a:ea typeface="ヒラギノ角ゴ ProN W3" charset="0"/>
+                <a:cs typeface="ヒラギノ角ゴ ProN W3" charset="0"/>
+              </a:rPr>
+              <a:t>THE IMPORTANCE OF DATA VISUALIZATION</a:t>
             </a:r>
           </a:p>
         </p:txBody>
@@ -8934,15 +9003,13 @@
           <a:bodyPr/>
           <a:lstStyle/>
           <a:p>
-            <a:pPr eaLnBrk="1" hangingPunct="1">
-              <a:lnSpc>
-                <a:spcPts val="2448"/>
-              </a:lnSpc>
-              <a:defRPr/>
-            </a:pPr>
-            <a:r>
-              <a:rPr lang="en-US" dirty="0" smtClean="0"/>
-              <a:t>Exercise – why visualize data?</a:t>
+            <a:r>
+              <a:rPr lang="en-US" cap="none" dirty="0">
+                <a:latin typeface="PFDinTextCompPro-Bold" charset="0"/>
+                <a:ea typeface="ヒラギノ角ゴ ProN W3" charset="0"/>
+                <a:cs typeface="ヒラギノ角ゴ ProN W3" charset="0"/>
+              </a:rPr>
+              <a:t>THE IMPORTANCE OF DATA VISUALIZATION</a:t>
             </a:r>
           </a:p>
         </p:txBody>
@@ -9209,15 +9276,7 @@
             </a:pPr>
             <a:r>
               <a:rPr lang="en-US" sz="7500" dirty="0" smtClean="0"/>
-              <a:t>II. Visualization </a:t>
-            </a:r>
-            <a:r>
-              <a:rPr lang="en-US" sz="7500" dirty="0" smtClean="0"/>
-              <a:t>as a </a:t>
-            </a:r>
-            <a:r>
-              <a:rPr lang="en-US" sz="7500" dirty="0" smtClean="0"/>
-              <a:t> medium</a:t>
+              <a:t>II. Visualization as a  medium</a:t>
             </a:r>
             <a:endParaRPr lang="en-US" sz="7500" dirty="0"/>
           </a:p>
@@ -9485,31 +9544,7 @@
                 <a:ea typeface="ヒラギノ角ゴ ProN W6" charset="0"/>
                 <a:cs typeface="ヒラギノ角ゴ ProN W6" charset="0"/>
               </a:rPr>
-              <a:t>I</a:t>
-            </a:r>
-            <a:r>
-              <a:rPr lang="en-US" sz="3000" dirty="0" smtClean="0">
-                <a:latin typeface="PFDinTextCompPro-Bold" charset="0"/>
-                <a:ea typeface="ヒラギノ角ゴ ProN W6" charset="0"/>
-                <a:cs typeface="ヒラギノ角ゴ ProN W6" charset="0"/>
-              </a:rPr>
-              <a:t>. </a:t>
-            </a:r>
-            <a:r>
-              <a:rPr lang="en-US" sz="3000" dirty="0" smtClean="0">
-                <a:latin typeface="PFDinTextCompPro-Bold" charset="0"/>
-                <a:ea typeface="ヒラギノ角ゴ ProN W6" charset="0"/>
-                <a:cs typeface="ヒラギノ角ゴ ProN W6" charset="0"/>
-              </a:rPr>
-              <a:t>The importance of visualization</a:t>
-            </a:r>
-            <a:r>
-              <a:rPr lang="en-US" sz="3000" dirty="0" smtClean="0">
-                <a:latin typeface="PFDinTextCompPro-Bold" charset="0"/>
-                <a:ea typeface="ヒラギノ角ゴ ProN W6" charset="0"/>
-                <a:cs typeface="ヒラギノ角ゴ ProN W6" charset="0"/>
-              </a:rPr>
-              <a:t/>
+              <a:t>I. The importance of visualization</a:t>
             </a:r>
             <a:br>
               <a:rPr lang="en-US" sz="3000" dirty="0" smtClean="0">
@@ -9524,23 +9559,7 @@
                 <a:ea typeface="ヒラギノ角ゴ ProN W6" charset="0"/>
                 <a:cs typeface="ヒラギノ角ゴ ProN W6" charset="0"/>
               </a:rPr>
-              <a:t>II. </a:t>
-            </a:r>
-            <a:r>
-              <a:rPr lang="en-US" sz="3000" dirty="0" smtClean="0">
-                <a:latin typeface="PFDinTextCompPro-Bold" charset="0"/>
-                <a:ea typeface="ヒラギノ角ゴ ProN W6" charset="0"/>
-                <a:cs typeface="ヒラギノ角ゴ ProN W6" charset="0"/>
-              </a:rPr>
-              <a:t>Visualization as a medium</a:t>
-            </a:r>
-            <a:r>
-              <a:rPr lang="en-US" sz="3000" dirty="0" smtClean="0">
-                <a:latin typeface="PFDinTextCompPro-Bold" charset="0"/>
-                <a:ea typeface="ヒラギノ角ゴ ProN W6" charset="0"/>
-                <a:cs typeface="ヒラギノ角ゴ ProN W6" charset="0"/>
-              </a:rPr>
-              <a:t/>
+              <a:t>II. Visualization as a medium</a:t>
             </a:r>
             <a:br>
               <a:rPr lang="en-US" sz="3000" dirty="0" smtClean="0">
@@ -9585,15 +9604,7 @@
                 <a:ea typeface="ヒラギノ角ゴ ProN W6" charset="0"/>
                 <a:cs typeface="ヒラギノ角ゴ ProN W6" charset="0"/>
               </a:rPr>
-              <a:t>III. </a:t>
-            </a:r>
-            <a:r>
-              <a:rPr lang="en-US" sz="3000" dirty="0" smtClean="0">
-                <a:latin typeface="PFDinTextCompPro-Bold" charset="0"/>
-                <a:ea typeface="ヒラギノ角ゴ ProN W6" charset="0"/>
-                <a:cs typeface="ヒラギノ角ゴ ProN W6" charset="0"/>
-              </a:rPr>
-              <a:t>Visualization in R</a:t>
+              <a:t>III. Visualization in R</a:t>
             </a:r>
             <a:endParaRPr lang="en-US" sz="3000" cap="none" dirty="0">
               <a:latin typeface="PFDinTextCompPro-Bold" charset="0"/>
@@ -9742,11 +9753,7 @@
             </a:pPr>
             <a:r>
               <a:rPr lang="en-US" sz="7500" dirty="0" smtClean="0"/>
-              <a:t>I. </a:t>
-            </a:r>
-            <a:r>
-              <a:rPr lang="en-US" sz="7500" dirty="0" smtClean="0"/>
-              <a:t>The importance of visualization</a:t>
+              <a:t>I. The importance of visualization</a:t>
             </a:r>
             <a:endParaRPr lang="en-US" sz="7500" dirty="0"/>
           </a:p>
@@ -9902,21 +9909,16 @@
           <a:p>
             <a:pPr marL="0" indent="0"/>
             <a:r>
-              <a:rPr lang="en-US" cap="none" dirty="0">
-                <a:latin typeface="PFDinTextCompPro-Bold" charset="0"/>
-                <a:ea typeface="ヒラギノ角ゴ ProN W3" charset="0"/>
-                <a:cs typeface="ヒラギノ角ゴ ProN W3" charset="0"/>
-              </a:rPr>
-              <a:t> </a:t>
-            </a:r>
-            <a:r>
               <a:rPr lang="en-US" cap="none" dirty="0" smtClean="0">
                 <a:latin typeface="PFDinTextCompPro-Bold" charset="0"/>
                 <a:ea typeface="ヒラギノ角ゴ ProN W3" charset="0"/>
                 <a:cs typeface="ヒラギノ角ゴ ProN W3" charset="0"/>
               </a:rPr>
-              <a:t>META-INTRO</a:t>
-            </a:r>
+              <a:t>THE IMPORTANCE OF DATA VISUALIZATION</a:t>
+            </a:r>
+          </a:p>
+          <a:p>
+            <a:pPr marL="0" indent="0"/>
             <a:endParaRPr lang="en-US" cap="none" dirty="0">
               <a:latin typeface="PFDinTextCompPro-Bold" charset="0"/>
               <a:ea typeface="ヒラギノ角ゴ ProN W3" charset="0"/>
@@ -9983,15 +9985,13 @@
           <a:bodyPr/>
           <a:lstStyle/>
           <a:p>
-            <a:pPr eaLnBrk="1" hangingPunct="1">
-              <a:lnSpc>
-                <a:spcPts val="2448"/>
-              </a:lnSpc>
-              <a:defRPr/>
-            </a:pPr>
-            <a:r>
-              <a:rPr lang="en-US" dirty="0" smtClean="0"/>
-              <a:t>Exercise – why visualize data?</a:t>
+            <a:r>
+              <a:rPr lang="en-US" cap="none" dirty="0">
+                <a:latin typeface="PFDinTextCompPro-Bold" charset="0"/>
+                <a:ea typeface="ヒラギノ角ゴ ProN W3" charset="0"/>
+                <a:cs typeface="ヒラギノ角ゴ ProN W3" charset="0"/>
+              </a:rPr>
+              <a:t>THE IMPORTANCE OF DATA VISUALIZATION</a:t>
             </a:r>
           </a:p>
         </p:txBody>
@@ -10154,15 +10154,13 @@
           <a:bodyPr/>
           <a:lstStyle/>
           <a:p>
-            <a:pPr eaLnBrk="1" hangingPunct="1">
-              <a:lnSpc>
-                <a:spcPts val="2448"/>
-              </a:lnSpc>
-              <a:defRPr/>
-            </a:pPr>
-            <a:r>
-              <a:rPr lang="en-US" dirty="0" smtClean="0"/>
-              <a:t>Exercise – why visualize data?</a:t>
+            <a:r>
+              <a:rPr lang="en-US" cap="none" dirty="0">
+                <a:latin typeface="PFDinTextCompPro-Bold" charset="0"/>
+                <a:ea typeface="ヒラギノ角ゴ ProN W3" charset="0"/>
+                <a:cs typeface="ヒラギノ角ゴ ProN W3" charset="0"/>
+              </a:rPr>
+              <a:t>THE IMPORTANCE OF DATA VISUALIZATION</a:t>
             </a:r>
           </a:p>
         </p:txBody>
@@ -10338,15 +10336,13 @@
           <a:bodyPr/>
           <a:lstStyle/>
           <a:p>
-            <a:pPr eaLnBrk="1" hangingPunct="1">
-              <a:lnSpc>
-                <a:spcPts val="2448"/>
-              </a:lnSpc>
-              <a:defRPr/>
-            </a:pPr>
-            <a:r>
-              <a:rPr lang="en-US" dirty="0" smtClean="0"/>
-              <a:t>Exercise – why visualize data?</a:t>
+            <a:r>
+              <a:rPr lang="en-US" cap="none" dirty="0">
+                <a:latin typeface="PFDinTextCompPro-Bold" charset="0"/>
+                <a:ea typeface="ヒラギノ角ゴ ProN W3" charset="0"/>
+                <a:cs typeface="ヒラギノ角ゴ ProN W3" charset="0"/>
+              </a:rPr>
+              <a:t>THE IMPORTANCE OF DATA VISUALIZATION</a:t>
             </a:r>
           </a:p>
         </p:txBody>
@@ -10535,15 +10531,13 @@
           <a:bodyPr/>
           <a:lstStyle/>
           <a:p>
-            <a:pPr eaLnBrk="1" hangingPunct="1">
-              <a:lnSpc>
-                <a:spcPts val="2448"/>
-              </a:lnSpc>
-              <a:defRPr/>
-            </a:pPr>
-            <a:r>
-              <a:rPr lang="en-US" dirty="0" smtClean="0"/>
-              <a:t>Exercise – why visualize data?</a:t>
+            <a:r>
+              <a:rPr lang="en-US" cap="none" dirty="0">
+                <a:latin typeface="PFDinTextCompPro-Bold" charset="0"/>
+                <a:ea typeface="ヒラギノ角ゴ ProN W3" charset="0"/>
+                <a:cs typeface="ヒラギノ角ゴ ProN W3" charset="0"/>
+              </a:rPr>
+              <a:t>THE IMPORTANCE OF DATA VISUALIZATION</a:t>
             </a:r>
           </a:p>
         </p:txBody>
@@ -10752,15 +10746,13 @@
           <a:bodyPr/>
           <a:lstStyle/>
           <a:p>
-            <a:pPr eaLnBrk="1" hangingPunct="1">
-              <a:lnSpc>
-                <a:spcPts val="2448"/>
-              </a:lnSpc>
-              <a:defRPr/>
-            </a:pPr>
-            <a:r>
-              <a:rPr lang="en-US" dirty="0" smtClean="0"/>
-              <a:t>Exercise – why visualize data?</a:t>
+            <a:r>
+              <a:rPr lang="en-US" cap="none" dirty="0">
+                <a:latin typeface="PFDinTextCompPro-Bold" charset="0"/>
+                <a:ea typeface="ヒラギノ角ゴ ProN W3" charset="0"/>
+                <a:cs typeface="ヒラギノ角ゴ ProN W3" charset="0"/>
+              </a:rPr>
+              <a:t>THE IMPORTANCE OF DATA VISUALIZATION</a:t>
             </a:r>
           </a:p>
         </p:txBody>

</xml_diff>

<commit_message>
expand slides a little
</commit_message>
<xml_diff>
--- a/03-R_viz/slides.pptx
+++ b/03-R_viz/slides.pptx
@@ -6,7 +6,7 @@
     <p:sldMasterId id="2147483649" r:id="rId2"/>
   </p:sldMasterIdLst>
   <p:notesMasterIdLst>
-    <p:notesMasterId r:id="rId16"/>
+    <p:notesMasterId r:id="rId25"/>
   </p:notesMasterIdLst>
   <p:sldIdLst>
     <p:sldId id="258" r:id="rId3"/>
@@ -20,8 +20,17 @@
     <p:sldId id="350" r:id="rId11"/>
     <p:sldId id="351" r:id="rId12"/>
     <p:sldId id="352" r:id="rId13"/>
-    <p:sldId id="369" r:id="rId14"/>
-    <p:sldId id="372" r:id="rId15"/>
+    <p:sldId id="373" r:id="rId14"/>
+    <p:sldId id="374" r:id="rId15"/>
+    <p:sldId id="375" r:id="rId16"/>
+    <p:sldId id="376" r:id="rId17"/>
+    <p:sldId id="377" r:id="rId18"/>
+    <p:sldId id="378" r:id="rId19"/>
+    <p:sldId id="369" r:id="rId20"/>
+    <p:sldId id="379" r:id="rId21"/>
+    <p:sldId id="380" r:id="rId22"/>
+    <p:sldId id="381" r:id="rId23"/>
+    <p:sldId id="372" r:id="rId24"/>
   </p:sldIdLst>
   <p:sldSz cx="9363075" cy="5257800"/>
   <p:notesSz cx="6858000" cy="9144000"/>
@@ -879,19 +888,7 @@
           <a:p>
             <a:r>
               <a:rPr lang="en-US" dirty="0" smtClean="0"/>
-              <a:t>Show some </a:t>
-            </a:r>
-            <a:r>
-              <a:rPr lang="en-US" dirty="0" err="1" smtClean="0"/>
-              <a:t>viz</a:t>
-            </a:r>
-            <a:r>
-              <a:rPr lang="en-US" dirty="0" smtClean="0"/>
-              <a:t>, talk about </a:t>
-            </a:r>
-            <a:r>
-              <a:rPr lang="en-US" dirty="0" err="1" smtClean="0"/>
-              <a:t>viz</a:t>
+              <a:t>~15-20 min for this section?</a:t>
             </a:r>
             <a:endParaRPr lang="en-US" dirty="0"/>
           </a:p>
@@ -977,7 +974,29 @@
           <a:bodyPr/>
           <a:lstStyle/>
           <a:p>
-            <a:endParaRPr lang="en-US" dirty="0"/>
+            <a:pPr marL="0" marR="0" indent="0" algn="l" defTabSz="457200" rtl="0" eaLnBrk="1" fontAlgn="auto" latinLnBrk="0" hangingPunct="1">
+              <a:lnSpc>
+                <a:spcPct val="100000"/>
+              </a:lnSpc>
+              <a:spcBef>
+                <a:spcPts val="0"/>
+              </a:spcBef>
+              <a:spcAft>
+                <a:spcPts val="0"/>
+              </a:spcAft>
+              <a:buClrTx/>
+              <a:buSzTx/>
+              <a:buFontTx/>
+              <a:buNone/>
+              <a:tabLst/>
+              <a:defRPr/>
+            </a:pPr>
+            <a:endParaRPr lang="en-US" sz="1200" baseline="0" dirty="0" smtClean="0">
+              <a:solidFill>
+                <a:prstClr val="black"/>
+              </a:solidFill>
+              <a:latin typeface="ArialMT"/>
+            </a:endParaRPr>
           </a:p>
         </p:txBody>
       </p:sp>
@@ -999,6 +1018,630 @@
             <a:fld id="{ADD4B5B7-85EF-4E48-AC80-2380FACD9C23}" type="slidenum">
               <a:rPr lang="en-US" smtClean="0"/>
               <a:t>13</a:t>
+            </a:fld>
+            <a:endParaRPr lang="en-US"/>
+          </a:p>
+        </p:txBody>
+      </p:sp>
+    </p:spTree>
+    <p:extLst>
+      <p:ext uri="{BB962C8B-B14F-4D97-AF65-F5344CB8AC3E}">
+        <p14:creationId xmlns:p14="http://schemas.microsoft.com/office/powerpoint/2010/main" val="645762702"/>
+      </p:ext>
+    </p:extLst>
+  </p:cSld>
+  <p:clrMapOvr>
+    <a:masterClrMapping/>
+  </p:clrMapOvr>
+</p:notes>
+</file>
+
+<file path=ppt/notesSlides/notesSlide14.xml><?xml version="1.0" encoding="utf-8"?>
+<p:notes xmlns:a="http://schemas.openxmlformats.org/drawingml/2006/main" xmlns:r="http://schemas.openxmlformats.org/officeDocument/2006/relationships" xmlns:p="http://schemas.openxmlformats.org/presentationml/2006/main">
+  <p:cSld>
+    <p:spTree>
+      <p:nvGrpSpPr>
+        <p:cNvPr id="1" name=""/>
+        <p:cNvGrpSpPr/>
+        <p:nvPr/>
+      </p:nvGrpSpPr>
+      <p:grpSpPr>
+        <a:xfrm>
+          <a:off x="0" y="0"/>
+          <a:ext cx="0" cy="0"/>
+          <a:chOff x="0" y="0"/>
+          <a:chExt cx="0" cy="0"/>
+        </a:xfrm>
+      </p:grpSpPr>
+      <p:sp>
+        <p:nvSpPr>
+          <p:cNvPr id="2" name="Slide Image Placeholder 1"/>
+          <p:cNvSpPr>
+            <a:spLocks noGrp="1" noRot="1" noChangeAspect="1"/>
+          </p:cNvSpPr>
+          <p:nvPr>
+            <p:ph type="sldImg"/>
+          </p:nvPr>
+        </p:nvSpPr>
+        <p:spPr/>
+      </p:sp>
+      <p:sp>
+        <p:nvSpPr>
+          <p:cNvPr id="3" name="Notes Placeholder 2"/>
+          <p:cNvSpPr>
+            <a:spLocks noGrp="1"/>
+          </p:cNvSpPr>
+          <p:nvPr>
+            <p:ph type="body" idx="1"/>
+          </p:nvPr>
+        </p:nvSpPr>
+        <p:spPr/>
+        <p:txBody>
+          <a:bodyPr/>
+          <a:lstStyle/>
+          <a:p>
+            <a:pPr marL="0" marR="0" indent="0" algn="l" defTabSz="457200" rtl="0" eaLnBrk="1" fontAlgn="auto" latinLnBrk="0" hangingPunct="1">
+              <a:lnSpc>
+                <a:spcPct val="100000"/>
+              </a:lnSpc>
+              <a:spcBef>
+                <a:spcPts val="0"/>
+              </a:spcBef>
+              <a:spcAft>
+                <a:spcPts val="0"/>
+              </a:spcAft>
+              <a:buClrTx/>
+              <a:buSzTx/>
+              <a:buFontTx/>
+              <a:buNone/>
+              <a:tabLst/>
+              <a:defRPr/>
+            </a:pPr>
+            <a:endParaRPr lang="en-US" sz="1200" baseline="0" dirty="0" smtClean="0">
+              <a:solidFill>
+                <a:prstClr val="black"/>
+              </a:solidFill>
+              <a:latin typeface="ArialMT"/>
+            </a:endParaRPr>
+          </a:p>
+        </p:txBody>
+      </p:sp>
+      <p:sp>
+        <p:nvSpPr>
+          <p:cNvPr id="4" name="Slide Number Placeholder 3"/>
+          <p:cNvSpPr>
+            <a:spLocks noGrp="1"/>
+          </p:cNvSpPr>
+          <p:nvPr>
+            <p:ph type="sldNum" sz="quarter" idx="10"/>
+          </p:nvPr>
+        </p:nvSpPr>
+        <p:spPr/>
+        <p:txBody>
+          <a:bodyPr/>
+          <a:lstStyle/>
+          <a:p>
+            <a:fld id="{ADD4B5B7-85EF-4E48-AC80-2380FACD9C23}" type="slidenum">
+              <a:rPr lang="en-US" smtClean="0"/>
+              <a:t>14</a:t>
+            </a:fld>
+            <a:endParaRPr lang="en-US"/>
+          </a:p>
+        </p:txBody>
+      </p:sp>
+    </p:spTree>
+    <p:extLst>
+      <p:ext uri="{BB962C8B-B14F-4D97-AF65-F5344CB8AC3E}">
+        <p14:creationId xmlns:p14="http://schemas.microsoft.com/office/powerpoint/2010/main" val="645762702"/>
+      </p:ext>
+    </p:extLst>
+  </p:cSld>
+  <p:clrMapOvr>
+    <a:masterClrMapping/>
+  </p:clrMapOvr>
+</p:notes>
+</file>
+
+<file path=ppt/notesSlides/notesSlide15.xml><?xml version="1.0" encoding="utf-8"?>
+<p:notes xmlns:a="http://schemas.openxmlformats.org/drawingml/2006/main" xmlns:r="http://schemas.openxmlformats.org/officeDocument/2006/relationships" xmlns:p="http://schemas.openxmlformats.org/presentationml/2006/main">
+  <p:cSld>
+    <p:spTree>
+      <p:nvGrpSpPr>
+        <p:cNvPr id="1" name=""/>
+        <p:cNvGrpSpPr/>
+        <p:nvPr/>
+      </p:nvGrpSpPr>
+      <p:grpSpPr>
+        <a:xfrm>
+          <a:off x="0" y="0"/>
+          <a:ext cx="0" cy="0"/>
+          <a:chOff x="0" y="0"/>
+          <a:chExt cx="0" cy="0"/>
+        </a:xfrm>
+      </p:grpSpPr>
+      <p:sp>
+        <p:nvSpPr>
+          <p:cNvPr id="2" name="Slide Image Placeholder 1"/>
+          <p:cNvSpPr>
+            <a:spLocks noGrp="1" noRot="1" noChangeAspect="1"/>
+          </p:cNvSpPr>
+          <p:nvPr>
+            <p:ph type="sldImg"/>
+          </p:nvPr>
+        </p:nvSpPr>
+        <p:spPr/>
+      </p:sp>
+      <p:sp>
+        <p:nvSpPr>
+          <p:cNvPr id="3" name="Notes Placeholder 2"/>
+          <p:cNvSpPr>
+            <a:spLocks noGrp="1"/>
+          </p:cNvSpPr>
+          <p:nvPr>
+            <p:ph type="body" idx="1"/>
+          </p:nvPr>
+        </p:nvSpPr>
+        <p:spPr/>
+        <p:txBody>
+          <a:bodyPr/>
+          <a:lstStyle/>
+          <a:p>
+            <a:pPr marL="0" marR="0" indent="0" algn="l" defTabSz="457200" rtl="0" eaLnBrk="1" fontAlgn="auto" latinLnBrk="0" hangingPunct="1">
+              <a:lnSpc>
+                <a:spcPct val="100000"/>
+              </a:lnSpc>
+              <a:spcBef>
+                <a:spcPts val="0"/>
+              </a:spcBef>
+              <a:spcAft>
+                <a:spcPts val="0"/>
+              </a:spcAft>
+              <a:buClrTx/>
+              <a:buSzTx/>
+              <a:buFontTx/>
+              <a:buNone/>
+              <a:tabLst/>
+              <a:defRPr/>
+            </a:pPr>
+            <a:endParaRPr lang="en-US" sz="1200" baseline="0" dirty="0" smtClean="0">
+              <a:solidFill>
+                <a:prstClr val="black"/>
+              </a:solidFill>
+              <a:latin typeface="ArialMT"/>
+            </a:endParaRPr>
+          </a:p>
+        </p:txBody>
+      </p:sp>
+      <p:sp>
+        <p:nvSpPr>
+          <p:cNvPr id="4" name="Slide Number Placeholder 3"/>
+          <p:cNvSpPr>
+            <a:spLocks noGrp="1"/>
+          </p:cNvSpPr>
+          <p:nvPr>
+            <p:ph type="sldNum" sz="quarter" idx="10"/>
+          </p:nvPr>
+        </p:nvSpPr>
+        <p:spPr/>
+        <p:txBody>
+          <a:bodyPr/>
+          <a:lstStyle/>
+          <a:p>
+            <a:fld id="{ADD4B5B7-85EF-4E48-AC80-2380FACD9C23}" type="slidenum">
+              <a:rPr lang="en-US" smtClean="0"/>
+              <a:t>15</a:t>
+            </a:fld>
+            <a:endParaRPr lang="en-US"/>
+          </a:p>
+        </p:txBody>
+      </p:sp>
+    </p:spTree>
+    <p:extLst>
+      <p:ext uri="{BB962C8B-B14F-4D97-AF65-F5344CB8AC3E}">
+        <p14:creationId xmlns:p14="http://schemas.microsoft.com/office/powerpoint/2010/main" val="645762702"/>
+      </p:ext>
+    </p:extLst>
+  </p:cSld>
+  <p:clrMapOvr>
+    <a:masterClrMapping/>
+  </p:clrMapOvr>
+</p:notes>
+</file>
+
+<file path=ppt/notesSlides/notesSlide16.xml><?xml version="1.0" encoding="utf-8"?>
+<p:notes xmlns:a="http://schemas.openxmlformats.org/drawingml/2006/main" xmlns:r="http://schemas.openxmlformats.org/officeDocument/2006/relationships" xmlns:p="http://schemas.openxmlformats.org/presentationml/2006/main">
+  <p:cSld>
+    <p:spTree>
+      <p:nvGrpSpPr>
+        <p:cNvPr id="1" name=""/>
+        <p:cNvGrpSpPr/>
+        <p:nvPr/>
+      </p:nvGrpSpPr>
+      <p:grpSpPr>
+        <a:xfrm>
+          <a:off x="0" y="0"/>
+          <a:ext cx="0" cy="0"/>
+          <a:chOff x="0" y="0"/>
+          <a:chExt cx="0" cy="0"/>
+        </a:xfrm>
+      </p:grpSpPr>
+      <p:sp>
+        <p:nvSpPr>
+          <p:cNvPr id="2" name="Slide Image Placeholder 1"/>
+          <p:cNvSpPr>
+            <a:spLocks noGrp="1" noRot="1" noChangeAspect="1"/>
+          </p:cNvSpPr>
+          <p:nvPr>
+            <p:ph type="sldImg"/>
+          </p:nvPr>
+        </p:nvSpPr>
+        <p:spPr/>
+      </p:sp>
+      <p:sp>
+        <p:nvSpPr>
+          <p:cNvPr id="3" name="Notes Placeholder 2"/>
+          <p:cNvSpPr>
+            <a:spLocks noGrp="1"/>
+          </p:cNvSpPr>
+          <p:nvPr>
+            <p:ph type="body" idx="1"/>
+          </p:nvPr>
+        </p:nvSpPr>
+        <p:spPr/>
+        <p:txBody>
+          <a:bodyPr/>
+          <a:lstStyle/>
+          <a:p>
+            <a:pPr marL="0" marR="0" indent="0" algn="l" defTabSz="457200" rtl="0" eaLnBrk="1" fontAlgn="auto" latinLnBrk="0" hangingPunct="1">
+              <a:lnSpc>
+                <a:spcPct val="100000"/>
+              </a:lnSpc>
+              <a:spcBef>
+                <a:spcPts val="0"/>
+              </a:spcBef>
+              <a:spcAft>
+                <a:spcPts val="0"/>
+              </a:spcAft>
+              <a:buClrTx/>
+              <a:buSzTx/>
+              <a:buFontTx/>
+              <a:buNone/>
+              <a:tabLst/>
+              <a:defRPr/>
+            </a:pPr>
+            <a:endParaRPr lang="en-US" sz="1200" baseline="0" dirty="0" smtClean="0">
+              <a:solidFill>
+                <a:prstClr val="black"/>
+              </a:solidFill>
+              <a:latin typeface="ArialMT"/>
+            </a:endParaRPr>
+          </a:p>
+        </p:txBody>
+      </p:sp>
+      <p:sp>
+        <p:nvSpPr>
+          <p:cNvPr id="4" name="Slide Number Placeholder 3"/>
+          <p:cNvSpPr>
+            <a:spLocks noGrp="1"/>
+          </p:cNvSpPr>
+          <p:nvPr>
+            <p:ph type="sldNum" sz="quarter" idx="10"/>
+          </p:nvPr>
+        </p:nvSpPr>
+        <p:spPr/>
+        <p:txBody>
+          <a:bodyPr/>
+          <a:lstStyle/>
+          <a:p>
+            <a:fld id="{ADD4B5B7-85EF-4E48-AC80-2380FACD9C23}" type="slidenum">
+              <a:rPr lang="en-US" smtClean="0"/>
+              <a:t>16</a:t>
+            </a:fld>
+            <a:endParaRPr lang="en-US"/>
+          </a:p>
+        </p:txBody>
+      </p:sp>
+    </p:spTree>
+    <p:extLst>
+      <p:ext uri="{BB962C8B-B14F-4D97-AF65-F5344CB8AC3E}">
+        <p14:creationId xmlns:p14="http://schemas.microsoft.com/office/powerpoint/2010/main" val="645762702"/>
+      </p:ext>
+    </p:extLst>
+  </p:cSld>
+  <p:clrMapOvr>
+    <a:masterClrMapping/>
+  </p:clrMapOvr>
+</p:notes>
+</file>
+
+<file path=ppt/notesSlides/notesSlide17.xml><?xml version="1.0" encoding="utf-8"?>
+<p:notes xmlns:a="http://schemas.openxmlformats.org/drawingml/2006/main" xmlns:r="http://schemas.openxmlformats.org/officeDocument/2006/relationships" xmlns:p="http://schemas.openxmlformats.org/presentationml/2006/main">
+  <p:cSld>
+    <p:spTree>
+      <p:nvGrpSpPr>
+        <p:cNvPr id="1" name=""/>
+        <p:cNvGrpSpPr/>
+        <p:nvPr/>
+      </p:nvGrpSpPr>
+      <p:grpSpPr>
+        <a:xfrm>
+          <a:off x="0" y="0"/>
+          <a:ext cx="0" cy="0"/>
+          <a:chOff x="0" y="0"/>
+          <a:chExt cx="0" cy="0"/>
+        </a:xfrm>
+      </p:grpSpPr>
+      <p:sp>
+        <p:nvSpPr>
+          <p:cNvPr id="2" name="Slide Image Placeholder 1"/>
+          <p:cNvSpPr>
+            <a:spLocks noGrp="1" noRot="1" noChangeAspect="1"/>
+          </p:cNvSpPr>
+          <p:nvPr>
+            <p:ph type="sldImg"/>
+          </p:nvPr>
+        </p:nvSpPr>
+        <p:spPr/>
+      </p:sp>
+      <p:sp>
+        <p:nvSpPr>
+          <p:cNvPr id="3" name="Notes Placeholder 2"/>
+          <p:cNvSpPr>
+            <a:spLocks noGrp="1"/>
+          </p:cNvSpPr>
+          <p:nvPr>
+            <p:ph type="body" idx="1"/>
+          </p:nvPr>
+        </p:nvSpPr>
+        <p:spPr/>
+        <p:txBody>
+          <a:bodyPr/>
+          <a:lstStyle/>
+          <a:p>
+            <a:pPr marL="0" marR="0" indent="0" algn="l" defTabSz="457200" rtl="0" eaLnBrk="1" fontAlgn="auto" latinLnBrk="0" hangingPunct="1">
+              <a:lnSpc>
+                <a:spcPct val="100000"/>
+              </a:lnSpc>
+              <a:spcBef>
+                <a:spcPts val="0"/>
+              </a:spcBef>
+              <a:spcAft>
+                <a:spcPts val="0"/>
+              </a:spcAft>
+              <a:buClrTx/>
+              <a:buSzTx/>
+              <a:buFontTx/>
+              <a:buNone/>
+              <a:tabLst/>
+              <a:defRPr/>
+            </a:pPr>
+            <a:endParaRPr lang="en-US" sz="1200" baseline="0" dirty="0" smtClean="0">
+              <a:solidFill>
+                <a:prstClr val="black"/>
+              </a:solidFill>
+              <a:latin typeface="ArialMT"/>
+            </a:endParaRPr>
+          </a:p>
+        </p:txBody>
+      </p:sp>
+      <p:sp>
+        <p:nvSpPr>
+          <p:cNvPr id="4" name="Slide Number Placeholder 3"/>
+          <p:cNvSpPr>
+            <a:spLocks noGrp="1"/>
+          </p:cNvSpPr>
+          <p:nvPr>
+            <p:ph type="sldNum" sz="quarter" idx="10"/>
+          </p:nvPr>
+        </p:nvSpPr>
+        <p:spPr/>
+        <p:txBody>
+          <a:bodyPr/>
+          <a:lstStyle/>
+          <a:p>
+            <a:fld id="{ADD4B5B7-85EF-4E48-AC80-2380FACD9C23}" type="slidenum">
+              <a:rPr lang="en-US" smtClean="0"/>
+              <a:t>17</a:t>
+            </a:fld>
+            <a:endParaRPr lang="en-US"/>
+          </a:p>
+        </p:txBody>
+      </p:sp>
+    </p:spTree>
+    <p:extLst>
+      <p:ext uri="{BB962C8B-B14F-4D97-AF65-F5344CB8AC3E}">
+        <p14:creationId xmlns:p14="http://schemas.microsoft.com/office/powerpoint/2010/main" val="645762702"/>
+      </p:ext>
+    </p:extLst>
+  </p:cSld>
+  <p:clrMapOvr>
+    <a:masterClrMapping/>
+  </p:clrMapOvr>
+</p:notes>
+</file>
+
+<file path=ppt/notesSlides/notesSlide18.xml><?xml version="1.0" encoding="utf-8"?>
+<p:notes xmlns:a="http://schemas.openxmlformats.org/drawingml/2006/main" xmlns:r="http://schemas.openxmlformats.org/officeDocument/2006/relationships" xmlns:p="http://schemas.openxmlformats.org/presentationml/2006/main">
+  <p:cSld>
+    <p:spTree>
+      <p:nvGrpSpPr>
+        <p:cNvPr id="1" name=""/>
+        <p:cNvGrpSpPr/>
+        <p:nvPr/>
+      </p:nvGrpSpPr>
+      <p:grpSpPr>
+        <a:xfrm>
+          <a:off x="0" y="0"/>
+          <a:ext cx="0" cy="0"/>
+          <a:chOff x="0" y="0"/>
+          <a:chExt cx="0" cy="0"/>
+        </a:xfrm>
+      </p:grpSpPr>
+      <p:sp>
+        <p:nvSpPr>
+          <p:cNvPr id="2" name="Slide Image Placeholder 1"/>
+          <p:cNvSpPr>
+            <a:spLocks noGrp="1" noRot="1" noChangeAspect="1"/>
+          </p:cNvSpPr>
+          <p:nvPr>
+            <p:ph type="sldImg"/>
+          </p:nvPr>
+        </p:nvSpPr>
+        <p:spPr/>
+      </p:sp>
+      <p:sp>
+        <p:nvSpPr>
+          <p:cNvPr id="3" name="Notes Placeholder 2"/>
+          <p:cNvSpPr>
+            <a:spLocks noGrp="1"/>
+          </p:cNvSpPr>
+          <p:nvPr>
+            <p:ph type="body" idx="1"/>
+          </p:nvPr>
+        </p:nvSpPr>
+        <p:spPr/>
+        <p:txBody>
+          <a:bodyPr/>
+          <a:lstStyle/>
+          <a:p>
+            <a:r>
+              <a:rPr lang="en-US" dirty="0" smtClean="0"/>
+              <a:t>Show some </a:t>
+            </a:r>
+            <a:r>
+              <a:rPr lang="en-US" dirty="0" err="1" smtClean="0"/>
+              <a:t>viz</a:t>
+            </a:r>
+            <a:r>
+              <a:rPr lang="en-US" dirty="0" smtClean="0"/>
+              <a:t>, talk about </a:t>
+            </a:r>
+            <a:r>
+              <a:rPr lang="en-US" dirty="0" err="1" smtClean="0"/>
+              <a:t>viz</a:t>
+            </a:r>
+            <a:endParaRPr lang="en-US" dirty="0"/>
+          </a:p>
+        </p:txBody>
+      </p:sp>
+      <p:sp>
+        <p:nvSpPr>
+          <p:cNvPr id="4" name="Slide Number Placeholder 3"/>
+          <p:cNvSpPr>
+            <a:spLocks noGrp="1"/>
+          </p:cNvSpPr>
+          <p:nvPr>
+            <p:ph type="sldNum" sz="quarter" idx="10"/>
+          </p:nvPr>
+        </p:nvSpPr>
+        <p:spPr/>
+        <p:txBody>
+          <a:bodyPr/>
+          <a:lstStyle/>
+          <a:p>
+            <a:fld id="{ADD4B5B7-85EF-4E48-AC80-2380FACD9C23}" type="slidenum">
+              <a:rPr lang="en-US" smtClean="0"/>
+              <a:t>18</a:t>
+            </a:fld>
+            <a:endParaRPr lang="en-US"/>
+          </a:p>
+        </p:txBody>
+      </p:sp>
+    </p:spTree>
+    <p:extLst>
+      <p:ext uri="{BB962C8B-B14F-4D97-AF65-F5344CB8AC3E}">
+        <p14:creationId xmlns:p14="http://schemas.microsoft.com/office/powerpoint/2010/main" val="158773868"/>
+      </p:ext>
+    </p:extLst>
+  </p:cSld>
+  <p:clrMapOvr>
+    <a:masterClrMapping/>
+  </p:clrMapOvr>
+</p:notes>
+</file>
+
+<file path=ppt/notesSlides/notesSlide19.xml><?xml version="1.0" encoding="utf-8"?>
+<p:notes xmlns:a="http://schemas.openxmlformats.org/drawingml/2006/main" xmlns:r="http://schemas.openxmlformats.org/officeDocument/2006/relationships" xmlns:p="http://schemas.openxmlformats.org/presentationml/2006/main">
+  <p:cSld>
+    <p:spTree>
+      <p:nvGrpSpPr>
+        <p:cNvPr id="1" name=""/>
+        <p:cNvGrpSpPr/>
+        <p:nvPr/>
+      </p:nvGrpSpPr>
+      <p:grpSpPr>
+        <a:xfrm>
+          <a:off x="0" y="0"/>
+          <a:ext cx="0" cy="0"/>
+          <a:chOff x="0" y="0"/>
+          <a:chExt cx="0" cy="0"/>
+        </a:xfrm>
+      </p:grpSpPr>
+      <p:sp>
+        <p:nvSpPr>
+          <p:cNvPr id="2" name="Slide Image Placeholder 1"/>
+          <p:cNvSpPr>
+            <a:spLocks noGrp="1" noRot="1" noChangeAspect="1"/>
+          </p:cNvSpPr>
+          <p:nvPr>
+            <p:ph type="sldImg"/>
+          </p:nvPr>
+        </p:nvSpPr>
+        <p:spPr/>
+      </p:sp>
+      <p:sp>
+        <p:nvSpPr>
+          <p:cNvPr id="3" name="Notes Placeholder 2"/>
+          <p:cNvSpPr>
+            <a:spLocks noGrp="1"/>
+          </p:cNvSpPr>
+          <p:nvPr>
+            <p:ph type="body" idx="1"/>
+          </p:nvPr>
+        </p:nvSpPr>
+        <p:spPr/>
+        <p:txBody>
+          <a:bodyPr/>
+          <a:lstStyle/>
+          <a:p>
+            <a:r>
+              <a:rPr lang="en-US" dirty="0" smtClean="0"/>
+              <a:t>Show some </a:t>
+            </a:r>
+            <a:r>
+              <a:rPr lang="en-US" dirty="0" err="1" smtClean="0"/>
+              <a:t>viz</a:t>
+            </a:r>
+            <a:r>
+              <a:rPr lang="en-US" dirty="0" smtClean="0"/>
+              <a:t>, talk about </a:t>
+            </a:r>
+            <a:r>
+              <a:rPr lang="en-US" dirty="0" err="1" smtClean="0"/>
+              <a:t>viz</a:t>
+            </a:r>
+            <a:endParaRPr lang="en-US" dirty="0"/>
+          </a:p>
+        </p:txBody>
+      </p:sp>
+      <p:sp>
+        <p:nvSpPr>
+          <p:cNvPr id="4" name="Slide Number Placeholder 3"/>
+          <p:cNvSpPr>
+            <a:spLocks noGrp="1"/>
+          </p:cNvSpPr>
+          <p:nvPr>
+            <p:ph type="sldNum" sz="quarter" idx="10"/>
+          </p:nvPr>
+        </p:nvSpPr>
+        <p:spPr/>
+        <p:txBody>
+          <a:bodyPr/>
+          <a:lstStyle/>
+          <a:p>
+            <a:fld id="{ADD4B5B7-85EF-4E48-AC80-2380FACD9C23}" type="slidenum">
+              <a:rPr lang="en-US" smtClean="0"/>
+              <a:t>19</a:t>
             </a:fld>
             <a:endParaRPr lang="en-US"/>
           </a:p>
@@ -1109,6 +1752,290 @@
 </p:notes>
 </file>
 
+<file path=ppt/notesSlides/notesSlide20.xml><?xml version="1.0" encoding="utf-8"?>
+<p:notes xmlns:a="http://schemas.openxmlformats.org/drawingml/2006/main" xmlns:r="http://schemas.openxmlformats.org/officeDocument/2006/relationships" xmlns:p="http://schemas.openxmlformats.org/presentationml/2006/main">
+  <p:cSld>
+    <p:spTree>
+      <p:nvGrpSpPr>
+        <p:cNvPr id="1" name=""/>
+        <p:cNvGrpSpPr/>
+        <p:nvPr/>
+      </p:nvGrpSpPr>
+      <p:grpSpPr>
+        <a:xfrm>
+          <a:off x="0" y="0"/>
+          <a:ext cx="0" cy="0"/>
+          <a:chOff x="0" y="0"/>
+          <a:chExt cx="0" cy="0"/>
+        </a:xfrm>
+      </p:grpSpPr>
+      <p:sp>
+        <p:nvSpPr>
+          <p:cNvPr id="2" name="Slide Image Placeholder 1"/>
+          <p:cNvSpPr>
+            <a:spLocks noGrp="1" noRot="1" noChangeAspect="1"/>
+          </p:cNvSpPr>
+          <p:nvPr>
+            <p:ph type="sldImg"/>
+          </p:nvPr>
+        </p:nvSpPr>
+        <p:spPr/>
+      </p:sp>
+      <p:sp>
+        <p:nvSpPr>
+          <p:cNvPr id="3" name="Notes Placeholder 2"/>
+          <p:cNvSpPr>
+            <a:spLocks noGrp="1"/>
+          </p:cNvSpPr>
+          <p:nvPr>
+            <p:ph type="body" idx="1"/>
+          </p:nvPr>
+        </p:nvSpPr>
+        <p:spPr/>
+        <p:txBody>
+          <a:bodyPr/>
+          <a:lstStyle/>
+          <a:p>
+            <a:r>
+              <a:rPr lang="en-US" dirty="0" smtClean="0"/>
+              <a:t>Show some </a:t>
+            </a:r>
+            <a:r>
+              <a:rPr lang="en-US" dirty="0" err="1" smtClean="0"/>
+              <a:t>viz</a:t>
+            </a:r>
+            <a:r>
+              <a:rPr lang="en-US" dirty="0" smtClean="0"/>
+              <a:t>, talk about </a:t>
+            </a:r>
+            <a:r>
+              <a:rPr lang="en-US" dirty="0" err="1" smtClean="0"/>
+              <a:t>viz</a:t>
+            </a:r>
+            <a:endParaRPr lang="en-US" dirty="0"/>
+          </a:p>
+        </p:txBody>
+      </p:sp>
+      <p:sp>
+        <p:nvSpPr>
+          <p:cNvPr id="4" name="Slide Number Placeholder 3"/>
+          <p:cNvSpPr>
+            <a:spLocks noGrp="1"/>
+          </p:cNvSpPr>
+          <p:nvPr>
+            <p:ph type="sldNum" sz="quarter" idx="10"/>
+          </p:nvPr>
+        </p:nvSpPr>
+        <p:spPr/>
+        <p:txBody>
+          <a:bodyPr/>
+          <a:lstStyle/>
+          <a:p>
+            <a:fld id="{ADD4B5B7-85EF-4E48-AC80-2380FACD9C23}" type="slidenum">
+              <a:rPr lang="en-US" smtClean="0"/>
+              <a:t>20</a:t>
+            </a:fld>
+            <a:endParaRPr lang="en-US"/>
+          </a:p>
+        </p:txBody>
+      </p:sp>
+    </p:spTree>
+    <p:extLst>
+      <p:ext uri="{BB962C8B-B14F-4D97-AF65-F5344CB8AC3E}">
+        <p14:creationId xmlns:p14="http://schemas.microsoft.com/office/powerpoint/2010/main" val="158773868"/>
+      </p:ext>
+    </p:extLst>
+  </p:cSld>
+  <p:clrMapOvr>
+    <a:masterClrMapping/>
+  </p:clrMapOvr>
+</p:notes>
+</file>
+
+<file path=ppt/notesSlides/notesSlide21.xml><?xml version="1.0" encoding="utf-8"?>
+<p:notes xmlns:a="http://schemas.openxmlformats.org/drawingml/2006/main" xmlns:r="http://schemas.openxmlformats.org/officeDocument/2006/relationships" xmlns:p="http://schemas.openxmlformats.org/presentationml/2006/main">
+  <p:cSld>
+    <p:spTree>
+      <p:nvGrpSpPr>
+        <p:cNvPr id="1" name=""/>
+        <p:cNvGrpSpPr/>
+        <p:nvPr/>
+      </p:nvGrpSpPr>
+      <p:grpSpPr>
+        <a:xfrm>
+          <a:off x="0" y="0"/>
+          <a:ext cx="0" cy="0"/>
+          <a:chOff x="0" y="0"/>
+          <a:chExt cx="0" cy="0"/>
+        </a:xfrm>
+      </p:grpSpPr>
+      <p:sp>
+        <p:nvSpPr>
+          <p:cNvPr id="2" name="Slide Image Placeholder 1"/>
+          <p:cNvSpPr>
+            <a:spLocks noGrp="1" noRot="1" noChangeAspect="1"/>
+          </p:cNvSpPr>
+          <p:nvPr>
+            <p:ph type="sldImg"/>
+          </p:nvPr>
+        </p:nvSpPr>
+        <p:spPr/>
+      </p:sp>
+      <p:sp>
+        <p:nvSpPr>
+          <p:cNvPr id="3" name="Notes Placeholder 2"/>
+          <p:cNvSpPr>
+            <a:spLocks noGrp="1"/>
+          </p:cNvSpPr>
+          <p:nvPr>
+            <p:ph type="body" idx="1"/>
+          </p:nvPr>
+        </p:nvSpPr>
+        <p:spPr/>
+        <p:txBody>
+          <a:bodyPr/>
+          <a:lstStyle/>
+          <a:p>
+            <a:r>
+              <a:rPr lang="en-US" dirty="0" smtClean="0"/>
+              <a:t>Show some </a:t>
+            </a:r>
+            <a:r>
+              <a:rPr lang="en-US" dirty="0" err="1" smtClean="0"/>
+              <a:t>viz</a:t>
+            </a:r>
+            <a:r>
+              <a:rPr lang="en-US" dirty="0" smtClean="0"/>
+              <a:t>, talk about </a:t>
+            </a:r>
+            <a:r>
+              <a:rPr lang="en-US" dirty="0" err="1" smtClean="0"/>
+              <a:t>viz</a:t>
+            </a:r>
+            <a:endParaRPr lang="en-US" dirty="0"/>
+          </a:p>
+        </p:txBody>
+      </p:sp>
+      <p:sp>
+        <p:nvSpPr>
+          <p:cNvPr id="4" name="Slide Number Placeholder 3"/>
+          <p:cNvSpPr>
+            <a:spLocks noGrp="1"/>
+          </p:cNvSpPr>
+          <p:nvPr>
+            <p:ph type="sldNum" sz="quarter" idx="10"/>
+          </p:nvPr>
+        </p:nvSpPr>
+        <p:spPr/>
+        <p:txBody>
+          <a:bodyPr/>
+          <a:lstStyle/>
+          <a:p>
+            <a:fld id="{ADD4B5B7-85EF-4E48-AC80-2380FACD9C23}" type="slidenum">
+              <a:rPr lang="en-US" smtClean="0"/>
+              <a:t>21</a:t>
+            </a:fld>
+            <a:endParaRPr lang="en-US"/>
+          </a:p>
+        </p:txBody>
+      </p:sp>
+    </p:spTree>
+    <p:extLst>
+      <p:ext uri="{BB962C8B-B14F-4D97-AF65-F5344CB8AC3E}">
+        <p14:creationId xmlns:p14="http://schemas.microsoft.com/office/powerpoint/2010/main" val="158773868"/>
+      </p:ext>
+    </p:extLst>
+  </p:cSld>
+  <p:clrMapOvr>
+    <a:masterClrMapping/>
+  </p:clrMapOvr>
+</p:notes>
+</file>
+
+<file path=ppt/notesSlides/notesSlide22.xml><?xml version="1.0" encoding="utf-8"?>
+<p:notes xmlns:a="http://schemas.openxmlformats.org/drawingml/2006/main" xmlns:r="http://schemas.openxmlformats.org/officeDocument/2006/relationships" xmlns:p="http://schemas.openxmlformats.org/presentationml/2006/main">
+  <p:cSld>
+    <p:spTree>
+      <p:nvGrpSpPr>
+        <p:cNvPr id="1" name=""/>
+        <p:cNvGrpSpPr/>
+        <p:nvPr/>
+      </p:nvGrpSpPr>
+      <p:grpSpPr>
+        <a:xfrm>
+          <a:off x="0" y="0"/>
+          <a:ext cx="0" cy="0"/>
+          <a:chOff x="0" y="0"/>
+          <a:chExt cx="0" cy="0"/>
+        </a:xfrm>
+      </p:grpSpPr>
+      <p:sp>
+        <p:nvSpPr>
+          <p:cNvPr id="2" name="Slide Image Placeholder 1"/>
+          <p:cNvSpPr>
+            <a:spLocks noGrp="1" noRot="1" noChangeAspect="1"/>
+          </p:cNvSpPr>
+          <p:nvPr>
+            <p:ph type="sldImg"/>
+          </p:nvPr>
+        </p:nvSpPr>
+        <p:spPr/>
+      </p:sp>
+      <p:sp>
+        <p:nvSpPr>
+          <p:cNvPr id="3" name="Notes Placeholder 2"/>
+          <p:cNvSpPr>
+            <a:spLocks noGrp="1"/>
+          </p:cNvSpPr>
+          <p:nvPr>
+            <p:ph type="body" idx="1"/>
+          </p:nvPr>
+        </p:nvSpPr>
+        <p:spPr/>
+        <p:txBody>
+          <a:bodyPr/>
+          <a:lstStyle/>
+          <a:p>
+            <a:endParaRPr lang="en-US" dirty="0"/>
+          </a:p>
+        </p:txBody>
+      </p:sp>
+      <p:sp>
+        <p:nvSpPr>
+          <p:cNvPr id="4" name="Slide Number Placeholder 3"/>
+          <p:cNvSpPr>
+            <a:spLocks noGrp="1"/>
+          </p:cNvSpPr>
+          <p:nvPr>
+            <p:ph type="sldNum" sz="quarter" idx="10"/>
+          </p:nvPr>
+        </p:nvSpPr>
+        <p:spPr/>
+        <p:txBody>
+          <a:bodyPr/>
+          <a:lstStyle/>
+          <a:p>
+            <a:fld id="{ADD4B5B7-85EF-4E48-AC80-2380FACD9C23}" type="slidenum">
+              <a:rPr lang="en-US" smtClean="0"/>
+              <a:t>22</a:t>
+            </a:fld>
+            <a:endParaRPr lang="en-US"/>
+          </a:p>
+        </p:txBody>
+      </p:sp>
+    </p:spTree>
+    <p:extLst>
+      <p:ext uri="{BB962C8B-B14F-4D97-AF65-F5344CB8AC3E}">
+        <p14:creationId xmlns:p14="http://schemas.microsoft.com/office/powerpoint/2010/main" val="158773868"/>
+      </p:ext>
+    </p:extLst>
+  </p:cSld>
+  <p:clrMapOvr>
+    <a:masterClrMapping/>
+  </p:clrMapOvr>
+</p:notes>
+</file>
+
 <file path=ppt/notesSlides/notesSlide3.xml><?xml version="1.0" encoding="utf-8"?>
 <p:notes xmlns:a="http://schemas.openxmlformats.org/drawingml/2006/main" xmlns:r="http://schemas.openxmlformats.org/officeDocument/2006/relationships" xmlns:p="http://schemas.openxmlformats.org/presentationml/2006/main">
   <p:cSld>
@@ -1776,16 +2703,7 @@
                 </a:solidFill>
                 <a:latin typeface="ArialMT"/>
               </a:rPr>
-              <a:t> tells you</a:t>
-            </a:r>
-            <a:r>
-              <a:rPr lang="en-US" sz="1200" baseline="0" dirty="0" smtClean="0">
-                <a:solidFill>
-                  <a:prstClr val="black"/>
-                </a:solidFill>
-                <a:latin typeface="ArialMT"/>
-              </a:rPr>
-              <a:t>?</a:t>
+              <a:t> tells you?</a:t>
             </a:r>
           </a:p>
           <a:p>
@@ -1975,16 +2893,7 @@
                 </a:solidFill>
                 <a:latin typeface="ArialMT"/>
               </a:rPr>
-              <a:t>Q: More importantly, do you know what the line of best fit tells </a:t>
-            </a:r>
-            <a:r>
-              <a:rPr lang="en-US" sz="1200" baseline="0" dirty="0" smtClean="0">
-                <a:solidFill>
-                  <a:prstClr val="black"/>
-                </a:solidFill>
-                <a:latin typeface="ArialMT"/>
-              </a:rPr>
-              <a:t>you?</a:t>
+              <a:t>Q: More importantly, do you know what the line of best fit tells you?</a:t>
             </a:r>
           </a:p>
         </p:txBody>
@@ -9263,8 +10172,8 @@
         </p:nvSpPr>
         <p:spPr>
           <a:xfrm>
-            <a:off x="347663" y="3238500"/>
-            <a:ext cx="8426450" cy="1828800"/>
+            <a:off x="347663" y="1485900"/>
+            <a:ext cx="8426450" cy="3581400"/>
           </a:xfrm>
         </p:spPr>
         <p:txBody>
@@ -9276,7 +10185,14 @@
             </a:pPr>
             <a:r>
               <a:rPr lang="en-US" sz="7500" dirty="0" smtClean="0"/>
-              <a:t>II. Visualization as a  medium</a:t>
+              <a:t>Visualization</a:t>
+            </a:r>
+            <a:br>
+              <a:rPr lang="en-US" sz="7500" dirty="0" smtClean="0"/>
+            </a:br>
+            <a:r>
+              <a:rPr lang="en-US" sz="7500" dirty="0" smtClean="0"/>
+              <a:t>INTERACTS WITH INTERPRETATION</a:t>
             </a:r>
             <a:endParaRPr lang="en-US" sz="7500" dirty="0"/>
           </a:p>
@@ -9313,8 +10229,11 @@
                 <a:ea typeface="ヒラギノ角ゴ ProN W3" charset="0"/>
                 <a:cs typeface="ヒラギノ角ゴ ProN W3" charset="0"/>
               </a:rPr>
-              <a:t>INTRO TO DATA SCIENCE</a:t>
-            </a:r>
+              <a:t>THE IMPORTANCE OF DATA VISUALIZATION</a:t>
+            </a:r>
+          </a:p>
+          <a:p>
+            <a:pPr marL="0" indent="0"/>
             <a:endParaRPr lang="en-US" cap="none" dirty="0">
               <a:latin typeface="PFDinTextCompPro-Bold" charset="0"/>
               <a:ea typeface="ヒラギノ角ゴ ProN W3" charset="0"/>
@@ -9326,7 +10245,7 @@
     </p:spTree>
     <p:extLst>
       <p:ext uri="{BB962C8B-B14F-4D97-AF65-F5344CB8AC3E}">
-        <p14:creationId xmlns:p14="http://schemas.microsoft.com/office/powerpoint/2010/main" val="4293879031"/>
+        <p14:creationId xmlns:p14="http://schemas.microsoft.com/office/powerpoint/2010/main" val="3817191084"/>
       </p:ext>
     </p:extLst>
   </p:cSld>
@@ -9363,6 +10282,616 @@
       </p:grpSpPr>
       <p:sp>
         <p:nvSpPr>
+          <p:cNvPr id="4" name="Content Placeholder 3"/>
+          <p:cNvSpPr>
+            <a:spLocks noGrp="1"/>
+          </p:cNvSpPr>
+          <p:nvPr>
+            <p:ph sz="quarter" idx="11"/>
+          </p:nvPr>
+        </p:nvSpPr>
+        <p:spPr>
+          <a:xfrm>
+            <a:off x="414337" y="495300"/>
+            <a:ext cx="7162800" cy="304800"/>
+          </a:xfrm>
+        </p:spPr>
+        <p:txBody>
+          <a:bodyPr/>
+          <a:lstStyle/>
+          <a:p>
+            <a:r>
+              <a:rPr lang="en-US" cap="none" dirty="0">
+                <a:latin typeface="PFDinTextCompPro-Bold" charset="0"/>
+                <a:ea typeface="ヒラギノ角ゴ ProN W3" charset="0"/>
+                <a:cs typeface="ヒラギノ角ゴ ProN W3" charset="0"/>
+              </a:rPr>
+              <a:t>THE IMPORTANCE OF DATA VISUALIZATION</a:t>
+            </a:r>
+          </a:p>
+        </p:txBody>
+      </p:sp>
+      <p:sp>
+        <p:nvSpPr>
+          <p:cNvPr id="8" name="Slide Number Placeholder 3"/>
+          <p:cNvSpPr>
+            <a:spLocks noGrp="1"/>
+          </p:cNvSpPr>
+          <p:nvPr>
+            <p:ph type="sldNum" sz="quarter" idx="13"/>
+          </p:nvPr>
+        </p:nvSpPr>
+        <p:spPr/>
+        <p:txBody>
+          <a:bodyPr/>
+          <a:lstStyle/>
+          <a:p>
+            <a:pPr>
+              <a:defRPr/>
+            </a:pPr>
+            <a:fld id="{BD5AD749-DAD1-6A4A-A2AA-CB20EAD0AEB7}" type="slidenum">
+              <a:rPr lang="en-US"/>
+              <a:pPr>
+                <a:defRPr/>
+              </a:pPr>
+              <a:t>13</a:t>
+            </a:fld>
+            <a:endParaRPr lang="en-US"/>
+          </a:p>
+        </p:txBody>
+      </p:sp>
+      <p:pic>
+        <p:nvPicPr>
+          <p:cNvPr id="5" name="Picture 4"/>
+          <p:cNvPicPr>
+            <a:picLocks noChangeAspect="1"/>
+          </p:cNvPicPr>
+          <p:nvPr/>
+        </p:nvPicPr>
+        <p:blipFill>
+          <a:blip r:embed="rId3"/>
+          <a:stretch>
+            <a:fillRect/>
+          </a:stretch>
+        </p:blipFill>
+        <p:spPr>
+          <a:xfrm>
+            <a:off x="3683000" y="1828800"/>
+            <a:ext cx="1981200" cy="1587500"/>
+          </a:xfrm>
+          <a:prstGeom prst="rect">
+            <a:avLst/>
+          </a:prstGeom>
+        </p:spPr>
+      </p:pic>
+    </p:spTree>
+    <p:extLst>
+      <p:ext uri="{BB962C8B-B14F-4D97-AF65-F5344CB8AC3E}">
+        <p14:creationId xmlns:p14="http://schemas.microsoft.com/office/powerpoint/2010/main" val="291422304"/>
+      </p:ext>
+    </p:extLst>
+  </p:cSld>
+  <p:clrMapOvr>
+    <a:masterClrMapping/>
+  </p:clrMapOvr>
+  <p:transition xmlns:p14="http://schemas.microsoft.com/office/powerpoint/2010/main"/>
+  <p:timing>
+    <p:tnLst>
+      <p:par>
+        <p:cTn xmlns:p14="http://schemas.microsoft.com/office/powerpoint/2010/main" id="1" dur="indefinite" restart="never" nodeType="tmRoot"/>
+      </p:par>
+    </p:tnLst>
+  </p:timing>
+</p:sld>
+</file>
+
+<file path=ppt/slides/slide14.xml><?xml version="1.0" encoding="utf-8"?>
+<p:sld xmlns:a="http://schemas.openxmlformats.org/drawingml/2006/main" xmlns:r="http://schemas.openxmlformats.org/officeDocument/2006/relationships" xmlns:p="http://schemas.openxmlformats.org/presentationml/2006/main">
+  <p:cSld>
+    <p:spTree>
+      <p:nvGrpSpPr>
+        <p:cNvPr id="1" name=""/>
+        <p:cNvGrpSpPr/>
+        <p:nvPr/>
+      </p:nvGrpSpPr>
+      <p:grpSpPr>
+        <a:xfrm>
+          <a:off x="0" y="0"/>
+          <a:ext cx="0" cy="0"/>
+          <a:chOff x="0" y="0"/>
+          <a:chExt cx="0" cy="0"/>
+        </a:xfrm>
+      </p:grpSpPr>
+      <p:sp>
+        <p:nvSpPr>
+          <p:cNvPr id="4" name="Content Placeholder 3"/>
+          <p:cNvSpPr>
+            <a:spLocks noGrp="1"/>
+          </p:cNvSpPr>
+          <p:nvPr>
+            <p:ph sz="quarter" idx="11"/>
+          </p:nvPr>
+        </p:nvSpPr>
+        <p:spPr>
+          <a:xfrm>
+            <a:off x="414337" y="495300"/>
+            <a:ext cx="7162800" cy="304800"/>
+          </a:xfrm>
+        </p:spPr>
+        <p:txBody>
+          <a:bodyPr/>
+          <a:lstStyle/>
+          <a:p>
+            <a:r>
+              <a:rPr lang="en-US" cap="none" dirty="0">
+                <a:latin typeface="PFDinTextCompPro-Bold" charset="0"/>
+                <a:ea typeface="ヒラギノ角ゴ ProN W3" charset="0"/>
+                <a:cs typeface="ヒラギノ角ゴ ProN W3" charset="0"/>
+              </a:rPr>
+              <a:t>THE IMPORTANCE OF DATA VISUALIZATION</a:t>
+            </a:r>
+          </a:p>
+        </p:txBody>
+      </p:sp>
+      <p:sp>
+        <p:nvSpPr>
+          <p:cNvPr id="8" name="Slide Number Placeholder 3"/>
+          <p:cNvSpPr>
+            <a:spLocks noGrp="1"/>
+          </p:cNvSpPr>
+          <p:nvPr>
+            <p:ph type="sldNum" sz="quarter" idx="13"/>
+          </p:nvPr>
+        </p:nvSpPr>
+        <p:spPr/>
+        <p:txBody>
+          <a:bodyPr/>
+          <a:lstStyle/>
+          <a:p>
+            <a:pPr>
+              <a:defRPr/>
+            </a:pPr>
+            <a:fld id="{BD5AD749-DAD1-6A4A-A2AA-CB20EAD0AEB7}" type="slidenum">
+              <a:rPr lang="en-US"/>
+              <a:pPr>
+                <a:defRPr/>
+              </a:pPr>
+              <a:t>14</a:t>
+            </a:fld>
+            <a:endParaRPr lang="en-US"/>
+          </a:p>
+        </p:txBody>
+      </p:sp>
+      <p:pic>
+        <p:nvPicPr>
+          <p:cNvPr id="2" name="Picture 1"/>
+          <p:cNvPicPr>
+            <a:picLocks noChangeAspect="1"/>
+          </p:cNvPicPr>
+          <p:nvPr/>
+        </p:nvPicPr>
+        <p:blipFill>
+          <a:blip r:embed="rId3"/>
+          <a:stretch>
+            <a:fillRect/>
+          </a:stretch>
+        </p:blipFill>
+        <p:spPr>
+          <a:xfrm>
+            <a:off x="3403600" y="1790700"/>
+            <a:ext cx="2552700" cy="1676400"/>
+          </a:xfrm>
+          <a:prstGeom prst="rect">
+            <a:avLst/>
+          </a:prstGeom>
+        </p:spPr>
+      </p:pic>
+    </p:spTree>
+    <p:extLst>
+      <p:ext uri="{BB962C8B-B14F-4D97-AF65-F5344CB8AC3E}">
+        <p14:creationId xmlns:p14="http://schemas.microsoft.com/office/powerpoint/2010/main" val="2766492434"/>
+      </p:ext>
+    </p:extLst>
+  </p:cSld>
+  <p:clrMapOvr>
+    <a:masterClrMapping/>
+  </p:clrMapOvr>
+  <p:transition xmlns:p14="http://schemas.microsoft.com/office/powerpoint/2010/main"/>
+  <p:timing>
+    <p:tnLst>
+      <p:par>
+        <p:cTn xmlns:p14="http://schemas.microsoft.com/office/powerpoint/2010/main" id="1" dur="indefinite" restart="never" nodeType="tmRoot"/>
+      </p:par>
+    </p:tnLst>
+  </p:timing>
+</p:sld>
+</file>
+
+<file path=ppt/slides/slide15.xml><?xml version="1.0" encoding="utf-8"?>
+<p:sld xmlns:a="http://schemas.openxmlformats.org/drawingml/2006/main" xmlns:r="http://schemas.openxmlformats.org/officeDocument/2006/relationships" xmlns:p="http://schemas.openxmlformats.org/presentationml/2006/main">
+  <p:cSld>
+    <p:spTree>
+      <p:nvGrpSpPr>
+        <p:cNvPr id="1" name=""/>
+        <p:cNvGrpSpPr/>
+        <p:nvPr/>
+      </p:nvGrpSpPr>
+      <p:grpSpPr>
+        <a:xfrm>
+          <a:off x="0" y="0"/>
+          <a:ext cx="0" cy="0"/>
+          <a:chOff x="0" y="0"/>
+          <a:chExt cx="0" cy="0"/>
+        </a:xfrm>
+      </p:grpSpPr>
+      <p:sp>
+        <p:nvSpPr>
+          <p:cNvPr id="4" name="Content Placeholder 3"/>
+          <p:cNvSpPr>
+            <a:spLocks noGrp="1"/>
+          </p:cNvSpPr>
+          <p:nvPr>
+            <p:ph sz="quarter" idx="11"/>
+          </p:nvPr>
+        </p:nvSpPr>
+        <p:spPr>
+          <a:xfrm>
+            <a:off x="414337" y="495300"/>
+            <a:ext cx="7162800" cy="304800"/>
+          </a:xfrm>
+        </p:spPr>
+        <p:txBody>
+          <a:bodyPr/>
+          <a:lstStyle/>
+          <a:p>
+            <a:r>
+              <a:rPr lang="en-US" cap="none" dirty="0">
+                <a:latin typeface="PFDinTextCompPro-Bold" charset="0"/>
+                <a:ea typeface="ヒラギノ角ゴ ProN W3" charset="0"/>
+                <a:cs typeface="ヒラギノ角ゴ ProN W3" charset="0"/>
+              </a:rPr>
+              <a:t>THE IMPORTANCE OF DATA VISUALIZATION</a:t>
+            </a:r>
+          </a:p>
+        </p:txBody>
+      </p:sp>
+      <p:sp>
+        <p:nvSpPr>
+          <p:cNvPr id="8" name="Slide Number Placeholder 3"/>
+          <p:cNvSpPr>
+            <a:spLocks noGrp="1"/>
+          </p:cNvSpPr>
+          <p:nvPr>
+            <p:ph type="sldNum" sz="quarter" idx="13"/>
+          </p:nvPr>
+        </p:nvSpPr>
+        <p:spPr/>
+        <p:txBody>
+          <a:bodyPr/>
+          <a:lstStyle/>
+          <a:p>
+            <a:pPr>
+              <a:defRPr/>
+            </a:pPr>
+            <a:fld id="{BD5AD749-DAD1-6A4A-A2AA-CB20EAD0AEB7}" type="slidenum">
+              <a:rPr lang="en-US"/>
+              <a:pPr>
+                <a:defRPr/>
+              </a:pPr>
+              <a:t>15</a:t>
+            </a:fld>
+            <a:endParaRPr lang="en-US"/>
+          </a:p>
+        </p:txBody>
+      </p:sp>
+      <p:pic>
+        <p:nvPicPr>
+          <p:cNvPr id="2" name="Picture 1"/>
+          <p:cNvPicPr>
+            <a:picLocks noChangeAspect="1"/>
+          </p:cNvPicPr>
+          <p:nvPr/>
+        </p:nvPicPr>
+        <p:blipFill>
+          <a:blip r:embed="rId3"/>
+          <a:stretch>
+            <a:fillRect/>
+          </a:stretch>
+        </p:blipFill>
+        <p:spPr>
+          <a:xfrm>
+            <a:off x="3632200" y="1739900"/>
+            <a:ext cx="2082800" cy="1778000"/>
+          </a:xfrm>
+          <a:prstGeom prst="rect">
+            <a:avLst/>
+          </a:prstGeom>
+        </p:spPr>
+      </p:pic>
+    </p:spTree>
+    <p:extLst>
+      <p:ext uri="{BB962C8B-B14F-4D97-AF65-F5344CB8AC3E}">
+        <p14:creationId xmlns:p14="http://schemas.microsoft.com/office/powerpoint/2010/main" val="2766492434"/>
+      </p:ext>
+    </p:extLst>
+  </p:cSld>
+  <p:clrMapOvr>
+    <a:masterClrMapping/>
+  </p:clrMapOvr>
+  <p:transition xmlns:p14="http://schemas.microsoft.com/office/powerpoint/2010/main"/>
+  <p:timing>
+    <p:tnLst>
+      <p:par>
+        <p:cTn xmlns:p14="http://schemas.microsoft.com/office/powerpoint/2010/main" id="1" dur="indefinite" restart="never" nodeType="tmRoot"/>
+      </p:par>
+    </p:tnLst>
+  </p:timing>
+</p:sld>
+</file>
+
+<file path=ppt/slides/slide16.xml><?xml version="1.0" encoding="utf-8"?>
+<p:sld xmlns:a="http://schemas.openxmlformats.org/drawingml/2006/main" xmlns:r="http://schemas.openxmlformats.org/officeDocument/2006/relationships" xmlns:p="http://schemas.openxmlformats.org/presentationml/2006/main">
+  <p:cSld>
+    <p:spTree>
+      <p:nvGrpSpPr>
+        <p:cNvPr id="1" name=""/>
+        <p:cNvGrpSpPr/>
+        <p:nvPr/>
+      </p:nvGrpSpPr>
+      <p:grpSpPr>
+        <a:xfrm>
+          <a:off x="0" y="0"/>
+          <a:ext cx="0" cy="0"/>
+          <a:chOff x="0" y="0"/>
+          <a:chExt cx="0" cy="0"/>
+        </a:xfrm>
+      </p:grpSpPr>
+      <p:sp>
+        <p:nvSpPr>
+          <p:cNvPr id="4" name="Content Placeholder 3"/>
+          <p:cNvSpPr>
+            <a:spLocks noGrp="1"/>
+          </p:cNvSpPr>
+          <p:nvPr>
+            <p:ph sz="quarter" idx="11"/>
+          </p:nvPr>
+        </p:nvSpPr>
+        <p:spPr>
+          <a:xfrm>
+            <a:off x="414337" y="495300"/>
+            <a:ext cx="7162800" cy="304800"/>
+          </a:xfrm>
+        </p:spPr>
+        <p:txBody>
+          <a:bodyPr/>
+          <a:lstStyle/>
+          <a:p>
+            <a:r>
+              <a:rPr lang="en-US" cap="none" dirty="0">
+                <a:latin typeface="PFDinTextCompPro-Bold" charset="0"/>
+                <a:ea typeface="ヒラギノ角ゴ ProN W3" charset="0"/>
+                <a:cs typeface="ヒラギノ角ゴ ProN W3" charset="0"/>
+              </a:rPr>
+              <a:t>THE IMPORTANCE OF DATA VISUALIZATION</a:t>
+            </a:r>
+          </a:p>
+        </p:txBody>
+      </p:sp>
+      <p:sp>
+        <p:nvSpPr>
+          <p:cNvPr id="8" name="Slide Number Placeholder 3"/>
+          <p:cNvSpPr>
+            <a:spLocks noGrp="1"/>
+          </p:cNvSpPr>
+          <p:nvPr>
+            <p:ph type="sldNum" sz="quarter" idx="13"/>
+          </p:nvPr>
+        </p:nvSpPr>
+        <p:spPr/>
+        <p:txBody>
+          <a:bodyPr/>
+          <a:lstStyle/>
+          <a:p>
+            <a:pPr>
+              <a:defRPr/>
+            </a:pPr>
+            <a:fld id="{BD5AD749-DAD1-6A4A-A2AA-CB20EAD0AEB7}" type="slidenum">
+              <a:rPr lang="en-US"/>
+              <a:pPr>
+                <a:defRPr/>
+              </a:pPr>
+              <a:t>16</a:t>
+            </a:fld>
+            <a:endParaRPr lang="en-US"/>
+          </a:p>
+        </p:txBody>
+      </p:sp>
+      <p:pic>
+        <p:nvPicPr>
+          <p:cNvPr id="2" name="Picture 1"/>
+          <p:cNvPicPr>
+            <a:picLocks noChangeAspect="1"/>
+          </p:cNvPicPr>
+          <p:nvPr/>
+        </p:nvPicPr>
+        <p:blipFill>
+          <a:blip r:embed="rId3"/>
+          <a:stretch>
+            <a:fillRect/>
+          </a:stretch>
+        </p:blipFill>
+        <p:spPr>
+          <a:xfrm>
+            <a:off x="3632200" y="1739900"/>
+            <a:ext cx="2095500" cy="1778000"/>
+          </a:xfrm>
+          <a:prstGeom prst="rect">
+            <a:avLst/>
+          </a:prstGeom>
+        </p:spPr>
+      </p:pic>
+    </p:spTree>
+    <p:extLst>
+      <p:ext uri="{BB962C8B-B14F-4D97-AF65-F5344CB8AC3E}">
+        <p14:creationId xmlns:p14="http://schemas.microsoft.com/office/powerpoint/2010/main" val="2766492434"/>
+      </p:ext>
+    </p:extLst>
+  </p:cSld>
+  <p:clrMapOvr>
+    <a:masterClrMapping/>
+  </p:clrMapOvr>
+  <p:transition xmlns:p14="http://schemas.microsoft.com/office/powerpoint/2010/main"/>
+  <p:timing>
+    <p:tnLst>
+      <p:par>
+        <p:cTn xmlns:p14="http://schemas.microsoft.com/office/powerpoint/2010/main" id="1" dur="indefinite" restart="never" nodeType="tmRoot"/>
+      </p:par>
+    </p:tnLst>
+  </p:timing>
+</p:sld>
+</file>
+
+<file path=ppt/slides/slide17.xml><?xml version="1.0" encoding="utf-8"?>
+<p:sld xmlns:a="http://schemas.openxmlformats.org/drawingml/2006/main" xmlns:r="http://schemas.openxmlformats.org/officeDocument/2006/relationships" xmlns:p="http://schemas.openxmlformats.org/presentationml/2006/main">
+  <p:cSld>
+    <p:spTree>
+      <p:nvGrpSpPr>
+        <p:cNvPr id="1" name=""/>
+        <p:cNvGrpSpPr/>
+        <p:nvPr/>
+      </p:nvGrpSpPr>
+      <p:grpSpPr>
+        <a:xfrm>
+          <a:off x="0" y="0"/>
+          <a:ext cx="0" cy="0"/>
+          <a:chOff x="0" y="0"/>
+          <a:chExt cx="0" cy="0"/>
+        </a:xfrm>
+      </p:grpSpPr>
+      <p:sp>
+        <p:nvSpPr>
+          <p:cNvPr id="4" name="Content Placeholder 3"/>
+          <p:cNvSpPr>
+            <a:spLocks noGrp="1"/>
+          </p:cNvSpPr>
+          <p:nvPr>
+            <p:ph sz="quarter" idx="11"/>
+          </p:nvPr>
+        </p:nvSpPr>
+        <p:spPr>
+          <a:xfrm>
+            <a:off x="414337" y="495300"/>
+            <a:ext cx="7162800" cy="304800"/>
+          </a:xfrm>
+        </p:spPr>
+        <p:txBody>
+          <a:bodyPr/>
+          <a:lstStyle/>
+          <a:p>
+            <a:r>
+              <a:rPr lang="en-US" cap="none" dirty="0">
+                <a:latin typeface="PFDinTextCompPro-Bold" charset="0"/>
+                <a:ea typeface="ヒラギノ角ゴ ProN W3" charset="0"/>
+                <a:cs typeface="ヒラギノ角ゴ ProN W3" charset="0"/>
+              </a:rPr>
+              <a:t>THE IMPORTANCE OF DATA VISUALIZATION</a:t>
+            </a:r>
+          </a:p>
+        </p:txBody>
+      </p:sp>
+      <p:sp>
+        <p:nvSpPr>
+          <p:cNvPr id="8" name="Slide Number Placeholder 3"/>
+          <p:cNvSpPr>
+            <a:spLocks noGrp="1"/>
+          </p:cNvSpPr>
+          <p:nvPr>
+            <p:ph type="sldNum" sz="quarter" idx="13"/>
+          </p:nvPr>
+        </p:nvSpPr>
+        <p:spPr/>
+        <p:txBody>
+          <a:bodyPr/>
+          <a:lstStyle/>
+          <a:p>
+            <a:pPr>
+              <a:defRPr/>
+            </a:pPr>
+            <a:fld id="{BD5AD749-DAD1-6A4A-A2AA-CB20EAD0AEB7}" type="slidenum">
+              <a:rPr lang="en-US"/>
+              <a:pPr>
+                <a:defRPr/>
+              </a:pPr>
+              <a:t>17</a:t>
+            </a:fld>
+            <a:endParaRPr lang="en-US"/>
+          </a:p>
+        </p:txBody>
+      </p:sp>
+      <p:pic>
+        <p:nvPicPr>
+          <p:cNvPr id="2" name="Picture 1"/>
+          <p:cNvPicPr>
+            <a:picLocks noChangeAspect="1"/>
+          </p:cNvPicPr>
+          <p:nvPr/>
+        </p:nvPicPr>
+        <p:blipFill>
+          <a:blip r:embed="rId3"/>
+          <a:stretch>
+            <a:fillRect/>
+          </a:stretch>
+        </p:blipFill>
+        <p:spPr>
+          <a:xfrm>
+            <a:off x="342900" y="1739900"/>
+            <a:ext cx="8661400" cy="1778000"/>
+          </a:xfrm>
+          <a:prstGeom prst="rect">
+            <a:avLst/>
+          </a:prstGeom>
+        </p:spPr>
+      </p:pic>
+    </p:spTree>
+    <p:extLst>
+      <p:ext uri="{BB962C8B-B14F-4D97-AF65-F5344CB8AC3E}">
+        <p14:creationId xmlns:p14="http://schemas.microsoft.com/office/powerpoint/2010/main" val="2766492434"/>
+      </p:ext>
+    </p:extLst>
+  </p:cSld>
+  <p:clrMapOvr>
+    <a:masterClrMapping/>
+  </p:clrMapOvr>
+  <p:transition xmlns:p14="http://schemas.microsoft.com/office/powerpoint/2010/main"/>
+  <p:timing>
+    <p:tnLst>
+      <p:par>
+        <p:cTn xmlns:p14="http://schemas.microsoft.com/office/powerpoint/2010/main" id="1" dur="indefinite" restart="never" nodeType="tmRoot"/>
+      </p:par>
+    </p:tnLst>
+  </p:timing>
+</p:sld>
+</file>
+
+<file path=ppt/slides/slide18.xml><?xml version="1.0" encoding="utf-8"?>
+<p:sld xmlns:a="http://schemas.openxmlformats.org/drawingml/2006/main" xmlns:r="http://schemas.openxmlformats.org/officeDocument/2006/relationships" xmlns:p="http://schemas.openxmlformats.org/presentationml/2006/main">
+  <p:cSld>
+    <p:spTree>
+      <p:nvGrpSpPr>
+        <p:cNvPr id="1" name=""/>
+        <p:cNvGrpSpPr/>
+        <p:nvPr/>
+      </p:nvGrpSpPr>
+      <p:grpSpPr>
+        <a:xfrm>
+          <a:off x="0" y="0"/>
+          <a:ext cx="0" cy="0"/>
+          <a:chOff x="0" y="0"/>
+          <a:chExt cx="0" cy="0"/>
+        </a:xfrm>
+      </p:grpSpPr>
+      <p:sp>
+        <p:nvSpPr>
           <p:cNvPr id="2" name="Title 1"/>
           <p:cNvSpPr>
             <a:spLocks noGrp="1"/>
@@ -9386,7 +10915,7 @@
             </a:pPr>
             <a:r>
               <a:rPr lang="en-US" sz="7500" dirty="0" smtClean="0"/>
-              <a:t>III. Visualization in R</a:t>
+              <a:t>II. Visualization as a  medium</a:t>
             </a:r>
             <a:endParaRPr lang="en-US" sz="7500" dirty="0"/>
           </a:p>
@@ -9436,7 +10965,110 @@
     </p:spTree>
     <p:extLst>
       <p:ext uri="{BB962C8B-B14F-4D97-AF65-F5344CB8AC3E}">
-        <p14:creationId xmlns:p14="http://schemas.microsoft.com/office/powerpoint/2010/main" val="755849202"/>
+        <p14:creationId xmlns:p14="http://schemas.microsoft.com/office/powerpoint/2010/main" val="4293879031"/>
+      </p:ext>
+    </p:extLst>
+  </p:cSld>
+  <p:clrMapOvr>
+    <a:masterClrMapping/>
+  </p:clrMapOvr>
+  <p:transition xmlns:p14="http://schemas.microsoft.com/office/powerpoint/2010/main"/>
+  <p:timing>
+    <p:tnLst>
+      <p:par>
+        <p:cTn xmlns:p14="http://schemas.microsoft.com/office/powerpoint/2010/main" id="1" dur="indefinite" restart="never" nodeType="tmRoot"/>
+      </p:par>
+    </p:tnLst>
+  </p:timing>
+</p:sld>
+</file>
+
+<file path=ppt/slides/slide19.xml><?xml version="1.0" encoding="utf-8"?>
+<p:sld xmlns:a="http://schemas.openxmlformats.org/drawingml/2006/main" xmlns:r="http://schemas.openxmlformats.org/officeDocument/2006/relationships" xmlns:p="http://schemas.openxmlformats.org/presentationml/2006/main">
+  <p:cSld>
+    <p:spTree>
+      <p:nvGrpSpPr>
+        <p:cNvPr id="1" name=""/>
+        <p:cNvGrpSpPr/>
+        <p:nvPr/>
+      </p:nvGrpSpPr>
+      <p:grpSpPr>
+        <a:xfrm>
+          <a:off x="0" y="0"/>
+          <a:ext cx="0" cy="0"/>
+          <a:chOff x="0" y="0"/>
+          <a:chExt cx="0" cy="0"/>
+        </a:xfrm>
+      </p:grpSpPr>
+      <p:sp>
+        <p:nvSpPr>
+          <p:cNvPr id="4" name="Content Placeholder 3"/>
+          <p:cNvSpPr>
+            <a:spLocks noGrp="1"/>
+          </p:cNvSpPr>
+          <p:nvPr>
+            <p:ph sz="quarter" idx="11"/>
+          </p:nvPr>
+        </p:nvSpPr>
+        <p:spPr>
+          <a:xfrm>
+            <a:off x="371475" y="495300"/>
+            <a:ext cx="6400800" cy="304800"/>
+          </a:xfrm>
+        </p:spPr>
+        <p:txBody>
+          <a:bodyPr wrap="square" lIns="91440" tIns="45720" rIns="91440" bIns="45720" numCol="1" anchor="t" anchorCtr="0" compatLnSpc="1">
+            <a:prstTxWarp prst="textNoShape">
+              <a:avLst/>
+            </a:prstTxWarp>
+          </a:bodyPr>
+          <a:lstStyle/>
+          <a:p>
+            <a:pPr marL="0" indent="0"/>
+            <a:r>
+              <a:rPr lang="en-US" cap="none" dirty="0" smtClean="0">
+                <a:latin typeface="PFDinTextCompPro-Bold" charset="0"/>
+                <a:ea typeface="ヒラギノ角ゴ ProN W3" charset="0"/>
+                <a:cs typeface="ヒラギノ角ゴ ProN W3" charset="0"/>
+              </a:rPr>
+              <a:t>VISUALIZATION AS A MEDIUM</a:t>
+            </a:r>
+            <a:endParaRPr lang="en-US" cap="none" dirty="0">
+              <a:latin typeface="PFDinTextCompPro-Bold" charset="0"/>
+              <a:ea typeface="ヒラギノ角ゴ ProN W3" charset="0"/>
+              <a:cs typeface="ヒラギノ角ゴ ProN W3" charset="0"/>
+            </a:endParaRPr>
+          </a:p>
+        </p:txBody>
+      </p:sp>
+      <p:pic>
+        <p:nvPicPr>
+          <p:cNvPr id="5" name="Picture 4"/>
+          <p:cNvPicPr>
+            <a:picLocks noChangeAspect="1"/>
+          </p:cNvPicPr>
+          <p:nvPr/>
+        </p:nvPicPr>
+        <p:blipFill>
+          <a:blip r:embed="rId3"/>
+          <a:stretch>
+            <a:fillRect/>
+          </a:stretch>
+        </p:blipFill>
+        <p:spPr>
+          <a:xfrm>
+            <a:off x="1557337" y="1028700"/>
+            <a:ext cx="5888037" cy="3516136"/>
+          </a:xfrm>
+          <a:prstGeom prst="rect">
+            <a:avLst/>
+          </a:prstGeom>
+        </p:spPr>
+      </p:pic>
+    </p:spTree>
+    <p:extLst>
+      <p:ext uri="{BB962C8B-B14F-4D97-AF65-F5344CB8AC3E}">
+        <p14:creationId xmlns:p14="http://schemas.microsoft.com/office/powerpoint/2010/main" val="3057734648"/>
       </p:ext>
     </p:extLst>
   </p:cSld>
@@ -9694,6 +11326,322 @@
     <p:extLst>
       <p:ext uri="{BB962C8B-B14F-4D97-AF65-F5344CB8AC3E}">
         <p14:creationId xmlns:p14="http://schemas.microsoft.com/office/powerpoint/2010/main" val="2716250118"/>
+      </p:ext>
+    </p:extLst>
+  </p:cSld>
+  <p:clrMapOvr>
+    <a:masterClrMapping/>
+  </p:clrMapOvr>
+  <p:transition xmlns:p14="http://schemas.microsoft.com/office/powerpoint/2010/main"/>
+  <p:timing>
+    <p:tnLst>
+      <p:par>
+        <p:cTn xmlns:p14="http://schemas.microsoft.com/office/powerpoint/2010/main" id="1" dur="indefinite" restart="never" nodeType="tmRoot"/>
+      </p:par>
+    </p:tnLst>
+  </p:timing>
+</p:sld>
+</file>
+
+<file path=ppt/slides/slide20.xml><?xml version="1.0" encoding="utf-8"?>
+<p:sld xmlns:a="http://schemas.openxmlformats.org/drawingml/2006/main" xmlns:r="http://schemas.openxmlformats.org/officeDocument/2006/relationships" xmlns:p="http://schemas.openxmlformats.org/presentationml/2006/main">
+  <p:cSld>
+    <p:spTree>
+      <p:nvGrpSpPr>
+        <p:cNvPr id="1" name=""/>
+        <p:cNvGrpSpPr/>
+        <p:nvPr/>
+      </p:nvGrpSpPr>
+      <p:grpSpPr>
+        <a:xfrm>
+          <a:off x="0" y="0"/>
+          <a:ext cx="0" cy="0"/>
+          <a:chOff x="0" y="0"/>
+          <a:chExt cx="0" cy="0"/>
+        </a:xfrm>
+      </p:grpSpPr>
+      <p:sp>
+        <p:nvSpPr>
+          <p:cNvPr id="4" name="Content Placeholder 3"/>
+          <p:cNvSpPr>
+            <a:spLocks noGrp="1"/>
+          </p:cNvSpPr>
+          <p:nvPr>
+            <p:ph sz="quarter" idx="11"/>
+          </p:nvPr>
+        </p:nvSpPr>
+        <p:spPr>
+          <a:xfrm>
+            <a:off x="371475" y="495300"/>
+            <a:ext cx="6400800" cy="304800"/>
+          </a:xfrm>
+        </p:spPr>
+        <p:txBody>
+          <a:bodyPr wrap="square" lIns="91440" tIns="45720" rIns="91440" bIns="45720" numCol="1" anchor="t" anchorCtr="0" compatLnSpc="1">
+            <a:prstTxWarp prst="textNoShape">
+              <a:avLst/>
+            </a:prstTxWarp>
+          </a:bodyPr>
+          <a:lstStyle/>
+          <a:p>
+            <a:pPr marL="0" indent="0"/>
+            <a:r>
+              <a:rPr lang="en-US" cap="none" dirty="0" smtClean="0">
+                <a:latin typeface="PFDinTextCompPro-Bold" charset="0"/>
+                <a:ea typeface="ヒラギノ角ゴ ProN W3" charset="0"/>
+                <a:cs typeface="ヒラギノ角ゴ ProN W3" charset="0"/>
+              </a:rPr>
+              <a:t>VISUALIZATION AS A MEDIUM</a:t>
+            </a:r>
+            <a:endParaRPr lang="en-US" cap="none" dirty="0">
+              <a:latin typeface="PFDinTextCompPro-Bold" charset="0"/>
+              <a:ea typeface="ヒラギノ角ゴ ProN W3" charset="0"/>
+              <a:cs typeface="ヒラギノ角ゴ ProN W3" charset="0"/>
+            </a:endParaRPr>
+          </a:p>
+        </p:txBody>
+      </p:sp>
+      <p:pic>
+        <p:nvPicPr>
+          <p:cNvPr id="2" name="Picture 1"/>
+          <p:cNvPicPr>
+            <a:picLocks noChangeAspect="1"/>
+          </p:cNvPicPr>
+          <p:nvPr/>
+        </p:nvPicPr>
+        <p:blipFill>
+          <a:blip r:embed="rId3"/>
+          <a:stretch>
+            <a:fillRect/>
+          </a:stretch>
+        </p:blipFill>
+        <p:spPr>
+          <a:xfrm>
+            <a:off x="1785937" y="952500"/>
+            <a:ext cx="5680710" cy="5257800"/>
+          </a:xfrm>
+          <a:prstGeom prst="rect">
+            <a:avLst/>
+          </a:prstGeom>
+        </p:spPr>
+      </p:pic>
+    </p:spTree>
+    <p:extLst>
+      <p:ext uri="{BB962C8B-B14F-4D97-AF65-F5344CB8AC3E}">
+        <p14:creationId xmlns:p14="http://schemas.microsoft.com/office/powerpoint/2010/main" val="2341896351"/>
+      </p:ext>
+    </p:extLst>
+  </p:cSld>
+  <p:clrMapOvr>
+    <a:masterClrMapping/>
+  </p:clrMapOvr>
+  <p:transition xmlns:p14="http://schemas.microsoft.com/office/powerpoint/2010/main"/>
+  <p:timing>
+    <p:tnLst>
+      <p:par>
+        <p:cTn xmlns:p14="http://schemas.microsoft.com/office/powerpoint/2010/main" id="1" dur="indefinite" restart="never" nodeType="tmRoot"/>
+      </p:par>
+    </p:tnLst>
+  </p:timing>
+</p:sld>
+</file>
+
+<file path=ppt/slides/slide21.xml><?xml version="1.0" encoding="utf-8"?>
+<p:sld xmlns:a="http://schemas.openxmlformats.org/drawingml/2006/main" xmlns:r="http://schemas.openxmlformats.org/officeDocument/2006/relationships" xmlns:p="http://schemas.openxmlformats.org/presentationml/2006/main">
+  <p:cSld>
+    <p:spTree>
+      <p:nvGrpSpPr>
+        <p:cNvPr id="1" name=""/>
+        <p:cNvGrpSpPr/>
+        <p:nvPr/>
+      </p:nvGrpSpPr>
+      <p:grpSpPr>
+        <a:xfrm>
+          <a:off x="0" y="0"/>
+          <a:ext cx="0" cy="0"/>
+          <a:chOff x="0" y="0"/>
+          <a:chExt cx="0" cy="0"/>
+        </a:xfrm>
+      </p:grpSpPr>
+      <p:sp>
+        <p:nvSpPr>
+          <p:cNvPr id="4" name="Content Placeholder 3"/>
+          <p:cNvSpPr>
+            <a:spLocks noGrp="1"/>
+          </p:cNvSpPr>
+          <p:nvPr>
+            <p:ph sz="quarter" idx="11"/>
+          </p:nvPr>
+        </p:nvSpPr>
+        <p:spPr>
+          <a:xfrm>
+            <a:off x="371475" y="495300"/>
+            <a:ext cx="6400800" cy="304800"/>
+          </a:xfrm>
+        </p:spPr>
+        <p:txBody>
+          <a:bodyPr wrap="square" lIns="91440" tIns="45720" rIns="91440" bIns="45720" numCol="1" anchor="t" anchorCtr="0" compatLnSpc="1">
+            <a:prstTxWarp prst="textNoShape">
+              <a:avLst/>
+            </a:prstTxWarp>
+          </a:bodyPr>
+          <a:lstStyle/>
+          <a:p>
+            <a:pPr marL="0" indent="0"/>
+            <a:r>
+              <a:rPr lang="en-US" cap="none" dirty="0" smtClean="0">
+                <a:latin typeface="PFDinTextCompPro-Bold" charset="0"/>
+                <a:ea typeface="ヒラギノ角ゴ ProN W3" charset="0"/>
+                <a:cs typeface="ヒラギノ角ゴ ProN W3" charset="0"/>
+              </a:rPr>
+              <a:t>VISUALIZATION AS A MEDIUM</a:t>
+            </a:r>
+            <a:endParaRPr lang="en-US" cap="none" dirty="0">
+              <a:latin typeface="PFDinTextCompPro-Bold" charset="0"/>
+              <a:ea typeface="ヒラギノ角ゴ ProN W3" charset="0"/>
+              <a:cs typeface="ヒラギノ角ゴ ProN W3" charset="0"/>
+            </a:endParaRPr>
+          </a:p>
+        </p:txBody>
+      </p:sp>
+      <p:pic>
+        <p:nvPicPr>
+          <p:cNvPr id="2" name="Picture 1"/>
+          <p:cNvPicPr>
+            <a:picLocks noChangeAspect="1"/>
+          </p:cNvPicPr>
+          <p:nvPr/>
+        </p:nvPicPr>
+        <p:blipFill>
+          <a:blip r:embed="rId3"/>
+          <a:stretch>
+            <a:fillRect/>
+          </a:stretch>
+        </p:blipFill>
+        <p:spPr>
+          <a:xfrm>
+            <a:off x="1785937" y="996870"/>
+            <a:ext cx="5816600" cy="4267200"/>
+          </a:xfrm>
+          <a:prstGeom prst="rect">
+            <a:avLst/>
+          </a:prstGeom>
+        </p:spPr>
+      </p:pic>
+    </p:spTree>
+    <p:extLst>
+      <p:ext uri="{BB962C8B-B14F-4D97-AF65-F5344CB8AC3E}">
+        <p14:creationId xmlns:p14="http://schemas.microsoft.com/office/powerpoint/2010/main" val="3367487688"/>
+      </p:ext>
+    </p:extLst>
+  </p:cSld>
+  <p:clrMapOvr>
+    <a:masterClrMapping/>
+  </p:clrMapOvr>
+  <p:transition xmlns:p14="http://schemas.microsoft.com/office/powerpoint/2010/main"/>
+  <p:timing>
+    <p:tnLst>
+      <p:par>
+        <p:cTn xmlns:p14="http://schemas.microsoft.com/office/powerpoint/2010/main" id="1" dur="indefinite" restart="never" nodeType="tmRoot"/>
+      </p:par>
+    </p:tnLst>
+  </p:timing>
+</p:sld>
+</file>
+
+<file path=ppt/slides/slide22.xml><?xml version="1.0" encoding="utf-8"?>
+<p:sld xmlns:a="http://schemas.openxmlformats.org/drawingml/2006/main" xmlns:r="http://schemas.openxmlformats.org/officeDocument/2006/relationships" xmlns:p="http://schemas.openxmlformats.org/presentationml/2006/main">
+  <p:cSld>
+    <p:spTree>
+      <p:nvGrpSpPr>
+        <p:cNvPr id="1" name=""/>
+        <p:cNvGrpSpPr/>
+        <p:nvPr/>
+      </p:nvGrpSpPr>
+      <p:grpSpPr>
+        <a:xfrm>
+          <a:off x="0" y="0"/>
+          <a:ext cx="0" cy="0"/>
+          <a:chOff x="0" y="0"/>
+          <a:chExt cx="0" cy="0"/>
+        </a:xfrm>
+      </p:grpSpPr>
+      <p:sp>
+        <p:nvSpPr>
+          <p:cNvPr id="2" name="Title 1"/>
+          <p:cNvSpPr>
+            <a:spLocks noGrp="1"/>
+          </p:cNvSpPr>
+          <p:nvPr>
+            <p:ph type="title"/>
+          </p:nvPr>
+        </p:nvSpPr>
+        <p:spPr>
+          <a:xfrm>
+            <a:off x="347663" y="3238500"/>
+            <a:ext cx="8426450" cy="1828800"/>
+          </a:xfrm>
+        </p:spPr>
+        <p:txBody>
+          <a:bodyPr/>
+          <a:lstStyle/>
+          <a:p>
+            <a:pPr>
+              <a:defRPr/>
+            </a:pPr>
+            <a:r>
+              <a:rPr lang="en-US" sz="7500" dirty="0" smtClean="0"/>
+              <a:t>III. Visualization in R</a:t>
+            </a:r>
+            <a:endParaRPr lang="en-US" sz="7500" dirty="0"/>
+          </a:p>
+        </p:txBody>
+      </p:sp>
+      <p:sp>
+        <p:nvSpPr>
+          <p:cNvPr id="4" name="Content Placeholder 3"/>
+          <p:cNvSpPr>
+            <a:spLocks noGrp="1"/>
+          </p:cNvSpPr>
+          <p:nvPr>
+            <p:ph sz="quarter" idx="11"/>
+          </p:nvPr>
+        </p:nvSpPr>
+        <p:spPr>
+          <a:xfrm>
+            <a:off x="371475" y="495300"/>
+            <a:ext cx="6400800" cy="304800"/>
+          </a:xfrm>
+        </p:spPr>
+        <p:txBody>
+          <a:bodyPr wrap="square" lIns="91440" tIns="45720" rIns="91440" bIns="45720" numCol="1" anchor="t" anchorCtr="0" compatLnSpc="1">
+            <a:prstTxWarp prst="textNoShape">
+              <a:avLst/>
+            </a:prstTxWarp>
+          </a:bodyPr>
+          <a:lstStyle/>
+          <a:p>
+            <a:pPr marL="0" indent="0"/>
+            <a:r>
+              <a:rPr lang="en-US" cap="none" dirty="0" smtClean="0">
+                <a:latin typeface="PFDinTextCompPro-Bold" charset="0"/>
+                <a:ea typeface="ヒラギノ角ゴ ProN W3" charset="0"/>
+                <a:cs typeface="ヒラギノ角ゴ ProN W3" charset="0"/>
+              </a:rPr>
+              <a:t>INTRO TO DATA SCIENCE</a:t>
+            </a:r>
+            <a:endParaRPr lang="en-US" cap="none" dirty="0">
+              <a:latin typeface="PFDinTextCompPro-Bold" charset="0"/>
+              <a:ea typeface="ヒラギノ角ゴ ProN W3" charset="0"/>
+              <a:cs typeface="ヒラギノ角ゴ ProN W3" charset="0"/>
+            </a:endParaRPr>
+          </a:p>
+        </p:txBody>
+      </p:sp>
+    </p:spTree>
+    <p:extLst>
+      <p:ext uri="{BB962C8B-B14F-4D97-AF65-F5344CB8AC3E}">
+        <p14:creationId xmlns:p14="http://schemas.microsoft.com/office/powerpoint/2010/main" val="755849202"/>
       </p:ext>
     </p:extLst>
   </p:cSld>

</xml_diff>